<commit_message>
revised Lessons 0.4, working on 0.6
</commit_message>
<xml_diff>
--- a/Slides/Lesson 0.5 Introduction to Git.pptx
+++ b/Slides/Lesson 0.5 Introduction to Git.pptx
@@ -12850,6 +12850,1349 @@
       <dsp:cNvGrpSpPr/>
     </dsp:nvGrpSpPr>
     <dsp:grpSpPr/>
+    <dsp:sp modelId="{751A64B2-AA1B-4610-90F2-2585F0A6A46F}">
+      <dsp:nvSpPr>
+        <dsp:cNvPr id="0" name=""/>
+        <dsp:cNvSpPr/>
+      </dsp:nvSpPr>
+      <dsp:spPr>
+        <a:xfrm>
+          <a:off x="0" y="1181832"/>
+          <a:ext cx="580745" cy="290372"/>
+        </a:xfrm>
+        <a:prstGeom prst="roundRect">
+          <a:avLst>
+            <a:gd name="adj" fmla="val 10000"/>
+          </a:avLst>
+        </a:prstGeom>
+        <a:solidFill>
+          <a:schemeClr val="accent1">
+            <a:hueOff val="0"/>
+            <a:satOff val="0"/>
+            <a:lumOff val="0"/>
+            <a:alphaOff val="0"/>
+          </a:schemeClr>
+        </a:solidFill>
+        <a:ln w="25400" cap="flat" cmpd="sng" algn="ctr">
+          <a:solidFill>
+            <a:schemeClr val="lt1">
+              <a:hueOff val="0"/>
+              <a:satOff val="0"/>
+              <a:lumOff val="0"/>
+              <a:alphaOff val="0"/>
+            </a:schemeClr>
+          </a:solidFill>
+          <a:prstDash val="solid"/>
+        </a:ln>
+        <a:effectLst/>
+      </dsp:spPr>
+      <dsp:style>
+        <a:lnRef idx="2">
+          <a:scrgbClr r="0" g="0" b="0"/>
+        </a:lnRef>
+        <a:fillRef idx="1">
+          <a:scrgbClr r="0" g="0" b="0"/>
+        </a:fillRef>
+        <a:effectRef idx="0">
+          <a:scrgbClr r="0" g="0" b="0"/>
+        </a:effectRef>
+        <a:fontRef idx="minor">
+          <a:schemeClr val="lt1"/>
+        </a:fontRef>
+      </dsp:style>
+      <dsp:txBody>
+        <a:bodyPr spcFirstLastPara="0" vert="horz" wrap="square" lIns="3810" tIns="3810" rIns="3810" bIns="3810" numCol="1" spcCol="1270" anchor="ctr" anchorCtr="0">
+          <a:noAutofit/>
+        </a:bodyPr>
+        <a:lstStyle/>
+        <a:p>
+          <a:pPr lvl="0" algn="ctr" defTabSz="266700">
+            <a:lnSpc>
+              <a:spcPct val="90000"/>
+            </a:lnSpc>
+            <a:spcBef>
+              <a:spcPct val="0"/>
+            </a:spcBef>
+            <a:spcAft>
+              <a:spcPct val="35000"/>
+            </a:spcAft>
+          </a:pPr>
+          <a:r>
+            <a:rPr lang="en-US" sz="600" kern="1200" dirty="0" smtClean="0"/>
+            <a:t>my-project</a:t>
+          </a:r>
+          <a:endParaRPr lang="en-US" sz="600" kern="1200" dirty="0"/>
+        </a:p>
+      </dsp:txBody>
+      <dsp:txXfrm>
+        <a:off x="8505" y="1190337"/>
+        <a:ext cx="563735" cy="273362"/>
+      </dsp:txXfrm>
+    </dsp:sp>
+    <dsp:sp modelId="{27E9DFBA-38D9-4890-81CD-E6DD6F1BD76C}">
+      <dsp:nvSpPr>
+        <dsp:cNvPr id="0" name=""/>
+        <dsp:cNvSpPr/>
+      </dsp:nvSpPr>
+      <dsp:spPr>
+        <a:xfrm>
+          <a:off x="580745" y="1320547"/>
+          <a:ext cx="123404" cy="12941"/>
+        </a:xfrm>
+        <a:custGeom>
+          <a:avLst/>
+          <a:gdLst/>
+          <a:ahLst/>
+          <a:cxnLst/>
+          <a:rect l="0" t="0" r="0" b="0"/>
+          <a:pathLst>
+            <a:path>
+              <a:moveTo>
+                <a:pt x="0" y="6470"/>
+              </a:moveTo>
+              <a:lnTo>
+                <a:pt x="123404" y="6470"/>
+              </a:lnTo>
+            </a:path>
+          </a:pathLst>
+        </a:custGeom>
+        <a:noFill/>
+        <a:ln w="25400" cap="flat" cmpd="sng" algn="ctr">
+          <a:solidFill>
+            <a:schemeClr val="accent1">
+              <a:shade val="60000"/>
+              <a:hueOff val="0"/>
+              <a:satOff val="0"/>
+              <a:lumOff val="0"/>
+              <a:alphaOff val="0"/>
+            </a:schemeClr>
+          </a:solidFill>
+          <a:prstDash val="solid"/>
+        </a:ln>
+        <a:effectLst/>
+      </dsp:spPr>
+      <dsp:style>
+        <a:lnRef idx="2">
+          <a:scrgbClr r="0" g="0" b="0"/>
+        </a:lnRef>
+        <a:fillRef idx="0">
+          <a:scrgbClr r="0" g="0" b="0"/>
+        </a:fillRef>
+        <a:effectRef idx="0">
+          <a:scrgbClr r="0" g="0" b="0"/>
+        </a:effectRef>
+        <a:fontRef idx="minor"/>
+      </dsp:style>
+      <dsp:txBody>
+        <a:bodyPr spcFirstLastPara="0" vert="horz" wrap="square" lIns="12700" tIns="0" rIns="12700" bIns="0" numCol="1" spcCol="1270" anchor="ctr" anchorCtr="0">
+          <a:noAutofit/>
+        </a:bodyPr>
+        <a:lstStyle/>
+        <a:p>
+          <a:pPr lvl="0" algn="ctr" defTabSz="222250">
+            <a:lnSpc>
+              <a:spcPct val="90000"/>
+            </a:lnSpc>
+            <a:spcBef>
+              <a:spcPct val="0"/>
+            </a:spcBef>
+            <a:spcAft>
+              <a:spcPct val="35000"/>
+            </a:spcAft>
+          </a:pPr>
+          <a:endParaRPr lang="en-US" sz="500" kern="1200"/>
+        </a:p>
+      </dsp:txBody>
+      <dsp:txXfrm>
+        <a:off x="639363" y="1323933"/>
+        <a:ext cx="6170" cy="6170"/>
+      </dsp:txXfrm>
+    </dsp:sp>
+    <dsp:sp modelId="{CD21181F-0FF4-4082-92C6-4A9B73A74EDB}">
+      <dsp:nvSpPr>
+        <dsp:cNvPr id="0" name=""/>
+        <dsp:cNvSpPr/>
+      </dsp:nvSpPr>
+      <dsp:spPr>
+        <a:xfrm>
+          <a:off x="704150" y="1181832"/>
+          <a:ext cx="580745" cy="290372"/>
+        </a:xfrm>
+        <a:prstGeom prst="roundRect">
+          <a:avLst>
+            <a:gd name="adj" fmla="val 10000"/>
+          </a:avLst>
+        </a:prstGeom>
+        <a:solidFill>
+          <a:schemeClr val="accent1">
+            <a:hueOff val="0"/>
+            <a:satOff val="0"/>
+            <a:lumOff val="0"/>
+            <a:alphaOff val="0"/>
+          </a:schemeClr>
+        </a:solidFill>
+        <a:ln w="25400" cap="flat" cmpd="sng" algn="ctr">
+          <a:solidFill>
+            <a:schemeClr val="lt1">
+              <a:hueOff val="0"/>
+              <a:satOff val="0"/>
+              <a:lumOff val="0"/>
+              <a:alphaOff val="0"/>
+            </a:schemeClr>
+          </a:solidFill>
+          <a:prstDash val="solid"/>
+        </a:ln>
+        <a:effectLst/>
+      </dsp:spPr>
+      <dsp:style>
+        <a:lnRef idx="2">
+          <a:scrgbClr r="0" g="0" b="0"/>
+        </a:lnRef>
+        <a:fillRef idx="1">
+          <a:scrgbClr r="0" g="0" b="0"/>
+        </a:fillRef>
+        <a:effectRef idx="0">
+          <a:scrgbClr r="0" g="0" b="0"/>
+        </a:effectRef>
+        <a:fontRef idx="minor">
+          <a:schemeClr val="lt1"/>
+        </a:fontRef>
+      </dsp:style>
+      <dsp:txBody>
+        <a:bodyPr spcFirstLastPara="0" vert="horz" wrap="square" lIns="3810" tIns="3810" rIns="3810" bIns="3810" numCol="1" spcCol="1270" anchor="ctr" anchorCtr="0">
+          <a:noAutofit/>
+        </a:bodyPr>
+        <a:lstStyle/>
+        <a:p>
+          <a:pPr lvl="0" algn="ctr" defTabSz="266700">
+            <a:lnSpc>
+              <a:spcPct val="90000"/>
+            </a:lnSpc>
+            <a:spcBef>
+              <a:spcPct val="0"/>
+            </a:spcBef>
+            <a:spcAft>
+              <a:spcPct val="35000"/>
+            </a:spcAft>
+          </a:pPr>
+          <a:r>
+            <a:rPr lang="en-US" sz="600" kern="1200" dirty="0" smtClean="0"/>
+            <a:t>docs</a:t>
+          </a:r>
+          <a:endParaRPr lang="en-US" sz="600" kern="1200" dirty="0"/>
+        </a:p>
+      </dsp:txBody>
+      <dsp:txXfrm>
+        <a:off x="712655" y="1190337"/>
+        <a:ext cx="563735" cy="273362"/>
+      </dsp:txXfrm>
+    </dsp:sp>
+    <dsp:sp modelId="{22C8D88C-9200-449A-95CA-C6C951FF9EFA}">
+      <dsp:nvSpPr>
+        <dsp:cNvPr id="0" name=""/>
+        <dsp:cNvSpPr/>
+      </dsp:nvSpPr>
+      <dsp:spPr>
+        <a:xfrm rot="21292818">
+          <a:off x="1284207" y="1305134"/>
+          <a:ext cx="345441" cy="12941"/>
+        </a:xfrm>
+        <a:custGeom>
+          <a:avLst/>
+          <a:gdLst/>
+          <a:ahLst/>
+          <a:cxnLst/>
+          <a:rect l="0" t="0" r="0" b="0"/>
+          <a:pathLst>
+            <a:path>
+              <a:moveTo>
+                <a:pt x="0" y="6470"/>
+              </a:moveTo>
+              <a:lnTo>
+                <a:pt x="345441" y="6470"/>
+              </a:lnTo>
+            </a:path>
+          </a:pathLst>
+        </a:custGeom>
+        <a:noFill/>
+        <a:ln w="25400" cap="flat" cmpd="sng" algn="ctr">
+          <a:solidFill>
+            <a:schemeClr val="accent1">
+              <a:shade val="80000"/>
+              <a:hueOff val="0"/>
+              <a:satOff val="0"/>
+              <a:lumOff val="0"/>
+              <a:alphaOff val="0"/>
+            </a:schemeClr>
+          </a:solidFill>
+          <a:prstDash val="solid"/>
+        </a:ln>
+        <a:effectLst/>
+      </dsp:spPr>
+      <dsp:style>
+        <a:lnRef idx="2">
+          <a:scrgbClr r="0" g="0" b="0"/>
+        </a:lnRef>
+        <a:fillRef idx="0">
+          <a:scrgbClr r="0" g="0" b="0"/>
+        </a:fillRef>
+        <a:effectRef idx="0">
+          <a:scrgbClr r="0" g="0" b="0"/>
+        </a:effectRef>
+        <a:fontRef idx="minor"/>
+      </dsp:style>
+      <dsp:txBody>
+        <a:bodyPr spcFirstLastPara="0" vert="horz" wrap="square" lIns="12700" tIns="0" rIns="12700" bIns="0" numCol="1" spcCol="1270" anchor="ctr" anchorCtr="0">
+          <a:noAutofit/>
+        </a:bodyPr>
+        <a:lstStyle/>
+        <a:p>
+          <a:pPr lvl="0" algn="ctr" defTabSz="222250">
+            <a:lnSpc>
+              <a:spcPct val="90000"/>
+            </a:lnSpc>
+            <a:spcBef>
+              <a:spcPct val="0"/>
+            </a:spcBef>
+            <a:spcAft>
+              <a:spcPct val="35000"/>
+            </a:spcAft>
+          </a:pPr>
+          <a:endParaRPr lang="en-US" sz="500" kern="1200"/>
+        </a:p>
+      </dsp:txBody>
+      <dsp:txXfrm>
+        <a:off x="1448291" y="1302969"/>
+        <a:ext cx="17272" cy="17272"/>
+      </dsp:txXfrm>
+    </dsp:sp>
+    <dsp:sp modelId="{15AA3F71-DF63-44F2-A3BA-35AE6A6DBF7D}">
+      <dsp:nvSpPr>
+        <dsp:cNvPr id="0" name=""/>
+        <dsp:cNvSpPr/>
+      </dsp:nvSpPr>
+      <dsp:spPr>
+        <a:xfrm>
+          <a:off x="1628959" y="1151006"/>
+          <a:ext cx="580745" cy="290372"/>
+        </a:xfrm>
+        <a:prstGeom prst="roundRect">
+          <a:avLst>
+            <a:gd name="adj" fmla="val 10000"/>
+          </a:avLst>
+        </a:prstGeom>
+        <a:solidFill>
+          <a:schemeClr val="accent1">
+            <a:hueOff val="0"/>
+            <a:satOff val="0"/>
+            <a:lumOff val="0"/>
+            <a:alphaOff val="0"/>
+          </a:schemeClr>
+        </a:solidFill>
+        <a:ln w="25400" cap="flat" cmpd="sng" algn="ctr">
+          <a:solidFill>
+            <a:schemeClr val="lt1">
+              <a:hueOff val="0"/>
+              <a:satOff val="0"/>
+              <a:lumOff val="0"/>
+              <a:alphaOff val="0"/>
+            </a:schemeClr>
+          </a:solidFill>
+          <a:prstDash val="solid"/>
+        </a:ln>
+        <a:effectLst/>
+      </dsp:spPr>
+      <dsp:style>
+        <a:lnRef idx="2">
+          <a:scrgbClr r="0" g="0" b="0"/>
+        </a:lnRef>
+        <a:fillRef idx="1">
+          <a:scrgbClr r="0" g="0" b="0"/>
+        </a:fillRef>
+        <a:effectRef idx="0">
+          <a:scrgbClr r="0" g="0" b="0"/>
+        </a:effectRef>
+        <a:fontRef idx="minor">
+          <a:schemeClr val="lt1"/>
+        </a:fontRef>
+      </dsp:style>
+      <dsp:txBody>
+        <a:bodyPr spcFirstLastPara="0" vert="horz" wrap="square" lIns="3810" tIns="3810" rIns="3810" bIns="3810" numCol="1" spcCol="1270" anchor="ctr" anchorCtr="0">
+          <a:noAutofit/>
+        </a:bodyPr>
+        <a:lstStyle/>
+        <a:p>
+          <a:pPr lvl="0" algn="ctr" defTabSz="266700">
+            <a:lnSpc>
+              <a:spcPct val="90000"/>
+            </a:lnSpc>
+            <a:spcBef>
+              <a:spcPct val="0"/>
+            </a:spcBef>
+            <a:spcAft>
+              <a:spcPct val="35000"/>
+            </a:spcAft>
+          </a:pPr>
+          <a:r>
+            <a:rPr lang="en-US" sz="600" kern="1200" dirty="0" smtClean="0"/>
+            <a:t>manual.docx</a:t>
+          </a:r>
+          <a:endParaRPr lang="en-US" sz="600" kern="1200" dirty="0"/>
+        </a:p>
+      </dsp:txBody>
+      <dsp:txXfrm>
+        <a:off x="1637464" y="1159511"/>
+        <a:ext cx="563735" cy="273362"/>
+      </dsp:txXfrm>
+    </dsp:sp>
+    <dsp:sp modelId="{DF8ACA11-A784-4636-BE9F-ADD52C706CBC}">
+      <dsp:nvSpPr>
+        <dsp:cNvPr id="0" name=""/>
+        <dsp:cNvSpPr/>
+      </dsp:nvSpPr>
+      <dsp:spPr>
+        <a:xfrm rot="2156824">
+          <a:off x="1245225" y="1442834"/>
+          <a:ext cx="416621" cy="12941"/>
+        </a:xfrm>
+        <a:custGeom>
+          <a:avLst/>
+          <a:gdLst/>
+          <a:ahLst/>
+          <a:cxnLst/>
+          <a:rect l="0" t="0" r="0" b="0"/>
+          <a:pathLst>
+            <a:path>
+              <a:moveTo>
+                <a:pt x="0" y="6470"/>
+              </a:moveTo>
+              <a:lnTo>
+                <a:pt x="416621" y="6470"/>
+              </a:lnTo>
+            </a:path>
+          </a:pathLst>
+        </a:custGeom>
+        <a:noFill/>
+        <a:ln w="25400" cap="flat" cmpd="sng" algn="ctr">
+          <a:solidFill>
+            <a:schemeClr val="accent1">
+              <a:shade val="80000"/>
+              <a:hueOff val="0"/>
+              <a:satOff val="0"/>
+              <a:lumOff val="0"/>
+              <a:alphaOff val="0"/>
+            </a:schemeClr>
+          </a:solidFill>
+          <a:prstDash val="solid"/>
+        </a:ln>
+        <a:effectLst/>
+      </dsp:spPr>
+      <dsp:style>
+        <a:lnRef idx="2">
+          <a:scrgbClr r="0" g="0" b="0"/>
+        </a:lnRef>
+        <a:fillRef idx="0">
+          <a:scrgbClr r="0" g="0" b="0"/>
+        </a:fillRef>
+        <a:effectRef idx="0">
+          <a:scrgbClr r="0" g="0" b="0"/>
+        </a:effectRef>
+        <a:fontRef idx="minor"/>
+      </dsp:style>
+      <dsp:txBody>
+        <a:bodyPr spcFirstLastPara="0" vert="horz" wrap="square" lIns="12700" tIns="0" rIns="12700" bIns="0" numCol="1" spcCol="1270" anchor="ctr" anchorCtr="0">
+          <a:noAutofit/>
+        </a:bodyPr>
+        <a:lstStyle/>
+        <a:p>
+          <a:pPr lvl="0" algn="ctr" defTabSz="222250">
+            <a:lnSpc>
+              <a:spcPct val="90000"/>
+            </a:lnSpc>
+            <a:spcBef>
+              <a:spcPct val="0"/>
+            </a:spcBef>
+            <a:spcAft>
+              <a:spcPct val="35000"/>
+            </a:spcAft>
+          </a:pPr>
+          <a:endParaRPr lang="en-US" sz="500" kern="1200"/>
+        </a:p>
+      </dsp:txBody>
+      <dsp:txXfrm>
+        <a:off x="1443120" y="1438889"/>
+        <a:ext cx="20831" cy="20831"/>
+      </dsp:txXfrm>
+    </dsp:sp>
+    <dsp:sp modelId="{2CE1C545-78E0-47B5-8C72-53A9EE24CD60}">
+      <dsp:nvSpPr>
+        <dsp:cNvPr id="0" name=""/>
+        <dsp:cNvSpPr/>
+      </dsp:nvSpPr>
+      <dsp:spPr>
+        <a:xfrm>
+          <a:off x="1622176" y="1426404"/>
+          <a:ext cx="580745" cy="290372"/>
+        </a:xfrm>
+        <a:prstGeom prst="roundRect">
+          <a:avLst>
+            <a:gd name="adj" fmla="val 10000"/>
+          </a:avLst>
+        </a:prstGeom>
+        <a:solidFill>
+          <a:schemeClr val="accent1">
+            <a:hueOff val="0"/>
+            <a:satOff val="0"/>
+            <a:lumOff val="0"/>
+            <a:alphaOff val="0"/>
+          </a:schemeClr>
+        </a:solidFill>
+        <a:ln w="25400" cap="flat" cmpd="sng" algn="ctr">
+          <a:solidFill>
+            <a:schemeClr val="lt1">
+              <a:hueOff val="0"/>
+              <a:satOff val="0"/>
+              <a:lumOff val="0"/>
+              <a:alphaOff val="0"/>
+            </a:schemeClr>
+          </a:solidFill>
+          <a:prstDash val="solid"/>
+        </a:ln>
+        <a:effectLst/>
+      </dsp:spPr>
+      <dsp:style>
+        <a:lnRef idx="2">
+          <a:scrgbClr r="0" g="0" b="0"/>
+        </a:lnRef>
+        <a:fillRef idx="1">
+          <a:scrgbClr r="0" g="0" b="0"/>
+        </a:fillRef>
+        <a:effectRef idx="0">
+          <a:scrgbClr r="0" g="0" b="0"/>
+        </a:effectRef>
+        <a:fontRef idx="minor">
+          <a:schemeClr val="lt1"/>
+        </a:fontRef>
+      </dsp:style>
+      <dsp:txBody>
+        <a:bodyPr spcFirstLastPara="0" vert="horz" wrap="square" lIns="3810" tIns="3810" rIns="3810" bIns="3810" numCol="1" spcCol="1270" anchor="ctr" anchorCtr="0">
+          <a:noAutofit/>
+        </a:bodyPr>
+        <a:lstStyle/>
+        <a:p>
+          <a:pPr lvl="0" algn="ctr" defTabSz="266700">
+            <a:lnSpc>
+              <a:spcPct val="90000"/>
+            </a:lnSpc>
+            <a:spcBef>
+              <a:spcPct val="0"/>
+            </a:spcBef>
+            <a:spcAft>
+              <a:spcPct val="35000"/>
+            </a:spcAft>
+          </a:pPr>
+          <a:r>
+            <a:rPr lang="en-US" sz="600" kern="1200" dirty="0" smtClean="0"/>
+            <a:t>user_docs.docx</a:t>
+          </a:r>
+          <a:endParaRPr lang="en-US" sz="600" kern="1200" dirty="0"/>
+        </a:p>
+      </dsp:txBody>
+      <dsp:txXfrm>
+        <a:off x="1630681" y="1434909"/>
+        <a:ext cx="563735" cy="273362"/>
+      </dsp:txXfrm>
+    </dsp:sp>
+    <dsp:sp modelId="{37DFA971-3BDD-4614-B3F4-FCCCA928E801}">
+      <dsp:nvSpPr>
+        <dsp:cNvPr id="0" name=""/>
+        <dsp:cNvSpPr/>
+      </dsp:nvSpPr>
+      <dsp:spPr>
+        <a:xfrm rot="4503450">
+          <a:off x="403152" y="1551751"/>
+          <a:ext cx="478590" cy="12941"/>
+        </a:xfrm>
+        <a:custGeom>
+          <a:avLst/>
+          <a:gdLst/>
+          <a:ahLst/>
+          <a:cxnLst/>
+          <a:rect l="0" t="0" r="0" b="0"/>
+          <a:pathLst>
+            <a:path>
+              <a:moveTo>
+                <a:pt x="0" y="6470"/>
+              </a:moveTo>
+              <a:lnTo>
+                <a:pt x="478590" y="6470"/>
+              </a:lnTo>
+            </a:path>
+          </a:pathLst>
+        </a:custGeom>
+        <a:noFill/>
+        <a:ln w="25400" cap="flat" cmpd="sng" algn="ctr">
+          <a:solidFill>
+            <a:schemeClr val="accent1">
+              <a:shade val="60000"/>
+              <a:hueOff val="0"/>
+              <a:satOff val="0"/>
+              <a:lumOff val="0"/>
+              <a:alphaOff val="0"/>
+            </a:schemeClr>
+          </a:solidFill>
+          <a:prstDash val="solid"/>
+        </a:ln>
+        <a:effectLst/>
+      </dsp:spPr>
+      <dsp:style>
+        <a:lnRef idx="2">
+          <a:scrgbClr r="0" g="0" b="0"/>
+        </a:lnRef>
+        <a:fillRef idx="0">
+          <a:scrgbClr r="0" g="0" b="0"/>
+        </a:fillRef>
+        <a:effectRef idx="0">
+          <a:scrgbClr r="0" g="0" b="0"/>
+        </a:effectRef>
+        <a:fontRef idx="minor"/>
+      </dsp:style>
+      <dsp:txBody>
+        <a:bodyPr spcFirstLastPara="0" vert="horz" wrap="square" lIns="12700" tIns="0" rIns="12700" bIns="0" numCol="1" spcCol="1270" anchor="ctr" anchorCtr="0">
+          <a:noAutofit/>
+        </a:bodyPr>
+        <a:lstStyle/>
+        <a:p>
+          <a:pPr lvl="0" algn="ctr" defTabSz="222250">
+            <a:lnSpc>
+              <a:spcPct val="90000"/>
+            </a:lnSpc>
+            <a:spcBef>
+              <a:spcPct val="0"/>
+            </a:spcBef>
+            <a:spcAft>
+              <a:spcPct val="35000"/>
+            </a:spcAft>
+          </a:pPr>
+          <a:endParaRPr lang="en-US" sz="500" kern="1200"/>
+        </a:p>
+      </dsp:txBody>
+      <dsp:txXfrm>
+        <a:off x="630483" y="1546257"/>
+        <a:ext cx="23929" cy="23929"/>
+      </dsp:txXfrm>
+    </dsp:sp>
+    <dsp:sp modelId="{250F3298-E4AA-4904-A12B-AAC232EBAA5C}">
+      <dsp:nvSpPr>
+        <dsp:cNvPr id="0" name=""/>
+        <dsp:cNvSpPr/>
+      </dsp:nvSpPr>
+      <dsp:spPr>
+        <a:xfrm>
+          <a:off x="704150" y="1644239"/>
+          <a:ext cx="580745" cy="290372"/>
+        </a:xfrm>
+        <a:prstGeom prst="roundRect">
+          <a:avLst>
+            <a:gd name="adj" fmla="val 10000"/>
+          </a:avLst>
+        </a:prstGeom>
+        <a:solidFill>
+          <a:schemeClr val="accent1">
+            <a:hueOff val="0"/>
+            <a:satOff val="0"/>
+            <a:lumOff val="0"/>
+            <a:alphaOff val="0"/>
+          </a:schemeClr>
+        </a:solidFill>
+        <a:ln w="25400" cap="flat" cmpd="sng" algn="ctr">
+          <a:solidFill>
+            <a:schemeClr val="lt1">
+              <a:hueOff val="0"/>
+              <a:satOff val="0"/>
+              <a:lumOff val="0"/>
+              <a:alphaOff val="0"/>
+            </a:schemeClr>
+          </a:solidFill>
+          <a:prstDash val="solid"/>
+        </a:ln>
+        <a:effectLst/>
+      </dsp:spPr>
+      <dsp:style>
+        <a:lnRef idx="2">
+          <a:scrgbClr r="0" g="0" b="0"/>
+        </a:lnRef>
+        <a:fillRef idx="1">
+          <a:scrgbClr r="0" g="0" b="0"/>
+        </a:fillRef>
+        <a:effectRef idx="0">
+          <a:scrgbClr r="0" g="0" b="0"/>
+        </a:effectRef>
+        <a:fontRef idx="minor">
+          <a:schemeClr val="lt1"/>
+        </a:fontRef>
+      </dsp:style>
+      <dsp:txBody>
+        <a:bodyPr spcFirstLastPara="0" vert="horz" wrap="square" lIns="3810" tIns="3810" rIns="3810" bIns="3810" numCol="1" spcCol="1270" anchor="ctr" anchorCtr="0">
+          <a:noAutofit/>
+        </a:bodyPr>
+        <a:lstStyle/>
+        <a:p>
+          <a:pPr lvl="0" algn="ctr" defTabSz="266700">
+            <a:lnSpc>
+              <a:spcPct val="90000"/>
+            </a:lnSpc>
+            <a:spcBef>
+              <a:spcPct val="0"/>
+            </a:spcBef>
+            <a:spcAft>
+              <a:spcPct val="35000"/>
+            </a:spcAft>
+          </a:pPr>
+          <a:r>
+            <a:rPr lang="en-US" sz="600" kern="1200" dirty="0" err="1" smtClean="0"/>
+            <a:t>src</a:t>
+          </a:r>
+          <a:endParaRPr lang="en-US" sz="600" kern="1200" dirty="0"/>
+        </a:p>
+      </dsp:txBody>
+      <dsp:txXfrm>
+        <a:off x="712655" y="1652744"/>
+        <a:ext cx="563735" cy="273362"/>
+      </dsp:txXfrm>
+    </dsp:sp>
+    <dsp:sp modelId="{500CC38C-370D-4E38-962F-8E689C001DB3}">
+      <dsp:nvSpPr>
+        <dsp:cNvPr id="0" name=""/>
+        <dsp:cNvSpPr/>
+      </dsp:nvSpPr>
+      <dsp:spPr>
+        <a:xfrm rot="1095096">
+          <a:off x="1276119" y="1837594"/>
+          <a:ext cx="348921" cy="12941"/>
+        </a:xfrm>
+        <a:custGeom>
+          <a:avLst/>
+          <a:gdLst/>
+          <a:ahLst/>
+          <a:cxnLst/>
+          <a:rect l="0" t="0" r="0" b="0"/>
+          <a:pathLst>
+            <a:path>
+              <a:moveTo>
+                <a:pt x="0" y="6470"/>
+              </a:moveTo>
+              <a:lnTo>
+                <a:pt x="348921" y="6470"/>
+              </a:lnTo>
+            </a:path>
+          </a:pathLst>
+        </a:custGeom>
+        <a:noFill/>
+        <a:ln w="25400" cap="flat" cmpd="sng" algn="ctr">
+          <a:solidFill>
+            <a:schemeClr val="accent1">
+              <a:shade val="80000"/>
+              <a:hueOff val="0"/>
+              <a:satOff val="0"/>
+              <a:lumOff val="0"/>
+              <a:alphaOff val="0"/>
+            </a:schemeClr>
+          </a:solidFill>
+          <a:prstDash val="solid"/>
+        </a:ln>
+        <a:effectLst/>
+      </dsp:spPr>
+      <dsp:style>
+        <a:lnRef idx="2">
+          <a:scrgbClr r="0" g="0" b="0"/>
+        </a:lnRef>
+        <a:fillRef idx="0">
+          <a:scrgbClr r="0" g="0" b="0"/>
+        </a:fillRef>
+        <a:effectRef idx="0">
+          <a:scrgbClr r="0" g="0" b="0"/>
+        </a:effectRef>
+        <a:fontRef idx="minor"/>
+      </dsp:style>
+      <dsp:txBody>
+        <a:bodyPr spcFirstLastPara="0" vert="horz" wrap="square" lIns="12700" tIns="0" rIns="12700" bIns="0" numCol="1" spcCol="1270" anchor="ctr" anchorCtr="0">
+          <a:noAutofit/>
+        </a:bodyPr>
+        <a:lstStyle/>
+        <a:p>
+          <a:pPr lvl="0" algn="ctr" defTabSz="222250">
+            <a:lnSpc>
+              <a:spcPct val="90000"/>
+            </a:lnSpc>
+            <a:spcBef>
+              <a:spcPct val="0"/>
+            </a:spcBef>
+            <a:spcAft>
+              <a:spcPct val="35000"/>
+            </a:spcAft>
+          </a:pPr>
+          <a:endParaRPr lang="en-US" sz="500" kern="1200"/>
+        </a:p>
+      </dsp:txBody>
+      <dsp:txXfrm>
+        <a:off x="1441857" y="1835342"/>
+        <a:ext cx="17446" cy="17446"/>
+      </dsp:txXfrm>
+    </dsp:sp>
+    <dsp:sp modelId="{88EDACE5-21AE-4482-B8C7-116CF3A27E99}">
+      <dsp:nvSpPr>
+        <dsp:cNvPr id="0" name=""/>
+        <dsp:cNvSpPr/>
+      </dsp:nvSpPr>
+      <dsp:spPr>
+        <a:xfrm>
+          <a:off x="1616264" y="1753518"/>
+          <a:ext cx="580745" cy="290372"/>
+        </a:xfrm>
+        <a:prstGeom prst="roundRect">
+          <a:avLst>
+            <a:gd name="adj" fmla="val 10000"/>
+          </a:avLst>
+        </a:prstGeom>
+        <a:solidFill>
+          <a:schemeClr val="accent1">
+            <a:hueOff val="0"/>
+            <a:satOff val="0"/>
+            <a:lumOff val="0"/>
+            <a:alphaOff val="0"/>
+          </a:schemeClr>
+        </a:solidFill>
+        <a:ln w="25400" cap="flat" cmpd="sng" algn="ctr">
+          <a:solidFill>
+            <a:schemeClr val="lt1">
+              <a:hueOff val="0"/>
+              <a:satOff val="0"/>
+              <a:lumOff val="0"/>
+              <a:alphaOff val="0"/>
+            </a:schemeClr>
+          </a:solidFill>
+          <a:prstDash val="solid"/>
+        </a:ln>
+        <a:effectLst/>
+      </dsp:spPr>
+      <dsp:style>
+        <a:lnRef idx="2">
+          <a:scrgbClr r="0" g="0" b="0"/>
+        </a:lnRef>
+        <a:fillRef idx="1">
+          <a:scrgbClr r="0" g="0" b="0"/>
+        </a:fillRef>
+        <a:effectRef idx="0">
+          <a:scrgbClr r="0" g="0" b="0"/>
+        </a:effectRef>
+        <a:fontRef idx="minor">
+          <a:schemeClr val="lt1"/>
+        </a:fontRef>
+      </dsp:style>
+      <dsp:txBody>
+        <a:bodyPr spcFirstLastPara="0" vert="horz" wrap="square" lIns="3810" tIns="3810" rIns="3810" bIns="3810" numCol="1" spcCol="1270" anchor="ctr" anchorCtr="0">
+          <a:noAutofit/>
+        </a:bodyPr>
+        <a:lstStyle/>
+        <a:p>
+          <a:pPr lvl="0" algn="ctr" defTabSz="266700">
+            <a:lnSpc>
+              <a:spcPct val="90000"/>
+            </a:lnSpc>
+            <a:spcBef>
+              <a:spcPct val="0"/>
+            </a:spcBef>
+            <a:spcAft>
+              <a:spcPct val="35000"/>
+            </a:spcAft>
+          </a:pPr>
+          <a:r>
+            <a:rPr lang="en-US" sz="600" kern="1200" dirty="0" err="1" smtClean="0"/>
+            <a:t>main.rkt</a:t>
+          </a:r>
+          <a:endParaRPr lang="en-US" sz="600" kern="1200" dirty="0"/>
+        </a:p>
+      </dsp:txBody>
+      <dsp:txXfrm>
+        <a:off x="1624769" y="1762023"/>
+        <a:ext cx="563735" cy="273362"/>
+      </dsp:txXfrm>
+    </dsp:sp>
+    <dsp:sp modelId="{5B061652-2171-4D39-8BCD-A835674795F1}">
+      <dsp:nvSpPr>
+        <dsp:cNvPr id="0" name=""/>
+        <dsp:cNvSpPr/>
+      </dsp:nvSpPr>
+      <dsp:spPr>
+        <a:xfrm rot="2929860">
+          <a:off x="1199767" y="1970485"/>
+          <a:ext cx="498239" cy="12941"/>
+        </a:xfrm>
+        <a:custGeom>
+          <a:avLst/>
+          <a:gdLst/>
+          <a:ahLst/>
+          <a:cxnLst/>
+          <a:rect l="0" t="0" r="0" b="0"/>
+          <a:pathLst>
+            <a:path>
+              <a:moveTo>
+                <a:pt x="0" y="6470"/>
+              </a:moveTo>
+              <a:lnTo>
+                <a:pt x="498239" y="6470"/>
+              </a:lnTo>
+            </a:path>
+          </a:pathLst>
+        </a:custGeom>
+        <a:noFill/>
+        <a:ln w="25400" cap="flat" cmpd="sng" algn="ctr">
+          <a:solidFill>
+            <a:schemeClr val="accent1">
+              <a:shade val="80000"/>
+              <a:hueOff val="0"/>
+              <a:satOff val="0"/>
+              <a:lumOff val="0"/>
+              <a:alphaOff val="0"/>
+            </a:schemeClr>
+          </a:solidFill>
+          <a:prstDash val="solid"/>
+        </a:ln>
+        <a:effectLst/>
+      </dsp:spPr>
+      <dsp:style>
+        <a:lnRef idx="2">
+          <a:scrgbClr r="0" g="0" b="0"/>
+        </a:lnRef>
+        <a:fillRef idx="0">
+          <a:scrgbClr r="0" g="0" b="0"/>
+        </a:fillRef>
+        <a:effectRef idx="0">
+          <a:scrgbClr r="0" g="0" b="0"/>
+        </a:effectRef>
+        <a:fontRef idx="minor"/>
+      </dsp:style>
+      <dsp:txBody>
+        <a:bodyPr spcFirstLastPara="0" vert="horz" wrap="square" lIns="12700" tIns="0" rIns="12700" bIns="0" numCol="1" spcCol="1270" anchor="ctr" anchorCtr="0">
+          <a:noAutofit/>
+        </a:bodyPr>
+        <a:lstStyle/>
+        <a:p>
+          <a:pPr lvl="0" algn="ctr" defTabSz="222250">
+            <a:lnSpc>
+              <a:spcPct val="90000"/>
+            </a:lnSpc>
+            <a:spcBef>
+              <a:spcPct val="0"/>
+            </a:spcBef>
+            <a:spcAft>
+              <a:spcPct val="35000"/>
+            </a:spcAft>
+          </a:pPr>
+          <a:endParaRPr lang="en-US" sz="500" kern="1200"/>
+        </a:p>
+      </dsp:txBody>
+      <dsp:txXfrm>
+        <a:off x="1436431" y="1964500"/>
+        <a:ext cx="24911" cy="24911"/>
+      </dsp:txXfrm>
+    </dsp:sp>
+    <dsp:sp modelId="{11F686DE-25FA-4C6B-B5BD-0426FD435EBF}">
+      <dsp:nvSpPr>
+        <dsp:cNvPr id="0" name=""/>
+        <dsp:cNvSpPr/>
+      </dsp:nvSpPr>
+      <dsp:spPr>
+        <a:xfrm>
+          <a:off x="1612878" y="2019300"/>
+          <a:ext cx="562963" cy="290372"/>
+        </a:xfrm>
+        <a:prstGeom prst="roundRect">
+          <a:avLst>
+            <a:gd name="adj" fmla="val 10000"/>
+          </a:avLst>
+        </a:prstGeom>
+        <a:solidFill>
+          <a:schemeClr val="accent1">
+            <a:hueOff val="0"/>
+            <a:satOff val="0"/>
+            <a:lumOff val="0"/>
+            <a:alphaOff val="0"/>
+          </a:schemeClr>
+        </a:solidFill>
+        <a:ln w="25400" cap="flat" cmpd="sng" algn="ctr">
+          <a:solidFill>
+            <a:schemeClr val="lt1">
+              <a:hueOff val="0"/>
+              <a:satOff val="0"/>
+              <a:lumOff val="0"/>
+              <a:alphaOff val="0"/>
+            </a:schemeClr>
+          </a:solidFill>
+          <a:prstDash val="solid"/>
+        </a:ln>
+        <a:effectLst/>
+      </dsp:spPr>
+      <dsp:style>
+        <a:lnRef idx="2">
+          <a:scrgbClr r="0" g="0" b="0"/>
+        </a:lnRef>
+        <a:fillRef idx="1">
+          <a:scrgbClr r="0" g="0" b="0"/>
+        </a:fillRef>
+        <a:effectRef idx="0">
+          <a:scrgbClr r="0" g="0" b="0"/>
+        </a:effectRef>
+        <a:fontRef idx="minor">
+          <a:schemeClr val="lt1"/>
+        </a:fontRef>
+      </dsp:style>
+      <dsp:txBody>
+        <a:bodyPr spcFirstLastPara="0" vert="horz" wrap="square" lIns="3810" tIns="3810" rIns="3810" bIns="3810" numCol="1" spcCol="1270" anchor="ctr" anchorCtr="0">
+          <a:noAutofit/>
+        </a:bodyPr>
+        <a:lstStyle/>
+        <a:p>
+          <a:pPr lvl="0" algn="ctr" defTabSz="266700">
+            <a:lnSpc>
+              <a:spcPct val="90000"/>
+            </a:lnSpc>
+            <a:spcBef>
+              <a:spcPct val="0"/>
+            </a:spcBef>
+            <a:spcAft>
+              <a:spcPct val="35000"/>
+            </a:spcAft>
+          </a:pPr>
+          <a:r>
+            <a:rPr lang="en-US" sz="600" kern="1200" dirty="0" smtClean="0"/>
+            <a:t>module1.rkt</a:t>
+          </a:r>
+          <a:endParaRPr lang="en-US" sz="600" kern="1200" dirty="0"/>
+        </a:p>
+      </dsp:txBody>
+      <dsp:txXfrm>
+        <a:off x="1621383" y="2027805"/>
+        <a:ext cx="545953" cy="273362"/>
+      </dsp:txXfrm>
+    </dsp:sp>
+    <dsp:sp modelId="{4D73C71E-89F8-46D7-ABCD-94CC477E1629}">
+      <dsp:nvSpPr>
+        <dsp:cNvPr id="0" name=""/>
+        <dsp:cNvSpPr/>
+      </dsp:nvSpPr>
+      <dsp:spPr>
+        <a:xfrm rot="3804751">
+          <a:off x="1082479" y="2110616"/>
+          <a:ext cx="732816" cy="12941"/>
+        </a:xfrm>
+        <a:custGeom>
+          <a:avLst/>
+          <a:gdLst/>
+          <a:ahLst/>
+          <a:cxnLst/>
+          <a:rect l="0" t="0" r="0" b="0"/>
+          <a:pathLst>
+            <a:path>
+              <a:moveTo>
+                <a:pt x="0" y="6470"/>
+              </a:moveTo>
+              <a:lnTo>
+                <a:pt x="732816" y="6470"/>
+              </a:lnTo>
+            </a:path>
+          </a:pathLst>
+        </a:custGeom>
+        <a:noFill/>
+        <a:ln w="25400" cap="flat" cmpd="sng" algn="ctr">
+          <a:solidFill>
+            <a:schemeClr val="accent1">
+              <a:shade val="80000"/>
+              <a:hueOff val="0"/>
+              <a:satOff val="0"/>
+              <a:lumOff val="0"/>
+              <a:alphaOff val="0"/>
+            </a:schemeClr>
+          </a:solidFill>
+          <a:prstDash val="solid"/>
+        </a:ln>
+        <a:effectLst/>
+      </dsp:spPr>
+      <dsp:style>
+        <a:lnRef idx="2">
+          <a:scrgbClr r="0" g="0" b="0"/>
+        </a:lnRef>
+        <a:fillRef idx="0">
+          <a:scrgbClr r="0" g="0" b="0"/>
+        </a:fillRef>
+        <a:effectRef idx="0">
+          <a:scrgbClr r="0" g="0" b="0"/>
+        </a:effectRef>
+        <a:fontRef idx="minor"/>
+      </dsp:style>
+      <dsp:txBody>
+        <a:bodyPr spcFirstLastPara="0" vert="horz" wrap="square" lIns="12700" tIns="0" rIns="12700" bIns="0" numCol="1" spcCol="1270" anchor="ctr" anchorCtr="0">
+          <a:noAutofit/>
+        </a:bodyPr>
+        <a:lstStyle/>
+        <a:p>
+          <a:pPr lvl="0" algn="ctr" defTabSz="222250">
+            <a:lnSpc>
+              <a:spcPct val="90000"/>
+            </a:lnSpc>
+            <a:spcBef>
+              <a:spcPct val="0"/>
+            </a:spcBef>
+            <a:spcAft>
+              <a:spcPct val="35000"/>
+            </a:spcAft>
+          </a:pPr>
+          <a:endParaRPr lang="en-US" sz="500" kern="1200"/>
+        </a:p>
+      </dsp:txBody>
+      <dsp:txXfrm>
+        <a:off x="1430567" y="2098767"/>
+        <a:ext cx="36640" cy="36640"/>
+      </dsp:txXfrm>
+    </dsp:sp>
+    <dsp:sp modelId="{2370C263-D04C-4203-963B-8F5DE028DD68}">
+      <dsp:nvSpPr>
+        <dsp:cNvPr id="0" name=""/>
+        <dsp:cNvSpPr/>
+      </dsp:nvSpPr>
+      <dsp:spPr>
+        <a:xfrm>
+          <a:off x="1612878" y="2299562"/>
+          <a:ext cx="580745" cy="290372"/>
+        </a:xfrm>
+        <a:prstGeom prst="roundRect">
+          <a:avLst>
+            <a:gd name="adj" fmla="val 10000"/>
+          </a:avLst>
+        </a:prstGeom>
+        <a:solidFill>
+          <a:schemeClr val="accent1">
+            <a:hueOff val="0"/>
+            <a:satOff val="0"/>
+            <a:lumOff val="0"/>
+            <a:alphaOff val="0"/>
+          </a:schemeClr>
+        </a:solidFill>
+        <a:ln w="25400" cap="flat" cmpd="sng" algn="ctr">
+          <a:solidFill>
+            <a:schemeClr val="lt1">
+              <a:hueOff val="0"/>
+              <a:satOff val="0"/>
+              <a:lumOff val="0"/>
+              <a:alphaOff val="0"/>
+            </a:schemeClr>
+          </a:solidFill>
+          <a:prstDash val="solid"/>
+        </a:ln>
+        <a:effectLst/>
+      </dsp:spPr>
+      <dsp:style>
+        <a:lnRef idx="2">
+          <a:scrgbClr r="0" g="0" b="0"/>
+        </a:lnRef>
+        <a:fillRef idx="1">
+          <a:scrgbClr r="0" g="0" b="0"/>
+        </a:fillRef>
+        <a:effectRef idx="0">
+          <a:scrgbClr r="0" g="0" b="0"/>
+        </a:effectRef>
+        <a:fontRef idx="minor">
+          <a:schemeClr val="lt1"/>
+        </a:fontRef>
+      </dsp:style>
+      <dsp:txBody>
+        <a:bodyPr spcFirstLastPara="0" vert="horz" wrap="square" lIns="3810" tIns="3810" rIns="3810" bIns="3810" numCol="1" spcCol="1270" anchor="ctr" anchorCtr="0">
+          <a:noAutofit/>
+        </a:bodyPr>
+        <a:lstStyle/>
+        <a:p>
+          <a:pPr lvl="0" algn="ctr" defTabSz="266700">
+            <a:lnSpc>
+              <a:spcPct val="90000"/>
+            </a:lnSpc>
+            <a:spcBef>
+              <a:spcPct val="0"/>
+            </a:spcBef>
+            <a:spcAft>
+              <a:spcPct val="35000"/>
+            </a:spcAft>
+          </a:pPr>
+          <a:r>
+            <a:rPr lang="en-US" sz="600" kern="1200" dirty="0" smtClean="0"/>
+            <a:t>module2.rkt</a:t>
+          </a:r>
+          <a:endParaRPr lang="en-US" sz="600" kern="1200" dirty="0"/>
+        </a:p>
+      </dsp:txBody>
+      <dsp:txXfrm>
+        <a:off x="1621383" y="2308067"/>
+        <a:ext cx="563735" cy="273362"/>
+      </dsp:txXfrm>
+    </dsp:sp>
+    <dsp:sp modelId="{58F4492D-8348-40AC-AEC6-55C7C3535C7C}">
+      <dsp:nvSpPr>
+        <dsp:cNvPr id="0" name=""/>
+        <dsp:cNvSpPr/>
+      </dsp:nvSpPr>
+      <dsp:spPr>
+        <a:xfrm rot="4240874">
+          <a:off x="953181" y="2250749"/>
+          <a:ext cx="991411" cy="12941"/>
+        </a:xfrm>
+        <a:custGeom>
+          <a:avLst/>
+          <a:gdLst/>
+          <a:ahLst/>
+          <a:cxnLst/>
+          <a:rect l="0" t="0" r="0" b="0"/>
+          <a:pathLst>
+            <a:path>
+              <a:moveTo>
+                <a:pt x="0" y="6470"/>
+              </a:moveTo>
+              <a:lnTo>
+                <a:pt x="991411" y="6470"/>
+              </a:lnTo>
+            </a:path>
+          </a:pathLst>
+        </a:custGeom>
+        <a:noFill/>
+        <a:ln w="25400" cap="flat" cmpd="sng" algn="ctr">
+          <a:solidFill>
+            <a:schemeClr val="accent1">
+              <a:shade val="80000"/>
+              <a:hueOff val="0"/>
+              <a:satOff val="0"/>
+              <a:lumOff val="0"/>
+              <a:alphaOff val="0"/>
+            </a:schemeClr>
+          </a:solidFill>
+          <a:prstDash val="solid"/>
+        </a:ln>
+        <a:effectLst/>
+      </dsp:spPr>
+      <dsp:style>
+        <a:lnRef idx="2">
+          <a:scrgbClr r="0" g="0" b="0"/>
+        </a:lnRef>
+        <a:fillRef idx="0">
+          <a:scrgbClr r="0" g="0" b="0"/>
+        </a:fillRef>
+        <a:effectRef idx="0">
+          <a:scrgbClr r="0" g="0" b="0"/>
+        </a:effectRef>
+        <a:fontRef idx="minor"/>
+      </dsp:style>
+      <dsp:txBody>
+        <a:bodyPr spcFirstLastPara="0" vert="horz" wrap="square" lIns="12700" tIns="0" rIns="12700" bIns="0" numCol="1" spcCol="1270" anchor="ctr" anchorCtr="0">
+          <a:noAutofit/>
+        </a:bodyPr>
+        <a:lstStyle/>
+        <a:p>
+          <a:pPr lvl="0" algn="ctr" defTabSz="222250">
+            <a:lnSpc>
+              <a:spcPct val="90000"/>
+            </a:lnSpc>
+            <a:spcBef>
+              <a:spcPct val="0"/>
+            </a:spcBef>
+            <a:spcAft>
+              <a:spcPct val="35000"/>
+            </a:spcAft>
+          </a:pPr>
+          <a:endParaRPr lang="en-US" sz="500" kern="1200"/>
+        </a:p>
+      </dsp:txBody>
+      <dsp:txXfrm>
+        <a:off x="1424102" y="2232434"/>
+        <a:ext cx="49570" cy="49570"/>
+      </dsp:txXfrm>
+    </dsp:sp>
+    <dsp:sp modelId="{3E4CFFF9-FD55-47C7-9E6D-F0C6A9412ADB}">
+      <dsp:nvSpPr>
+        <dsp:cNvPr id="0" name=""/>
+        <dsp:cNvSpPr/>
+      </dsp:nvSpPr>
+      <dsp:spPr>
+        <a:xfrm>
+          <a:off x="1612878" y="2579827"/>
+          <a:ext cx="580745" cy="290372"/>
+        </a:xfrm>
+        <a:prstGeom prst="roundRect">
+          <a:avLst>
+            <a:gd name="adj" fmla="val 10000"/>
+          </a:avLst>
+        </a:prstGeom>
+        <a:solidFill>
+          <a:schemeClr val="accent1">
+            <a:hueOff val="0"/>
+            <a:satOff val="0"/>
+            <a:lumOff val="0"/>
+            <a:alphaOff val="0"/>
+          </a:schemeClr>
+        </a:solidFill>
+        <a:ln w="25400" cap="flat" cmpd="sng" algn="ctr">
+          <a:solidFill>
+            <a:schemeClr val="lt1">
+              <a:hueOff val="0"/>
+              <a:satOff val="0"/>
+              <a:lumOff val="0"/>
+              <a:alphaOff val="0"/>
+            </a:schemeClr>
+          </a:solidFill>
+          <a:prstDash val="solid"/>
+        </a:ln>
+        <a:effectLst/>
+      </dsp:spPr>
+      <dsp:style>
+        <a:lnRef idx="2">
+          <a:scrgbClr r="0" g="0" b="0"/>
+        </a:lnRef>
+        <a:fillRef idx="1">
+          <a:scrgbClr r="0" g="0" b="0"/>
+        </a:fillRef>
+        <a:effectRef idx="0">
+          <a:scrgbClr r="0" g="0" b="0"/>
+        </a:effectRef>
+        <a:fontRef idx="minor">
+          <a:schemeClr val="lt1"/>
+        </a:fontRef>
+      </dsp:style>
+      <dsp:txBody>
+        <a:bodyPr spcFirstLastPara="0" vert="horz" wrap="square" lIns="3810" tIns="3810" rIns="3810" bIns="3810" numCol="1" spcCol="1270" anchor="ctr" anchorCtr="0">
+          <a:noAutofit/>
+        </a:bodyPr>
+        <a:lstStyle/>
+        <a:p>
+          <a:pPr lvl="0" algn="ctr" defTabSz="266700">
+            <a:lnSpc>
+              <a:spcPct val="90000"/>
+            </a:lnSpc>
+            <a:spcBef>
+              <a:spcPct val="0"/>
+            </a:spcBef>
+            <a:spcAft>
+              <a:spcPct val="35000"/>
+            </a:spcAft>
+          </a:pPr>
+          <a:r>
+            <a:rPr lang="en-US" sz="600" kern="1200" dirty="0" smtClean="0"/>
+            <a:t>module3.rkt</a:t>
+          </a:r>
+          <a:endParaRPr lang="en-US" sz="600" kern="1200" dirty="0"/>
+        </a:p>
+      </dsp:txBody>
+      <dsp:txXfrm>
+        <a:off x="1621383" y="2588332"/>
+        <a:ext cx="563735" cy="273362"/>
+      </dsp:txXfrm>
+    </dsp:sp>
   </dsp:spTree>
 </dsp:drawing>
 </file>
@@ -12862,6 +14205,1349 @@
       <dsp:cNvGrpSpPr/>
     </dsp:nvGrpSpPr>
     <dsp:grpSpPr/>
+    <dsp:sp modelId="{751A64B2-AA1B-4610-90F2-2585F0A6A46F}">
+      <dsp:nvSpPr>
+        <dsp:cNvPr id="0" name=""/>
+        <dsp:cNvSpPr/>
+      </dsp:nvSpPr>
+      <dsp:spPr>
+        <a:xfrm>
+          <a:off x="0" y="1181832"/>
+          <a:ext cx="580745" cy="290372"/>
+        </a:xfrm>
+        <a:prstGeom prst="roundRect">
+          <a:avLst>
+            <a:gd name="adj" fmla="val 10000"/>
+          </a:avLst>
+        </a:prstGeom>
+        <a:solidFill>
+          <a:schemeClr val="accent1">
+            <a:hueOff val="0"/>
+            <a:satOff val="0"/>
+            <a:lumOff val="0"/>
+            <a:alphaOff val="0"/>
+          </a:schemeClr>
+        </a:solidFill>
+        <a:ln w="25400" cap="flat" cmpd="sng" algn="ctr">
+          <a:solidFill>
+            <a:schemeClr val="lt1">
+              <a:hueOff val="0"/>
+              <a:satOff val="0"/>
+              <a:lumOff val="0"/>
+              <a:alphaOff val="0"/>
+            </a:schemeClr>
+          </a:solidFill>
+          <a:prstDash val="solid"/>
+        </a:ln>
+        <a:effectLst/>
+      </dsp:spPr>
+      <dsp:style>
+        <a:lnRef idx="2">
+          <a:scrgbClr r="0" g="0" b="0"/>
+        </a:lnRef>
+        <a:fillRef idx="1">
+          <a:scrgbClr r="0" g="0" b="0"/>
+        </a:fillRef>
+        <a:effectRef idx="0">
+          <a:scrgbClr r="0" g="0" b="0"/>
+        </a:effectRef>
+        <a:fontRef idx="minor">
+          <a:schemeClr val="lt1"/>
+        </a:fontRef>
+      </dsp:style>
+      <dsp:txBody>
+        <a:bodyPr spcFirstLastPara="0" vert="horz" wrap="square" lIns="3810" tIns="3810" rIns="3810" bIns="3810" numCol="1" spcCol="1270" anchor="ctr" anchorCtr="0">
+          <a:noAutofit/>
+        </a:bodyPr>
+        <a:lstStyle/>
+        <a:p>
+          <a:pPr lvl="0" algn="ctr" defTabSz="266700">
+            <a:lnSpc>
+              <a:spcPct val="90000"/>
+            </a:lnSpc>
+            <a:spcBef>
+              <a:spcPct val="0"/>
+            </a:spcBef>
+            <a:spcAft>
+              <a:spcPct val="35000"/>
+            </a:spcAft>
+          </a:pPr>
+          <a:r>
+            <a:rPr lang="en-US" sz="600" kern="1200" dirty="0" smtClean="0"/>
+            <a:t>my-project</a:t>
+          </a:r>
+          <a:endParaRPr lang="en-US" sz="600" kern="1200" dirty="0"/>
+        </a:p>
+      </dsp:txBody>
+      <dsp:txXfrm>
+        <a:off x="8505" y="1190337"/>
+        <a:ext cx="563735" cy="273362"/>
+      </dsp:txXfrm>
+    </dsp:sp>
+    <dsp:sp modelId="{27E9DFBA-38D9-4890-81CD-E6DD6F1BD76C}">
+      <dsp:nvSpPr>
+        <dsp:cNvPr id="0" name=""/>
+        <dsp:cNvSpPr/>
+      </dsp:nvSpPr>
+      <dsp:spPr>
+        <a:xfrm>
+          <a:off x="580745" y="1320547"/>
+          <a:ext cx="123404" cy="12941"/>
+        </a:xfrm>
+        <a:custGeom>
+          <a:avLst/>
+          <a:gdLst/>
+          <a:ahLst/>
+          <a:cxnLst/>
+          <a:rect l="0" t="0" r="0" b="0"/>
+          <a:pathLst>
+            <a:path>
+              <a:moveTo>
+                <a:pt x="0" y="6470"/>
+              </a:moveTo>
+              <a:lnTo>
+                <a:pt x="123404" y="6470"/>
+              </a:lnTo>
+            </a:path>
+          </a:pathLst>
+        </a:custGeom>
+        <a:noFill/>
+        <a:ln w="25400" cap="flat" cmpd="sng" algn="ctr">
+          <a:solidFill>
+            <a:schemeClr val="accent1">
+              <a:shade val="60000"/>
+              <a:hueOff val="0"/>
+              <a:satOff val="0"/>
+              <a:lumOff val="0"/>
+              <a:alphaOff val="0"/>
+            </a:schemeClr>
+          </a:solidFill>
+          <a:prstDash val="solid"/>
+        </a:ln>
+        <a:effectLst/>
+      </dsp:spPr>
+      <dsp:style>
+        <a:lnRef idx="2">
+          <a:scrgbClr r="0" g="0" b="0"/>
+        </a:lnRef>
+        <a:fillRef idx="0">
+          <a:scrgbClr r="0" g="0" b="0"/>
+        </a:fillRef>
+        <a:effectRef idx="0">
+          <a:scrgbClr r="0" g="0" b="0"/>
+        </a:effectRef>
+        <a:fontRef idx="minor"/>
+      </dsp:style>
+      <dsp:txBody>
+        <a:bodyPr spcFirstLastPara="0" vert="horz" wrap="square" lIns="12700" tIns="0" rIns="12700" bIns="0" numCol="1" spcCol="1270" anchor="ctr" anchorCtr="0">
+          <a:noAutofit/>
+        </a:bodyPr>
+        <a:lstStyle/>
+        <a:p>
+          <a:pPr lvl="0" algn="ctr" defTabSz="222250">
+            <a:lnSpc>
+              <a:spcPct val="90000"/>
+            </a:lnSpc>
+            <a:spcBef>
+              <a:spcPct val="0"/>
+            </a:spcBef>
+            <a:spcAft>
+              <a:spcPct val="35000"/>
+            </a:spcAft>
+          </a:pPr>
+          <a:endParaRPr lang="en-US" sz="500" kern="1200"/>
+        </a:p>
+      </dsp:txBody>
+      <dsp:txXfrm>
+        <a:off x="639363" y="1323933"/>
+        <a:ext cx="6170" cy="6170"/>
+      </dsp:txXfrm>
+    </dsp:sp>
+    <dsp:sp modelId="{CD21181F-0FF4-4082-92C6-4A9B73A74EDB}">
+      <dsp:nvSpPr>
+        <dsp:cNvPr id="0" name=""/>
+        <dsp:cNvSpPr/>
+      </dsp:nvSpPr>
+      <dsp:spPr>
+        <a:xfrm>
+          <a:off x="704150" y="1181832"/>
+          <a:ext cx="580745" cy="290372"/>
+        </a:xfrm>
+        <a:prstGeom prst="roundRect">
+          <a:avLst>
+            <a:gd name="adj" fmla="val 10000"/>
+          </a:avLst>
+        </a:prstGeom>
+        <a:solidFill>
+          <a:schemeClr val="accent1">
+            <a:hueOff val="0"/>
+            <a:satOff val="0"/>
+            <a:lumOff val="0"/>
+            <a:alphaOff val="0"/>
+          </a:schemeClr>
+        </a:solidFill>
+        <a:ln w="25400" cap="flat" cmpd="sng" algn="ctr">
+          <a:solidFill>
+            <a:schemeClr val="lt1">
+              <a:hueOff val="0"/>
+              <a:satOff val="0"/>
+              <a:lumOff val="0"/>
+              <a:alphaOff val="0"/>
+            </a:schemeClr>
+          </a:solidFill>
+          <a:prstDash val="solid"/>
+        </a:ln>
+        <a:effectLst/>
+      </dsp:spPr>
+      <dsp:style>
+        <a:lnRef idx="2">
+          <a:scrgbClr r="0" g="0" b="0"/>
+        </a:lnRef>
+        <a:fillRef idx="1">
+          <a:scrgbClr r="0" g="0" b="0"/>
+        </a:fillRef>
+        <a:effectRef idx="0">
+          <a:scrgbClr r="0" g="0" b="0"/>
+        </a:effectRef>
+        <a:fontRef idx="minor">
+          <a:schemeClr val="lt1"/>
+        </a:fontRef>
+      </dsp:style>
+      <dsp:txBody>
+        <a:bodyPr spcFirstLastPara="0" vert="horz" wrap="square" lIns="3810" tIns="3810" rIns="3810" bIns="3810" numCol="1" spcCol="1270" anchor="ctr" anchorCtr="0">
+          <a:noAutofit/>
+        </a:bodyPr>
+        <a:lstStyle/>
+        <a:p>
+          <a:pPr lvl="0" algn="ctr" defTabSz="266700">
+            <a:lnSpc>
+              <a:spcPct val="90000"/>
+            </a:lnSpc>
+            <a:spcBef>
+              <a:spcPct val="0"/>
+            </a:spcBef>
+            <a:spcAft>
+              <a:spcPct val="35000"/>
+            </a:spcAft>
+          </a:pPr>
+          <a:r>
+            <a:rPr lang="en-US" sz="600" kern="1200" dirty="0" smtClean="0"/>
+            <a:t>docs</a:t>
+          </a:r>
+          <a:endParaRPr lang="en-US" sz="600" kern="1200" dirty="0"/>
+        </a:p>
+      </dsp:txBody>
+      <dsp:txXfrm>
+        <a:off x="712655" y="1190337"/>
+        <a:ext cx="563735" cy="273362"/>
+      </dsp:txXfrm>
+    </dsp:sp>
+    <dsp:sp modelId="{22C8D88C-9200-449A-95CA-C6C951FF9EFA}">
+      <dsp:nvSpPr>
+        <dsp:cNvPr id="0" name=""/>
+        <dsp:cNvSpPr/>
+      </dsp:nvSpPr>
+      <dsp:spPr>
+        <a:xfrm rot="21292818">
+          <a:off x="1284207" y="1305134"/>
+          <a:ext cx="345441" cy="12941"/>
+        </a:xfrm>
+        <a:custGeom>
+          <a:avLst/>
+          <a:gdLst/>
+          <a:ahLst/>
+          <a:cxnLst/>
+          <a:rect l="0" t="0" r="0" b="0"/>
+          <a:pathLst>
+            <a:path>
+              <a:moveTo>
+                <a:pt x="0" y="6470"/>
+              </a:moveTo>
+              <a:lnTo>
+                <a:pt x="345441" y="6470"/>
+              </a:lnTo>
+            </a:path>
+          </a:pathLst>
+        </a:custGeom>
+        <a:noFill/>
+        <a:ln w="25400" cap="flat" cmpd="sng" algn="ctr">
+          <a:solidFill>
+            <a:schemeClr val="accent1">
+              <a:shade val="80000"/>
+              <a:hueOff val="0"/>
+              <a:satOff val="0"/>
+              <a:lumOff val="0"/>
+              <a:alphaOff val="0"/>
+            </a:schemeClr>
+          </a:solidFill>
+          <a:prstDash val="solid"/>
+        </a:ln>
+        <a:effectLst/>
+      </dsp:spPr>
+      <dsp:style>
+        <a:lnRef idx="2">
+          <a:scrgbClr r="0" g="0" b="0"/>
+        </a:lnRef>
+        <a:fillRef idx="0">
+          <a:scrgbClr r="0" g="0" b="0"/>
+        </a:fillRef>
+        <a:effectRef idx="0">
+          <a:scrgbClr r="0" g="0" b="0"/>
+        </a:effectRef>
+        <a:fontRef idx="minor"/>
+      </dsp:style>
+      <dsp:txBody>
+        <a:bodyPr spcFirstLastPara="0" vert="horz" wrap="square" lIns="12700" tIns="0" rIns="12700" bIns="0" numCol="1" spcCol="1270" anchor="ctr" anchorCtr="0">
+          <a:noAutofit/>
+        </a:bodyPr>
+        <a:lstStyle/>
+        <a:p>
+          <a:pPr lvl="0" algn="ctr" defTabSz="222250">
+            <a:lnSpc>
+              <a:spcPct val="90000"/>
+            </a:lnSpc>
+            <a:spcBef>
+              <a:spcPct val="0"/>
+            </a:spcBef>
+            <a:spcAft>
+              <a:spcPct val="35000"/>
+            </a:spcAft>
+          </a:pPr>
+          <a:endParaRPr lang="en-US" sz="500" kern="1200"/>
+        </a:p>
+      </dsp:txBody>
+      <dsp:txXfrm>
+        <a:off x="1448291" y="1302969"/>
+        <a:ext cx="17272" cy="17272"/>
+      </dsp:txXfrm>
+    </dsp:sp>
+    <dsp:sp modelId="{15AA3F71-DF63-44F2-A3BA-35AE6A6DBF7D}">
+      <dsp:nvSpPr>
+        <dsp:cNvPr id="0" name=""/>
+        <dsp:cNvSpPr/>
+      </dsp:nvSpPr>
+      <dsp:spPr>
+        <a:xfrm>
+          <a:off x="1628959" y="1151006"/>
+          <a:ext cx="580745" cy="290372"/>
+        </a:xfrm>
+        <a:prstGeom prst="roundRect">
+          <a:avLst>
+            <a:gd name="adj" fmla="val 10000"/>
+          </a:avLst>
+        </a:prstGeom>
+        <a:solidFill>
+          <a:schemeClr val="accent1">
+            <a:hueOff val="0"/>
+            <a:satOff val="0"/>
+            <a:lumOff val="0"/>
+            <a:alphaOff val="0"/>
+          </a:schemeClr>
+        </a:solidFill>
+        <a:ln w="25400" cap="flat" cmpd="sng" algn="ctr">
+          <a:solidFill>
+            <a:schemeClr val="lt1">
+              <a:hueOff val="0"/>
+              <a:satOff val="0"/>
+              <a:lumOff val="0"/>
+              <a:alphaOff val="0"/>
+            </a:schemeClr>
+          </a:solidFill>
+          <a:prstDash val="solid"/>
+        </a:ln>
+        <a:effectLst/>
+      </dsp:spPr>
+      <dsp:style>
+        <a:lnRef idx="2">
+          <a:scrgbClr r="0" g="0" b="0"/>
+        </a:lnRef>
+        <a:fillRef idx="1">
+          <a:scrgbClr r="0" g="0" b="0"/>
+        </a:fillRef>
+        <a:effectRef idx="0">
+          <a:scrgbClr r="0" g="0" b="0"/>
+        </a:effectRef>
+        <a:fontRef idx="minor">
+          <a:schemeClr val="lt1"/>
+        </a:fontRef>
+      </dsp:style>
+      <dsp:txBody>
+        <a:bodyPr spcFirstLastPara="0" vert="horz" wrap="square" lIns="3810" tIns="3810" rIns="3810" bIns="3810" numCol="1" spcCol="1270" anchor="ctr" anchorCtr="0">
+          <a:noAutofit/>
+        </a:bodyPr>
+        <a:lstStyle/>
+        <a:p>
+          <a:pPr lvl="0" algn="ctr" defTabSz="266700">
+            <a:lnSpc>
+              <a:spcPct val="90000"/>
+            </a:lnSpc>
+            <a:spcBef>
+              <a:spcPct val="0"/>
+            </a:spcBef>
+            <a:spcAft>
+              <a:spcPct val="35000"/>
+            </a:spcAft>
+          </a:pPr>
+          <a:r>
+            <a:rPr lang="en-US" sz="600" kern="1200" dirty="0" smtClean="0"/>
+            <a:t>manual.docx</a:t>
+          </a:r>
+          <a:endParaRPr lang="en-US" sz="600" kern="1200" dirty="0"/>
+        </a:p>
+      </dsp:txBody>
+      <dsp:txXfrm>
+        <a:off x="1637464" y="1159511"/>
+        <a:ext cx="563735" cy="273362"/>
+      </dsp:txXfrm>
+    </dsp:sp>
+    <dsp:sp modelId="{DF8ACA11-A784-4636-BE9F-ADD52C706CBC}">
+      <dsp:nvSpPr>
+        <dsp:cNvPr id="0" name=""/>
+        <dsp:cNvSpPr/>
+      </dsp:nvSpPr>
+      <dsp:spPr>
+        <a:xfrm rot="2156824">
+          <a:off x="1245225" y="1442834"/>
+          <a:ext cx="416621" cy="12941"/>
+        </a:xfrm>
+        <a:custGeom>
+          <a:avLst/>
+          <a:gdLst/>
+          <a:ahLst/>
+          <a:cxnLst/>
+          <a:rect l="0" t="0" r="0" b="0"/>
+          <a:pathLst>
+            <a:path>
+              <a:moveTo>
+                <a:pt x="0" y="6470"/>
+              </a:moveTo>
+              <a:lnTo>
+                <a:pt x="416621" y="6470"/>
+              </a:lnTo>
+            </a:path>
+          </a:pathLst>
+        </a:custGeom>
+        <a:noFill/>
+        <a:ln w="25400" cap="flat" cmpd="sng" algn="ctr">
+          <a:solidFill>
+            <a:schemeClr val="accent1">
+              <a:shade val="80000"/>
+              <a:hueOff val="0"/>
+              <a:satOff val="0"/>
+              <a:lumOff val="0"/>
+              <a:alphaOff val="0"/>
+            </a:schemeClr>
+          </a:solidFill>
+          <a:prstDash val="solid"/>
+        </a:ln>
+        <a:effectLst/>
+      </dsp:spPr>
+      <dsp:style>
+        <a:lnRef idx="2">
+          <a:scrgbClr r="0" g="0" b="0"/>
+        </a:lnRef>
+        <a:fillRef idx="0">
+          <a:scrgbClr r="0" g="0" b="0"/>
+        </a:fillRef>
+        <a:effectRef idx="0">
+          <a:scrgbClr r="0" g="0" b="0"/>
+        </a:effectRef>
+        <a:fontRef idx="minor"/>
+      </dsp:style>
+      <dsp:txBody>
+        <a:bodyPr spcFirstLastPara="0" vert="horz" wrap="square" lIns="12700" tIns="0" rIns="12700" bIns="0" numCol="1" spcCol="1270" anchor="ctr" anchorCtr="0">
+          <a:noAutofit/>
+        </a:bodyPr>
+        <a:lstStyle/>
+        <a:p>
+          <a:pPr lvl="0" algn="ctr" defTabSz="222250">
+            <a:lnSpc>
+              <a:spcPct val="90000"/>
+            </a:lnSpc>
+            <a:spcBef>
+              <a:spcPct val="0"/>
+            </a:spcBef>
+            <a:spcAft>
+              <a:spcPct val="35000"/>
+            </a:spcAft>
+          </a:pPr>
+          <a:endParaRPr lang="en-US" sz="500" kern="1200"/>
+        </a:p>
+      </dsp:txBody>
+      <dsp:txXfrm>
+        <a:off x="1443120" y="1438889"/>
+        <a:ext cx="20831" cy="20831"/>
+      </dsp:txXfrm>
+    </dsp:sp>
+    <dsp:sp modelId="{2CE1C545-78E0-47B5-8C72-53A9EE24CD60}">
+      <dsp:nvSpPr>
+        <dsp:cNvPr id="0" name=""/>
+        <dsp:cNvSpPr/>
+      </dsp:nvSpPr>
+      <dsp:spPr>
+        <a:xfrm>
+          <a:off x="1622176" y="1426404"/>
+          <a:ext cx="580745" cy="290372"/>
+        </a:xfrm>
+        <a:prstGeom prst="roundRect">
+          <a:avLst>
+            <a:gd name="adj" fmla="val 10000"/>
+          </a:avLst>
+        </a:prstGeom>
+        <a:solidFill>
+          <a:schemeClr val="accent1">
+            <a:hueOff val="0"/>
+            <a:satOff val="0"/>
+            <a:lumOff val="0"/>
+            <a:alphaOff val="0"/>
+          </a:schemeClr>
+        </a:solidFill>
+        <a:ln w="25400" cap="flat" cmpd="sng" algn="ctr">
+          <a:solidFill>
+            <a:schemeClr val="lt1">
+              <a:hueOff val="0"/>
+              <a:satOff val="0"/>
+              <a:lumOff val="0"/>
+              <a:alphaOff val="0"/>
+            </a:schemeClr>
+          </a:solidFill>
+          <a:prstDash val="solid"/>
+        </a:ln>
+        <a:effectLst/>
+      </dsp:spPr>
+      <dsp:style>
+        <a:lnRef idx="2">
+          <a:scrgbClr r="0" g="0" b="0"/>
+        </a:lnRef>
+        <a:fillRef idx="1">
+          <a:scrgbClr r="0" g="0" b="0"/>
+        </a:fillRef>
+        <a:effectRef idx="0">
+          <a:scrgbClr r="0" g="0" b="0"/>
+        </a:effectRef>
+        <a:fontRef idx="minor">
+          <a:schemeClr val="lt1"/>
+        </a:fontRef>
+      </dsp:style>
+      <dsp:txBody>
+        <a:bodyPr spcFirstLastPara="0" vert="horz" wrap="square" lIns="3810" tIns="3810" rIns="3810" bIns="3810" numCol="1" spcCol="1270" anchor="ctr" anchorCtr="0">
+          <a:noAutofit/>
+        </a:bodyPr>
+        <a:lstStyle/>
+        <a:p>
+          <a:pPr lvl="0" algn="ctr" defTabSz="266700">
+            <a:lnSpc>
+              <a:spcPct val="90000"/>
+            </a:lnSpc>
+            <a:spcBef>
+              <a:spcPct val="0"/>
+            </a:spcBef>
+            <a:spcAft>
+              <a:spcPct val="35000"/>
+            </a:spcAft>
+          </a:pPr>
+          <a:r>
+            <a:rPr lang="en-US" sz="600" kern="1200" dirty="0" smtClean="0"/>
+            <a:t>user_docs.docx</a:t>
+          </a:r>
+          <a:endParaRPr lang="en-US" sz="600" kern="1200" dirty="0"/>
+        </a:p>
+      </dsp:txBody>
+      <dsp:txXfrm>
+        <a:off x="1630681" y="1434909"/>
+        <a:ext cx="563735" cy="273362"/>
+      </dsp:txXfrm>
+    </dsp:sp>
+    <dsp:sp modelId="{37DFA971-3BDD-4614-B3F4-FCCCA928E801}">
+      <dsp:nvSpPr>
+        <dsp:cNvPr id="0" name=""/>
+        <dsp:cNvSpPr/>
+      </dsp:nvSpPr>
+      <dsp:spPr>
+        <a:xfrm rot="4503450">
+          <a:off x="403152" y="1551751"/>
+          <a:ext cx="478590" cy="12941"/>
+        </a:xfrm>
+        <a:custGeom>
+          <a:avLst/>
+          <a:gdLst/>
+          <a:ahLst/>
+          <a:cxnLst/>
+          <a:rect l="0" t="0" r="0" b="0"/>
+          <a:pathLst>
+            <a:path>
+              <a:moveTo>
+                <a:pt x="0" y="6470"/>
+              </a:moveTo>
+              <a:lnTo>
+                <a:pt x="478590" y="6470"/>
+              </a:lnTo>
+            </a:path>
+          </a:pathLst>
+        </a:custGeom>
+        <a:noFill/>
+        <a:ln w="25400" cap="flat" cmpd="sng" algn="ctr">
+          <a:solidFill>
+            <a:schemeClr val="accent1">
+              <a:shade val="60000"/>
+              <a:hueOff val="0"/>
+              <a:satOff val="0"/>
+              <a:lumOff val="0"/>
+              <a:alphaOff val="0"/>
+            </a:schemeClr>
+          </a:solidFill>
+          <a:prstDash val="solid"/>
+        </a:ln>
+        <a:effectLst/>
+      </dsp:spPr>
+      <dsp:style>
+        <a:lnRef idx="2">
+          <a:scrgbClr r="0" g="0" b="0"/>
+        </a:lnRef>
+        <a:fillRef idx="0">
+          <a:scrgbClr r="0" g="0" b="0"/>
+        </a:fillRef>
+        <a:effectRef idx="0">
+          <a:scrgbClr r="0" g="0" b="0"/>
+        </a:effectRef>
+        <a:fontRef idx="minor"/>
+      </dsp:style>
+      <dsp:txBody>
+        <a:bodyPr spcFirstLastPara="0" vert="horz" wrap="square" lIns="12700" tIns="0" rIns="12700" bIns="0" numCol="1" spcCol="1270" anchor="ctr" anchorCtr="0">
+          <a:noAutofit/>
+        </a:bodyPr>
+        <a:lstStyle/>
+        <a:p>
+          <a:pPr lvl="0" algn="ctr" defTabSz="222250">
+            <a:lnSpc>
+              <a:spcPct val="90000"/>
+            </a:lnSpc>
+            <a:spcBef>
+              <a:spcPct val="0"/>
+            </a:spcBef>
+            <a:spcAft>
+              <a:spcPct val="35000"/>
+            </a:spcAft>
+          </a:pPr>
+          <a:endParaRPr lang="en-US" sz="500" kern="1200"/>
+        </a:p>
+      </dsp:txBody>
+      <dsp:txXfrm>
+        <a:off x="630483" y="1546257"/>
+        <a:ext cx="23929" cy="23929"/>
+      </dsp:txXfrm>
+    </dsp:sp>
+    <dsp:sp modelId="{250F3298-E4AA-4904-A12B-AAC232EBAA5C}">
+      <dsp:nvSpPr>
+        <dsp:cNvPr id="0" name=""/>
+        <dsp:cNvSpPr/>
+      </dsp:nvSpPr>
+      <dsp:spPr>
+        <a:xfrm>
+          <a:off x="704150" y="1644239"/>
+          <a:ext cx="580745" cy="290372"/>
+        </a:xfrm>
+        <a:prstGeom prst="roundRect">
+          <a:avLst>
+            <a:gd name="adj" fmla="val 10000"/>
+          </a:avLst>
+        </a:prstGeom>
+        <a:solidFill>
+          <a:schemeClr val="accent1">
+            <a:hueOff val="0"/>
+            <a:satOff val="0"/>
+            <a:lumOff val="0"/>
+            <a:alphaOff val="0"/>
+          </a:schemeClr>
+        </a:solidFill>
+        <a:ln w="25400" cap="flat" cmpd="sng" algn="ctr">
+          <a:solidFill>
+            <a:schemeClr val="lt1">
+              <a:hueOff val="0"/>
+              <a:satOff val="0"/>
+              <a:lumOff val="0"/>
+              <a:alphaOff val="0"/>
+            </a:schemeClr>
+          </a:solidFill>
+          <a:prstDash val="solid"/>
+        </a:ln>
+        <a:effectLst/>
+      </dsp:spPr>
+      <dsp:style>
+        <a:lnRef idx="2">
+          <a:scrgbClr r="0" g="0" b="0"/>
+        </a:lnRef>
+        <a:fillRef idx="1">
+          <a:scrgbClr r="0" g="0" b="0"/>
+        </a:fillRef>
+        <a:effectRef idx="0">
+          <a:scrgbClr r="0" g="0" b="0"/>
+        </a:effectRef>
+        <a:fontRef idx="minor">
+          <a:schemeClr val="lt1"/>
+        </a:fontRef>
+      </dsp:style>
+      <dsp:txBody>
+        <a:bodyPr spcFirstLastPara="0" vert="horz" wrap="square" lIns="3810" tIns="3810" rIns="3810" bIns="3810" numCol="1" spcCol="1270" anchor="ctr" anchorCtr="0">
+          <a:noAutofit/>
+        </a:bodyPr>
+        <a:lstStyle/>
+        <a:p>
+          <a:pPr lvl="0" algn="ctr" defTabSz="266700">
+            <a:lnSpc>
+              <a:spcPct val="90000"/>
+            </a:lnSpc>
+            <a:spcBef>
+              <a:spcPct val="0"/>
+            </a:spcBef>
+            <a:spcAft>
+              <a:spcPct val="35000"/>
+            </a:spcAft>
+          </a:pPr>
+          <a:r>
+            <a:rPr lang="en-US" sz="600" kern="1200" dirty="0" err="1" smtClean="0"/>
+            <a:t>src</a:t>
+          </a:r>
+          <a:endParaRPr lang="en-US" sz="600" kern="1200" dirty="0"/>
+        </a:p>
+      </dsp:txBody>
+      <dsp:txXfrm>
+        <a:off x="712655" y="1652744"/>
+        <a:ext cx="563735" cy="273362"/>
+      </dsp:txXfrm>
+    </dsp:sp>
+    <dsp:sp modelId="{500CC38C-370D-4E38-962F-8E689C001DB3}">
+      <dsp:nvSpPr>
+        <dsp:cNvPr id="0" name=""/>
+        <dsp:cNvSpPr/>
+      </dsp:nvSpPr>
+      <dsp:spPr>
+        <a:xfrm rot="1095096">
+          <a:off x="1276119" y="1837594"/>
+          <a:ext cx="348921" cy="12941"/>
+        </a:xfrm>
+        <a:custGeom>
+          <a:avLst/>
+          <a:gdLst/>
+          <a:ahLst/>
+          <a:cxnLst/>
+          <a:rect l="0" t="0" r="0" b="0"/>
+          <a:pathLst>
+            <a:path>
+              <a:moveTo>
+                <a:pt x="0" y="6470"/>
+              </a:moveTo>
+              <a:lnTo>
+                <a:pt x="348921" y="6470"/>
+              </a:lnTo>
+            </a:path>
+          </a:pathLst>
+        </a:custGeom>
+        <a:noFill/>
+        <a:ln w="25400" cap="flat" cmpd="sng" algn="ctr">
+          <a:solidFill>
+            <a:schemeClr val="accent1">
+              <a:shade val="80000"/>
+              <a:hueOff val="0"/>
+              <a:satOff val="0"/>
+              <a:lumOff val="0"/>
+              <a:alphaOff val="0"/>
+            </a:schemeClr>
+          </a:solidFill>
+          <a:prstDash val="solid"/>
+        </a:ln>
+        <a:effectLst/>
+      </dsp:spPr>
+      <dsp:style>
+        <a:lnRef idx="2">
+          <a:scrgbClr r="0" g="0" b="0"/>
+        </a:lnRef>
+        <a:fillRef idx="0">
+          <a:scrgbClr r="0" g="0" b="0"/>
+        </a:fillRef>
+        <a:effectRef idx="0">
+          <a:scrgbClr r="0" g="0" b="0"/>
+        </a:effectRef>
+        <a:fontRef idx="minor"/>
+      </dsp:style>
+      <dsp:txBody>
+        <a:bodyPr spcFirstLastPara="0" vert="horz" wrap="square" lIns="12700" tIns="0" rIns="12700" bIns="0" numCol="1" spcCol="1270" anchor="ctr" anchorCtr="0">
+          <a:noAutofit/>
+        </a:bodyPr>
+        <a:lstStyle/>
+        <a:p>
+          <a:pPr lvl="0" algn="ctr" defTabSz="222250">
+            <a:lnSpc>
+              <a:spcPct val="90000"/>
+            </a:lnSpc>
+            <a:spcBef>
+              <a:spcPct val="0"/>
+            </a:spcBef>
+            <a:spcAft>
+              <a:spcPct val="35000"/>
+            </a:spcAft>
+          </a:pPr>
+          <a:endParaRPr lang="en-US" sz="500" kern="1200"/>
+        </a:p>
+      </dsp:txBody>
+      <dsp:txXfrm>
+        <a:off x="1441857" y="1835342"/>
+        <a:ext cx="17446" cy="17446"/>
+      </dsp:txXfrm>
+    </dsp:sp>
+    <dsp:sp modelId="{88EDACE5-21AE-4482-B8C7-116CF3A27E99}">
+      <dsp:nvSpPr>
+        <dsp:cNvPr id="0" name=""/>
+        <dsp:cNvSpPr/>
+      </dsp:nvSpPr>
+      <dsp:spPr>
+        <a:xfrm>
+          <a:off x="1616264" y="1753518"/>
+          <a:ext cx="580745" cy="290372"/>
+        </a:xfrm>
+        <a:prstGeom prst="roundRect">
+          <a:avLst>
+            <a:gd name="adj" fmla="val 10000"/>
+          </a:avLst>
+        </a:prstGeom>
+        <a:solidFill>
+          <a:schemeClr val="accent1">
+            <a:hueOff val="0"/>
+            <a:satOff val="0"/>
+            <a:lumOff val="0"/>
+            <a:alphaOff val="0"/>
+          </a:schemeClr>
+        </a:solidFill>
+        <a:ln w="25400" cap="flat" cmpd="sng" algn="ctr">
+          <a:solidFill>
+            <a:schemeClr val="lt1">
+              <a:hueOff val="0"/>
+              <a:satOff val="0"/>
+              <a:lumOff val="0"/>
+              <a:alphaOff val="0"/>
+            </a:schemeClr>
+          </a:solidFill>
+          <a:prstDash val="solid"/>
+        </a:ln>
+        <a:effectLst/>
+      </dsp:spPr>
+      <dsp:style>
+        <a:lnRef idx="2">
+          <a:scrgbClr r="0" g="0" b="0"/>
+        </a:lnRef>
+        <a:fillRef idx="1">
+          <a:scrgbClr r="0" g="0" b="0"/>
+        </a:fillRef>
+        <a:effectRef idx="0">
+          <a:scrgbClr r="0" g="0" b="0"/>
+        </a:effectRef>
+        <a:fontRef idx="minor">
+          <a:schemeClr val="lt1"/>
+        </a:fontRef>
+      </dsp:style>
+      <dsp:txBody>
+        <a:bodyPr spcFirstLastPara="0" vert="horz" wrap="square" lIns="3810" tIns="3810" rIns="3810" bIns="3810" numCol="1" spcCol="1270" anchor="ctr" anchorCtr="0">
+          <a:noAutofit/>
+        </a:bodyPr>
+        <a:lstStyle/>
+        <a:p>
+          <a:pPr lvl="0" algn="ctr" defTabSz="266700">
+            <a:lnSpc>
+              <a:spcPct val="90000"/>
+            </a:lnSpc>
+            <a:spcBef>
+              <a:spcPct val="0"/>
+            </a:spcBef>
+            <a:spcAft>
+              <a:spcPct val="35000"/>
+            </a:spcAft>
+          </a:pPr>
+          <a:r>
+            <a:rPr lang="en-US" sz="600" kern="1200" dirty="0" err="1" smtClean="0"/>
+            <a:t>main.rkt</a:t>
+          </a:r>
+          <a:endParaRPr lang="en-US" sz="600" kern="1200" dirty="0"/>
+        </a:p>
+      </dsp:txBody>
+      <dsp:txXfrm>
+        <a:off x="1624769" y="1762023"/>
+        <a:ext cx="563735" cy="273362"/>
+      </dsp:txXfrm>
+    </dsp:sp>
+    <dsp:sp modelId="{5B061652-2171-4D39-8BCD-A835674795F1}">
+      <dsp:nvSpPr>
+        <dsp:cNvPr id="0" name=""/>
+        <dsp:cNvSpPr/>
+      </dsp:nvSpPr>
+      <dsp:spPr>
+        <a:xfrm rot="2929860">
+          <a:off x="1199767" y="1970485"/>
+          <a:ext cx="498239" cy="12941"/>
+        </a:xfrm>
+        <a:custGeom>
+          <a:avLst/>
+          <a:gdLst/>
+          <a:ahLst/>
+          <a:cxnLst/>
+          <a:rect l="0" t="0" r="0" b="0"/>
+          <a:pathLst>
+            <a:path>
+              <a:moveTo>
+                <a:pt x="0" y="6470"/>
+              </a:moveTo>
+              <a:lnTo>
+                <a:pt x="498239" y="6470"/>
+              </a:lnTo>
+            </a:path>
+          </a:pathLst>
+        </a:custGeom>
+        <a:noFill/>
+        <a:ln w="25400" cap="flat" cmpd="sng" algn="ctr">
+          <a:solidFill>
+            <a:schemeClr val="accent1">
+              <a:shade val="80000"/>
+              <a:hueOff val="0"/>
+              <a:satOff val="0"/>
+              <a:lumOff val="0"/>
+              <a:alphaOff val="0"/>
+            </a:schemeClr>
+          </a:solidFill>
+          <a:prstDash val="solid"/>
+        </a:ln>
+        <a:effectLst/>
+      </dsp:spPr>
+      <dsp:style>
+        <a:lnRef idx="2">
+          <a:scrgbClr r="0" g="0" b="0"/>
+        </a:lnRef>
+        <a:fillRef idx="0">
+          <a:scrgbClr r="0" g="0" b="0"/>
+        </a:fillRef>
+        <a:effectRef idx="0">
+          <a:scrgbClr r="0" g="0" b="0"/>
+        </a:effectRef>
+        <a:fontRef idx="minor"/>
+      </dsp:style>
+      <dsp:txBody>
+        <a:bodyPr spcFirstLastPara="0" vert="horz" wrap="square" lIns="12700" tIns="0" rIns="12700" bIns="0" numCol="1" spcCol="1270" anchor="ctr" anchorCtr="0">
+          <a:noAutofit/>
+        </a:bodyPr>
+        <a:lstStyle/>
+        <a:p>
+          <a:pPr lvl="0" algn="ctr" defTabSz="222250">
+            <a:lnSpc>
+              <a:spcPct val="90000"/>
+            </a:lnSpc>
+            <a:spcBef>
+              <a:spcPct val="0"/>
+            </a:spcBef>
+            <a:spcAft>
+              <a:spcPct val="35000"/>
+            </a:spcAft>
+          </a:pPr>
+          <a:endParaRPr lang="en-US" sz="500" kern="1200"/>
+        </a:p>
+      </dsp:txBody>
+      <dsp:txXfrm>
+        <a:off x="1436431" y="1964500"/>
+        <a:ext cx="24911" cy="24911"/>
+      </dsp:txXfrm>
+    </dsp:sp>
+    <dsp:sp modelId="{11F686DE-25FA-4C6B-B5BD-0426FD435EBF}">
+      <dsp:nvSpPr>
+        <dsp:cNvPr id="0" name=""/>
+        <dsp:cNvSpPr/>
+      </dsp:nvSpPr>
+      <dsp:spPr>
+        <a:xfrm>
+          <a:off x="1612878" y="2019300"/>
+          <a:ext cx="562963" cy="290372"/>
+        </a:xfrm>
+        <a:prstGeom prst="roundRect">
+          <a:avLst>
+            <a:gd name="adj" fmla="val 10000"/>
+          </a:avLst>
+        </a:prstGeom>
+        <a:solidFill>
+          <a:schemeClr val="accent1">
+            <a:hueOff val="0"/>
+            <a:satOff val="0"/>
+            <a:lumOff val="0"/>
+            <a:alphaOff val="0"/>
+          </a:schemeClr>
+        </a:solidFill>
+        <a:ln w="25400" cap="flat" cmpd="sng" algn="ctr">
+          <a:solidFill>
+            <a:schemeClr val="lt1">
+              <a:hueOff val="0"/>
+              <a:satOff val="0"/>
+              <a:lumOff val="0"/>
+              <a:alphaOff val="0"/>
+            </a:schemeClr>
+          </a:solidFill>
+          <a:prstDash val="solid"/>
+        </a:ln>
+        <a:effectLst/>
+      </dsp:spPr>
+      <dsp:style>
+        <a:lnRef idx="2">
+          <a:scrgbClr r="0" g="0" b="0"/>
+        </a:lnRef>
+        <a:fillRef idx="1">
+          <a:scrgbClr r="0" g="0" b="0"/>
+        </a:fillRef>
+        <a:effectRef idx="0">
+          <a:scrgbClr r="0" g="0" b="0"/>
+        </a:effectRef>
+        <a:fontRef idx="minor">
+          <a:schemeClr val="lt1"/>
+        </a:fontRef>
+      </dsp:style>
+      <dsp:txBody>
+        <a:bodyPr spcFirstLastPara="0" vert="horz" wrap="square" lIns="3810" tIns="3810" rIns="3810" bIns="3810" numCol="1" spcCol="1270" anchor="ctr" anchorCtr="0">
+          <a:noAutofit/>
+        </a:bodyPr>
+        <a:lstStyle/>
+        <a:p>
+          <a:pPr lvl="0" algn="ctr" defTabSz="266700">
+            <a:lnSpc>
+              <a:spcPct val="90000"/>
+            </a:lnSpc>
+            <a:spcBef>
+              <a:spcPct val="0"/>
+            </a:spcBef>
+            <a:spcAft>
+              <a:spcPct val="35000"/>
+            </a:spcAft>
+          </a:pPr>
+          <a:r>
+            <a:rPr lang="en-US" sz="600" kern="1200" dirty="0" smtClean="0"/>
+            <a:t>module1.rkt</a:t>
+          </a:r>
+          <a:endParaRPr lang="en-US" sz="600" kern="1200" dirty="0"/>
+        </a:p>
+      </dsp:txBody>
+      <dsp:txXfrm>
+        <a:off x="1621383" y="2027805"/>
+        <a:ext cx="545953" cy="273362"/>
+      </dsp:txXfrm>
+    </dsp:sp>
+    <dsp:sp modelId="{4D73C71E-89F8-46D7-ABCD-94CC477E1629}">
+      <dsp:nvSpPr>
+        <dsp:cNvPr id="0" name=""/>
+        <dsp:cNvSpPr/>
+      </dsp:nvSpPr>
+      <dsp:spPr>
+        <a:xfrm rot="3804751">
+          <a:off x="1082479" y="2110616"/>
+          <a:ext cx="732816" cy="12941"/>
+        </a:xfrm>
+        <a:custGeom>
+          <a:avLst/>
+          <a:gdLst/>
+          <a:ahLst/>
+          <a:cxnLst/>
+          <a:rect l="0" t="0" r="0" b="0"/>
+          <a:pathLst>
+            <a:path>
+              <a:moveTo>
+                <a:pt x="0" y="6470"/>
+              </a:moveTo>
+              <a:lnTo>
+                <a:pt x="732816" y="6470"/>
+              </a:lnTo>
+            </a:path>
+          </a:pathLst>
+        </a:custGeom>
+        <a:noFill/>
+        <a:ln w="25400" cap="flat" cmpd="sng" algn="ctr">
+          <a:solidFill>
+            <a:schemeClr val="accent1">
+              <a:shade val="80000"/>
+              <a:hueOff val="0"/>
+              <a:satOff val="0"/>
+              <a:lumOff val="0"/>
+              <a:alphaOff val="0"/>
+            </a:schemeClr>
+          </a:solidFill>
+          <a:prstDash val="solid"/>
+        </a:ln>
+        <a:effectLst/>
+      </dsp:spPr>
+      <dsp:style>
+        <a:lnRef idx="2">
+          <a:scrgbClr r="0" g="0" b="0"/>
+        </a:lnRef>
+        <a:fillRef idx="0">
+          <a:scrgbClr r="0" g="0" b="0"/>
+        </a:fillRef>
+        <a:effectRef idx="0">
+          <a:scrgbClr r="0" g="0" b="0"/>
+        </a:effectRef>
+        <a:fontRef idx="minor"/>
+      </dsp:style>
+      <dsp:txBody>
+        <a:bodyPr spcFirstLastPara="0" vert="horz" wrap="square" lIns="12700" tIns="0" rIns="12700" bIns="0" numCol="1" spcCol="1270" anchor="ctr" anchorCtr="0">
+          <a:noAutofit/>
+        </a:bodyPr>
+        <a:lstStyle/>
+        <a:p>
+          <a:pPr lvl="0" algn="ctr" defTabSz="222250">
+            <a:lnSpc>
+              <a:spcPct val="90000"/>
+            </a:lnSpc>
+            <a:spcBef>
+              <a:spcPct val="0"/>
+            </a:spcBef>
+            <a:spcAft>
+              <a:spcPct val="35000"/>
+            </a:spcAft>
+          </a:pPr>
+          <a:endParaRPr lang="en-US" sz="500" kern="1200"/>
+        </a:p>
+      </dsp:txBody>
+      <dsp:txXfrm>
+        <a:off x="1430567" y="2098767"/>
+        <a:ext cx="36640" cy="36640"/>
+      </dsp:txXfrm>
+    </dsp:sp>
+    <dsp:sp modelId="{2370C263-D04C-4203-963B-8F5DE028DD68}">
+      <dsp:nvSpPr>
+        <dsp:cNvPr id="0" name=""/>
+        <dsp:cNvSpPr/>
+      </dsp:nvSpPr>
+      <dsp:spPr>
+        <a:xfrm>
+          <a:off x="1612878" y="2299562"/>
+          <a:ext cx="580745" cy="290372"/>
+        </a:xfrm>
+        <a:prstGeom prst="roundRect">
+          <a:avLst>
+            <a:gd name="adj" fmla="val 10000"/>
+          </a:avLst>
+        </a:prstGeom>
+        <a:solidFill>
+          <a:schemeClr val="accent1">
+            <a:hueOff val="0"/>
+            <a:satOff val="0"/>
+            <a:lumOff val="0"/>
+            <a:alphaOff val="0"/>
+          </a:schemeClr>
+        </a:solidFill>
+        <a:ln w="25400" cap="flat" cmpd="sng" algn="ctr">
+          <a:solidFill>
+            <a:schemeClr val="lt1">
+              <a:hueOff val="0"/>
+              <a:satOff val="0"/>
+              <a:lumOff val="0"/>
+              <a:alphaOff val="0"/>
+            </a:schemeClr>
+          </a:solidFill>
+          <a:prstDash val="solid"/>
+        </a:ln>
+        <a:effectLst/>
+      </dsp:spPr>
+      <dsp:style>
+        <a:lnRef idx="2">
+          <a:scrgbClr r="0" g="0" b="0"/>
+        </a:lnRef>
+        <a:fillRef idx="1">
+          <a:scrgbClr r="0" g="0" b="0"/>
+        </a:fillRef>
+        <a:effectRef idx="0">
+          <a:scrgbClr r="0" g="0" b="0"/>
+        </a:effectRef>
+        <a:fontRef idx="minor">
+          <a:schemeClr val="lt1"/>
+        </a:fontRef>
+      </dsp:style>
+      <dsp:txBody>
+        <a:bodyPr spcFirstLastPara="0" vert="horz" wrap="square" lIns="3810" tIns="3810" rIns="3810" bIns="3810" numCol="1" spcCol="1270" anchor="ctr" anchorCtr="0">
+          <a:noAutofit/>
+        </a:bodyPr>
+        <a:lstStyle/>
+        <a:p>
+          <a:pPr lvl="0" algn="ctr" defTabSz="266700">
+            <a:lnSpc>
+              <a:spcPct val="90000"/>
+            </a:lnSpc>
+            <a:spcBef>
+              <a:spcPct val="0"/>
+            </a:spcBef>
+            <a:spcAft>
+              <a:spcPct val="35000"/>
+            </a:spcAft>
+          </a:pPr>
+          <a:r>
+            <a:rPr lang="en-US" sz="600" kern="1200" dirty="0" smtClean="0"/>
+            <a:t>module2.rkt</a:t>
+          </a:r>
+          <a:endParaRPr lang="en-US" sz="600" kern="1200" dirty="0"/>
+        </a:p>
+      </dsp:txBody>
+      <dsp:txXfrm>
+        <a:off x="1621383" y="2308067"/>
+        <a:ext cx="563735" cy="273362"/>
+      </dsp:txXfrm>
+    </dsp:sp>
+    <dsp:sp modelId="{58F4492D-8348-40AC-AEC6-55C7C3535C7C}">
+      <dsp:nvSpPr>
+        <dsp:cNvPr id="0" name=""/>
+        <dsp:cNvSpPr/>
+      </dsp:nvSpPr>
+      <dsp:spPr>
+        <a:xfrm rot="4240874">
+          <a:off x="953181" y="2250749"/>
+          <a:ext cx="991411" cy="12941"/>
+        </a:xfrm>
+        <a:custGeom>
+          <a:avLst/>
+          <a:gdLst/>
+          <a:ahLst/>
+          <a:cxnLst/>
+          <a:rect l="0" t="0" r="0" b="0"/>
+          <a:pathLst>
+            <a:path>
+              <a:moveTo>
+                <a:pt x="0" y="6470"/>
+              </a:moveTo>
+              <a:lnTo>
+                <a:pt x="991411" y="6470"/>
+              </a:lnTo>
+            </a:path>
+          </a:pathLst>
+        </a:custGeom>
+        <a:noFill/>
+        <a:ln w="25400" cap="flat" cmpd="sng" algn="ctr">
+          <a:solidFill>
+            <a:schemeClr val="accent1">
+              <a:shade val="80000"/>
+              <a:hueOff val="0"/>
+              <a:satOff val="0"/>
+              <a:lumOff val="0"/>
+              <a:alphaOff val="0"/>
+            </a:schemeClr>
+          </a:solidFill>
+          <a:prstDash val="solid"/>
+        </a:ln>
+        <a:effectLst/>
+      </dsp:spPr>
+      <dsp:style>
+        <a:lnRef idx="2">
+          <a:scrgbClr r="0" g="0" b="0"/>
+        </a:lnRef>
+        <a:fillRef idx="0">
+          <a:scrgbClr r="0" g="0" b="0"/>
+        </a:fillRef>
+        <a:effectRef idx="0">
+          <a:scrgbClr r="0" g="0" b="0"/>
+        </a:effectRef>
+        <a:fontRef idx="minor"/>
+      </dsp:style>
+      <dsp:txBody>
+        <a:bodyPr spcFirstLastPara="0" vert="horz" wrap="square" lIns="12700" tIns="0" rIns="12700" bIns="0" numCol="1" spcCol="1270" anchor="ctr" anchorCtr="0">
+          <a:noAutofit/>
+        </a:bodyPr>
+        <a:lstStyle/>
+        <a:p>
+          <a:pPr lvl="0" algn="ctr" defTabSz="222250">
+            <a:lnSpc>
+              <a:spcPct val="90000"/>
+            </a:lnSpc>
+            <a:spcBef>
+              <a:spcPct val="0"/>
+            </a:spcBef>
+            <a:spcAft>
+              <a:spcPct val="35000"/>
+            </a:spcAft>
+          </a:pPr>
+          <a:endParaRPr lang="en-US" sz="500" kern="1200"/>
+        </a:p>
+      </dsp:txBody>
+      <dsp:txXfrm>
+        <a:off x="1424102" y="2232434"/>
+        <a:ext cx="49570" cy="49570"/>
+      </dsp:txXfrm>
+    </dsp:sp>
+    <dsp:sp modelId="{3E4CFFF9-FD55-47C7-9E6D-F0C6A9412ADB}">
+      <dsp:nvSpPr>
+        <dsp:cNvPr id="0" name=""/>
+        <dsp:cNvSpPr/>
+      </dsp:nvSpPr>
+      <dsp:spPr>
+        <a:xfrm>
+          <a:off x="1612878" y="2579827"/>
+          <a:ext cx="580745" cy="290372"/>
+        </a:xfrm>
+        <a:prstGeom prst="roundRect">
+          <a:avLst>
+            <a:gd name="adj" fmla="val 10000"/>
+          </a:avLst>
+        </a:prstGeom>
+        <a:solidFill>
+          <a:schemeClr val="accent1">
+            <a:hueOff val="0"/>
+            <a:satOff val="0"/>
+            <a:lumOff val="0"/>
+            <a:alphaOff val="0"/>
+          </a:schemeClr>
+        </a:solidFill>
+        <a:ln w="25400" cap="flat" cmpd="sng" algn="ctr">
+          <a:solidFill>
+            <a:schemeClr val="lt1">
+              <a:hueOff val="0"/>
+              <a:satOff val="0"/>
+              <a:lumOff val="0"/>
+              <a:alphaOff val="0"/>
+            </a:schemeClr>
+          </a:solidFill>
+          <a:prstDash val="solid"/>
+        </a:ln>
+        <a:effectLst/>
+      </dsp:spPr>
+      <dsp:style>
+        <a:lnRef idx="2">
+          <a:scrgbClr r="0" g="0" b="0"/>
+        </a:lnRef>
+        <a:fillRef idx="1">
+          <a:scrgbClr r="0" g="0" b="0"/>
+        </a:fillRef>
+        <a:effectRef idx="0">
+          <a:scrgbClr r="0" g="0" b="0"/>
+        </a:effectRef>
+        <a:fontRef idx="minor">
+          <a:schemeClr val="lt1"/>
+        </a:fontRef>
+      </dsp:style>
+      <dsp:txBody>
+        <a:bodyPr spcFirstLastPara="0" vert="horz" wrap="square" lIns="3810" tIns="3810" rIns="3810" bIns="3810" numCol="1" spcCol="1270" anchor="ctr" anchorCtr="0">
+          <a:noAutofit/>
+        </a:bodyPr>
+        <a:lstStyle/>
+        <a:p>
+          <a:pPr lvl="0" algn="ctr" defTabSz="266700">
+            <a:lnSpc>
+              <a:spcPct val="90000"/>
+            </a:lnSpc>
+            <a:spcBef>
+              <a:spcPct val="0"/>
+            </a:spcBef>
+            <a:spcAft>
+              <a:spcPct val="35000"/>
+            </a:spcAft>
+          </a:pPr>
+          <a:r>
+            <a:rPr lang="en-US" sz="600" kern="1200" dirty="0" smtClean="0"/>
+            <a:t>module3.rkt</a:t>
+          </a:r>
+          <a:endParaRPr lang="en-US" sz="600" kern="1200" dirty="0"/>
+        </a:p>
+      </dsp:txBody>
+      <dsp:txXfrm>
+        <a:off x="1621383" y="2588332"/>
+        <a:ext cx="563735" cy="273362"/>
+      </dsp:txXfrm>
+    </dsp:sp>
   </dsp:spTree>
 </dsp:drawing>
 </file>
@@ -31910,7 +34596,7 @@
           <a:p>
             <a:fld id="{DA6DF2C9-EBE4-4351-8E7C-99EF6186DA4A}" type="datetimeFigureOut">
               <a:rPr lang="en-US" smtClean="0"/>
-              <a:t>7/8/2014</a:t>
+              <a:t>8/1/2015</a:t>
             </a:fld>
             <a:endParaRPr lang="en-US"/>
           </a:p>
@@ -32443,7 +35129,7 @@
           <a:p>
             <a:fld id="{52F7EF0E-4991-462B-BCBC-694BF8FF3688}" type="datetime1">
               <a:rPr lang="en-US" smtClean="0"/>
-              <a:t>7/8/2014</a:t>
+              <a:t>8/1/2015</a:t>
             </a:fld>
             <a:endParaRPr lang="en-US"/>
           </a:p>
@@ -32616,7 +35302,7 @@
           <a:p>
             <a:fld id="{7248001E-7DBC-4AD3-B695-153B32E72DEB}" type="datetime1">
               <a:rPr lang="en-US" smtClean="0"/>
-              <a:t>7/8/2014</a:t>
+              <a:t>8/1/2015</a:t>
             </a:fld>
             <a:endParaRPr lang="en-US"/>
           </a:p>
@@ -32792,7 +35478,7 @@
           <a:p>
             <a:fld id="{6B68F95E-FC82-488B-97B3-253076412B55}" type="datetime1">
               <a:rPr lang="en-US" smtClean="0"/>
-              <a:t>7/8/2014</a:t>
+              <a:t>8/1/2015</a:t>
             </a:fld>
             <a:endParaRPr lang="en-US"/>
           </a:p>
@@ -32958,7 +35644,7 @@
           <a:p>
             <a:fld id="{562E238C-8F63-4660-A32A-C9B584CD1B02}" type="datetime1">
               <a:rPr lang="en-US" smtClean="0"/>
-              <a:t>7/8/2014</a:t>
+              <a:t>8/1/2015</a:t>
             </a:fld>
             <a:endParaRPr lang="en-US"/>
           </a:p>
@@ -33207,7 +35893,7 @@
           <a:p>
             <a:fld id="{4140B3D8-3199-4EDC-AFB8-E5E1023043D8}" type="datetime1">
               <a:rPr lang="en-US" smtClean="0"/>
-              <a:t>7/8/2014</a:t>
+              <a:t>8/1/2015</a:t>
             </a:fld>
             <a:endParaRPr lang="en-US"/>
           </a:p>
@@ -33491,7 +36177,7 @@
           <a:p>
             <a:fld id="{51485FBC-8459-4252-B46C-2615F0D54FC6}" type="datetime1">
               <a:rPr lang="en-US" smtClean="0"/>
-              <a:t>7/8/2014</a:t>
+              <a:t>8/1/2015</a:t>
             </a:fld>
             <a:endParaRPr lang="en-US"/>
           </a:p>
@@ -33909,7 +36595,7 @@
           <a:p>
             <a:fld id="{9AE380D9-9396-4976-888A-7F66E925443E}" type="datetime1">
               <a:rPr lang="en-US" smtClean="0"/>
-              <a:t>7/8/2014</a:t>
+              <a:t>8/1/2015</a:t>
             </a:fld>
             <a:endParaRPr lang="en-US"/>
           </a:p>
@@ -34023,7 +36709,7 @@
           <a:p>
             <a:fld id="{E272D5E2-7B37-4517-8EA5-A6DF76D7EE3F}" type="datetime1">
               <a:rPr lang="en-US" smtClean="0"/>
-              <a:t>7/8/2014</a:t>
+              <a:t>8/1/2015</a:t>
             </a:fld>
             <a:endParaRPr lang="en-US"/>
           </a:p>
@@ -34121,7 +36807,7 @@
           <a:p>
             <a:fld id="{590C6D0D-45DC-40A4-8EDC-8F932DB50654}" type="datetime1">
               <a:rPr lang="en-US" smtClean="0"/>
-              <a:t>7/8/2014</a:t>
+              <a:t>8/1/2015</a:t>
             </a:fld>
             <a:endParaRPr lang="en-US"/>
           </a:p>
@@ -34394,7 +37080,7 @@
           <a:p>
             <a:fld id="{B24C1E1B-D9BE-4D48-9550-F287D9BA16DE}" type="datetime1">
               <a:rPr lang="en-US" smtClean="0"/>
-              <a:t>7/8/2014</a:t>
+              <a:t>8/1/2015</a:t>
             </a:fld>
             <a:endParaRPr lang="en-US"/>
           </a:p>
@@ -34643,7 +37329,7 @@
           <a:p>
             <a:fld id="{6B0E4DC0-C2D6-4F3D-AA6C-29D7CF4C2F1A}" type="datetime1">
               <a:rPr lang="en-US" smtClean="0"/>
-              <a:t>7/8/2014</a:t>
+              <a:t>8/1/2015</a:t>
             </a:fld>
             <a:endParaRPr lang="en-US"/>
           </a:p>
@@ -34740,6 +37426,11 @@
           <a:prstGeom prst="rect">
             <a:avLst/>
           </a:prstGeom>
+          <a:ln w="28575">
+            <a:solidFill>
+              <a:schemeClr val="accent1"/>
+            </a:solidFill>
+          </a:ln>
         </p:spPr>
         <p:txBody>
           <a:bodyPr vert="horz" lIns="91440" tIns="45720" rIns="91440" bIns="45720" rtlCol="0" anchor="ctr">
@@ -34852,7 +37543,7 @@
           <a:p>
             <a:fld id="{0F518A1C-E434-4CD7-9618-B4C273088978}" type="datetime1">
               <a:rPr lang="en-US" smtClean="0"/>
-              <a:t>7/8/2014</a:t>
+              <a:t>8/1/2015</a:t>
             </a:fld>
             <a:endParaRPr lang="en-US"/>
           </a:p>
@@ -37429,8 +40120,8 @@
         </p:nvSpPr>
         <p:spPr>
           <a:xfrm>
-            <a:off x="5867400" y="1461700"/>
-            <a:ext cx="3048000" cy="646331"/>
+            <a:off x="5723561" y="1461700"/>
+            <a:ext cx="3184133" cy="646331"/>
           </a:xfrm>
           <a:prstGeom prst="rect">
             <a:avLst/>
@@ -37458,7 +40149,11 @@
             </a:r>
             <a:r>
               <a:rPr lang="en-US" dirty="0" smtClean="0"/>
-              <a:t>. github.com</a:t>
+              <a:t>. </a:t>
+            </a:r>
+            <a:r>
+              <a:rPr lang="en-US" dirty="0" smtClean="0"/>
+              <a:t>github.ccs.neu.edu</a:t>
             </a:r>
             <a:endParaRPr lang="en-US" dirty="0"/>
           </a:p>
@@ -38028,8 +40723,8 @@
         </p:nvSpPr>
         <p:spPr>
           <a:xfrm>
-            <a:off x="5867400" y="1461700"/>
-            <a:ext cx="3048000" cy="646331"/>
+            <a:off x="4914900" y="1466866"/>
+            <a:ext cx="3276600" cy="646331"/>
           </a:xfrm>
           <a:prstGeom prst="rect">
             <a:avLst/>
@@ -38057,7 +40752,11 @@
             </a:r>
             <a:r>
               <a:rPr lang="en-US" dirty="0" smtClean="0"/>
-              <a:t>. github.com</a:t>
+              <a:t>. </a:t>
+            </a:r>
+            <a:r>
+              <a:rPr lang="en-US" dirty="0" smtClean="0"/>
+              <a:t>github.ccs.neu.edu</a:t>
             </a:r>
             <a:endParaRPr lang="en-US" dirty="0"/>
           </a:p>

</xml_diff>

<commit_message>
updated L0.5 with screenshots of new Github Desktop
</commit_message>
<xml_diff>
--- a/Slides/Lesson 0.5 Introduction to Git.pptx
+++ b/Slides/Lesson 0.5 Introduction to Git.pptx
@@ -5,7 +5,7 @@
     <p:sldMasterId id="2147483648" r:id="rId1"/>
   </p:sldMasterIdLst>
   <p:notesMasterIdLst>
-    <p:notesMasterId r:id="rId20"/>
+    <p:notesMasterId r:id="rId31"/>
   </p:notesMasterIdLst>
   <p:sldIdLst>
     <p:sldId id="256" r:id="rId2"/>
@@ -25,12 +25,23 @@
     <p:sldId id="268" r:id="rId16"/>
     <p:sldId id="273" r:id="rId17"/>
     <p:sldId id="270" r:id="rId18"/>
-    <p:sldId id="272" r:id="rId19"/>
+    <p:sldId id="274" r:id="rId19"/>
+    <p:sldId id="275" r:id="rId20"/>
+    <p:sldId id="276" r:id="rId21"/>
+    <p:sldId id="277" r:id="rId22"/>
+    <p:sldId id="278" r:id="rId23"/>
+    <p:sldId id="279" r:id="rId24"/>
+    <p:sldId id="280" r:id="rId25"/>
+    <p:sldId id="281" r:id="rId26"/>
+    <p:sldId id="282" r:id="rId27"/>
+    <p:sldId id="283" r:id="rId28"/>
+    <p:sldId id="284" r:id="rId29"/>
+    <p:sldId id="272" r:id="rId30"/>
   </p:sldIdLst>
   <p:sldSz cx="9144000" cy="6858000" type="screen4x3"/>
   <p:notesSz cx="6858000" cy="9144000"/>
   <p:custDataLst>
-    <p:tags r:id="rId21"/>
+    <p:tags r:id="rId32"/>
   </p:custDataLst>
   <p:defaultTextStyle>
     <a:defPPr>
@@ -34596,7 +34607,7 @@
           <a:p>
             <a:fld id="{DA6DF2C9-EBE4-4351-8E7C-99EF6186DA4A}" type="datetimeFigureOut">
               <a:rPr lang="en-US" smtClean="0"/>
-              <a:t>8/1/2015</a:t>
+              <a:t>8/20/2015</a:t>
             </a:fld>
             <a:endParaRPr lang="en-US"/>
           </a:p>
@@ -35129,7 +35140,7 @@
           <a:p>
             <a:fld id="{52F7EF0E-4991-462B-BCBC-694BF8FF3688}" type="datetime1">
               <a:rPr lang="en-US" smtClean="0"/>
-              <a:t>8/1/2015</a:t>
+              <a:t>8/20/2015</a:t>
             </a:fld>
             <a:endParaRPr lang="en-US"/>
           </a:p>
@@ -35302,7 +35313,7 @@
           <a:p>
             <a:fld id="{7248001E-7DBC-4AD3-B695-153B32E72DEB}" type="datetime1">
               <a:rPr lang="en-US" smtClean="0"/>
-              <a:t>8/1/2015</a:t>
+              <a:t>8/20/2015</a:t>
             </a:fld>
             <a:endParaRPr lang="en-US"/>
           </a:p>
@@ -35478,7 +35489,7 @@
           <a:p>
             <a:fld id="{6B68F95E-FC82-488B-97B3-253076412B55}" type="datetime1">
               <a:rPr lang="en-US" smtClean="0"/>
-              <a:t>8/1/2015</a:t>
+              <a:t>8/20/2015</a:t>
             </a:fld>
             <a:endParaRPr lang="en-US"/>
           </a:p>
@@ -35644,7 +35655,7 @@
           <a:p>
             <a:fld id="{562E238C-8F63-4660-A32A-C9B584CD1B02}" type="datetime1">
               <a:rPr lang="en-US" smtClean="0"/>
-              <a:t>8/1/2015</a:t>
+              <a:t>8/20/2015</a:t>
             </a:fld>
             <a:endParaRPr lang="en-US"/>
           </a:p>
@@ -35893,7 +35904,7 @@
           <a:p>
             <a:fld id="{4140B3D8-3199-4EDC-AFB8-E5E1023043D8}" type="datetime1">
               <a:rPr lang="en-US" smtClean="0"/>
-              <a:t>8/1/2015</a:t>
+              <a:t>8/20/2015</a:t>
             </a:fld>
             <a:endParaRPr lang="en-US"/>
           </a:p>
@@ -36177,7 +36188,7 @@
           <a:p>
             <a:fld id="{51485FBC-8459-4252-B46C-2615F0D54FC6}" type="datetime1">
               <a:rPr lang="en-US" smtClean="0"/>
-              <a:t>8/1/2015</a:t>
+              <a:t>8/20/2015</a:t>
             </a:fld>
             <a:endParaRPr lang="en-US"/>
           </a:p>
@@ -36595,7 +36606,7 @@
           <a:p>
             <a:fld id="{9AE380D9-9396-4976-888A-7F66E925443E}" type="datetime1">
               <a:rPr lang="en-US" smtClean="0"/>
-              <a:t>8/1/2015</a:t>
+              <a:t>8/20/2015</a:t>
             </a:fld>
             <a:endParaRPr lang="en-US"/>
           </a:p>
@@ -36709,7 +36720,7 @@
           <a:p>
             <a:fld id="{E272D5E2-7B37-4517-8EA5-A6DF76D7EE3F}" type="datetime1">
               <a:rPr lang="en-US" smtClean="0"/>
-              <a:t>8/1/2015</a:t>
+              <a:t>8/20/2015</a:t>
             </a:fld>
             <a:endParaRPr lang="en-US"/>
           </a:p>
@@ -36807,7 +36818,7 @@
           <a:p>
             <a:fld id="{590C6D0D-45DC-40A4-8EDC-8F932DB50654}" type="datetime1">
               <a:rPr lang="en-US" smtClean="0"/>
-              <a:t>8/1/2015</a:t>
+              <a:t>8/20/2015</a:t>
             </a:fld>
             <a:endParaRPr lang="en-US"/>
           </a:p>
@@ -37080,7 +37091,7 @@
           <a:p>
             <a:fld id="{B24C1E1B-D9BE-4D48-9550-F287D9BA16DE}" type="datetime1">
               <a:rPr lang="en-US" smtClean="0"/>
-              <a:t>8/1/2015</a:t>
+              <a:t>8/20/2015</a:t>
             </a:fld>
             <a:endParaRPr lang="en-US"/>
           </a:p>
@@ -37329,7 +37340,7 @@
           <a:p>
             <a:fld id="{6B0E4DC0-C2D6-4F3D-AA6C-29D7CF4C2F1A}" type="datetime1">
               <a:rPr lang="en-US" smtClean="0"/>
-              <a:t>8/1/2015</a:t>
+              <a:t>8/20/2015</a:t>
             </a:fld>
             <a:endParaRPr lang="en-US"/>
           </a:p>
@@ -37543,7 +37554,7 @@
           <a:p>
             <a:fld id="{0F518A1C-E434-4CD7-9618-B4C273088978}" type="datetime1">
               <a:rPr lang="en-US" smtClean="0"/>
-              <a:t>8/1/2015</a:t>
+              <a:t>8/20/2015</a:t>
             </a:fld>
             <a:endParaRPr lang="en-US"/>
           </a:p>
@@ -40149,11 +40160,7 @@
             </a:r>
             <a:r>
               <a:rPr lang="en-US" dirty="0" smtClean="0"/>
-              <a:t>. </a:t>
-            </a:r>
-            <a:r>
-              <a:rPr lang="en-US" dirty="0" smtClean="0"/>
-              <a:t>github.ccs.neu.edu</a:t>
+              <a:t>. github.ccs.neu.edu</a:t>
             </a:r>
             <a:endParaRPr lang="en-US" dirty="0"/>
           </a:p>
@@ -40752,11 +40759,7 @@
             </a:r>
             <a:r>
               <a:rPr lang="en-US" dirty="0" smtClean="0"/>
-              <a:t>. </a:t>
-            </a:r>
-            <a:r>
-              <a:rPr lang="en-US" dirty="0" smtClean="0"/>
-              <a:t>github.ccs.neu.edu</a:t>
+              <a:t>. github.ccs.neu.edu</a:t>
             </a:r>
             <a:endParaRPr lang="en-US" dirty="0"/>
           </a:p>
@@ -44120,7 +44123,15 @@
           <a:p>
             <a:r>
               <a:rPr lang="en-US" dirty="0" smtClean="0"/>
-              <a:t>Summary</a:t>
+              <a:t>The new </a:t>
+            </a:r>
+            <a:r>
+              <a:rPr lang="en-US" dirty="0" err="1" smtClean="0"/>
+              <a:t>github</a:t>
+            </a:r>
+            <a:r>
+              <a:rPr lang="en-US" dirty="0" smtClean="0"/>
+              <a:t> desktop</a:t>
             </a:r>
             <a:endParaRPr lang="en-US" dirty="0"/>
           </a:p>
@@ -44128,7 +44139,7 @@
       </p:sp>
       <p:sp>
         <p:nvSpPr>
-          <p:cNvPr id="3" name="Content Placeholder 2"/>
+          <p:cNvPr id="4" name="Content Placeholder 3"/>
           <p:cNvSpPr>
             <a:spLocks noGrp="1"/>
           </p:cNvSpPr>
@@ -44138,87 +44149,55 @@
         </p:nvSpPr>
         <p:spPr/>
         <p:txBody>
-          <a:bodyPr/>
+          <a:bodyPr>
+            <a:normAutofit lnSpcReduction="10000"/>
+          </a:bodyPr>
           <a:lstStyle/>
           <a:p>
             <a:r>
               <a:rPr lang="en-US" dirty="0" smtClean="0"/>
-              <a:t>In this lesson you have learned</a:t>
+              <a:t>In the next few slides, we’ll give you the updates for 2015.</a:t>
             </a:r>
           </a:p>
           <a:p>
-            <a:pPr lvl="1"/>
             <a:r>
               <a:rPr lang="en-US" dirty="0" smtClean="0"/>
-              <a:t>that </a:t>
+              <a:t>We won’t be using github.com.  Instead we will be using “</a:t>
             </a:r>
             <a:r>
               <a:rPr lang="en-US" dirty="0" err="1" smtClean="0"/>
-              <a:t>git</a:t>
+              <a:t>Github</a:t>
             </a:r>
             <a:r>
               <a:rPr lang="en-US" dirty="0" smtClean="0"/>
-              <a:t> creates a mini-</a:t>
+              <a:t> for Enterprise” at </a:t>
+            </a:r>
+            <a:r>
+              <a:rPr lang="en-US" dirty="0" smtClean="0">
+                <a:hlinkClick r:id="rId2"/>
+              </a:rPr>
+              <a:t>https://github.ccs.neu.edu</a:t>
+            </a:r>
+            <a:endParaRPr lang="en-US" dirty="0" smtClean="0"/>
+          </a:p>
+          <a:p>
+            <a:r>
+              <a:rPr lang="en-US" dirty="0" smtClean="0"/>
+              <a:t>The user interface for GHFW/GHFM has changed. It’s now called “</a:t>
             </a:r>
             <a:r>
               <a:rPr lang="en-US" dirty="0" err="1" smtClean="0"/>
-              <a:t>filesystem</a:t>
+              <a:t>Github</a:t>
             </a:r>
             <a:r>
               <a:rPr lang="en-US" dirty="0" smtClean="0"/>
-              <a:t> in your directory</a:t>
+              <a:t> Desktop”.</a:t>
             </a:r>
           </a:p>
           <a:p>
-            <a:pPr lvl="1"/>
             <a:r>
               <a:rPr lang="en-US" dirty="0" smtClean="0"/>
-              <a:t>what commit, push, pull, and sync do</a:t>
-            </a:r>
-          </a:p>
-          <a:p>
-            <a:pPr lvl="1"/>
-            <a:r>
-              <a:rPr lang="en-US" dirty="0" smtClean="0"/>
-              <a:t>the elements of the basic </a:t>
-            </a:r>
-            <a:r>
-              <a:rPr lang="en-US" dirty="0" err="1" smtClean="0"/>
-              <a:t>git</a:t>
-            </a:r>
-            <a:r>
-              <a:rPr lang="en-US" dirty="0" smtClean="0"/>
-              <a:t> workflow</a:t>
-            </a:r>
-          </a:p>
-          <a:p>
-            <a:pPr lvl="1"/>
-            <a:r>
-              <a:rPr lang="en-US" dirty="0" smtClean="0"/>
-              <a:t>how </a:t>
-            </a:r>
-            <a:r>
-              <a:rPr lang="en-US" dirty="0" err="1" smtClean="0"/>
-              <a:t>git</a:t>
-            </a:r>
-            <a:r>
-              <a:rPr lang="en-US" dirty="0" smtClean="0"/>
-              <a:t> allows you to work across multiple computers</a:t>
-            </a:r>
-          </a:p>
-          <a:p>
-            <a:pPr lvl="1"/>
-            <a:r>
-              <a:rPr lang="en-US" dirty="0" smtClean="0"/>
-              <a:t>how </a:t>
-            </a:r>
-            <a:r>
-              <a:rPr lang="en-US" dirty="0" err="1" smtClean="0"/>
-              <a:t>git</a:t>
-            </a:r>
-            <a:r>
-              <a:rPr lang="en-US" dirty="0" smtClean="0"/>
-              <a:t> allows you and a partner to work together</a:t>
+              <a:t>In the next few slides, we’ll show you how your daily workflow looks with new interface.</a:t>
             </a:r>
             <a:endParaRPr lang="en-US" dirty="0"/>
           </a:p>
@@ -44226,7 +44205,7 @@
       </p:sp>
       <p:sp>
         <p:nvSpPr>
-          <p:cNvPr id="4" name="Slide Number Placeholder 3"/>
+          <p:cNvPr id="3" name="Slide Number Placeholder 2"/>
           <p:cNvSpPr>
             <a:spLocks noGrp="1"/>
           </p:cNvSpPr>
@@ -44251,20 +44230,199 @@
     </p:spTree>
     <p:extLst>
       <p:ext uri="{BB962C8B-B14F-4D97-AF65-F5344CB8AC3E}">
-        <p14:creationId xmlns:p14="http://schemas.microsoft.com/office/powerpoint/2010/main" val="976030362"/>
+        <p14:creationId xmlns:p14="http://schemas.microsoft.com/office/powerpoint/2010/main" val="731260372"/>
       </p:ext>
     </p:extLst>
   </p:cSld>
   <p:clrMapOvr>
     <a:masterClrMapping/>
   </p:clrMapOvr>
-  <p:timing>
-    <p:tnLst>
-      <p:par>
-        <p:cTn id="1" dur="indefinite" restart="never" nodeType="tmRoot"/>
-      </p:par>
-    </p:tnLst>
-  </p:timing>
+</p:sld>
+</file>
+
+<file path=ppt/slides/slide19.xml><?xml version="1.0" encoding="utf-8"?>
+<p:sld xmlns:a="http://schemas.openxmlformats.org/drawingml/2006/main" xmlns:r="http://schemas.openxmlformats.org/officeDocument/2006/relationships" xmlns:p="http://schemas.openxmlformats.org/presentationml/2006/main">
+  <p:cSld>
+    <p:spTree>
+      <p:nvGrpSpPr>
+        <p:cNvPr id="1" name=""/>
+        <p:cNvGrpSpPr/>
+        <p:nvPr/>
+      </p:nvGrpSpPr>
+      <p:grpSpPr>
+        <a:xfrm>
+          <a:off x="0" y="0"/>
+          <a:ext cx="0" cy="0"/>
+          <a:chOff x="0" y="0"/>
+          <a:chExt cx="0" cy="0"/>
+        </a:xfrm>
+      </p:grpSpPr>
+      <p:sp>
+        <p:nvSpPr>
+          <p:cNvPr id="5" name="Title 4"/>
+          <p:cNvSpPr>
+            <a:spLocks noGrp="1"/>
+          </p:cNvSpPr>
+          <p:nvPr>
+            <p:ph type="title"/>
+          </p:nvPr>
+        </p:nvSpPr>
+        <p:spPr/>
+        <p:txBody>
+          <a:bodyPr/>
+          <a:lstStyle/>
+          <a:p>
+            <a:r>
+              <a:rPr lang="en-US" dirty="0" smtClean="0"/>
+              <a:t>Starting your work session</a:t>
+            </a:r>
+            <a:endParaRPr lang="en-US" dirty="0"/>
+          </a:p>
+        </p:txBody>
+      </p:sp>
+      <p:sp>
+        <p:nvSpPr>
+          <p:cNvPr id="7" name="Content Placeholder 6"/>
+          <p:cNvSpPr>
+            <a:spLocks noGrp="1"/>
+          </p:cNvSpPr>
+          <p:nvPr>
+            <p:ph idx="1"/>
+          </p:nvPr>
+        </p:nvSpPr>
+        <p:spPr/>
+        <p:txBody>
+          <a:bodyPr>
+            <a:normAutofit/>
+          </a:bodyPr>
+          <a:lstStyle/>
+          <a:p>
+            <a:r>
+              <a:rPr lang="en-US" sz="2400" dirty="0" smtClean="0"/>
+              <a:t>Here’s what your </a:t>
+            </a:r>
+            <a:r>
+              <a:rPr lang="en-US" sz="2400" dirty="0" err="1" smtClean="0"/>
+              <a:t>Github</a:t>
+            </a:r>
+            <a:r>
+              <a:rPr lang="en-US" sz="2400" dirty="0" smtClean="0"/>
+              <a:t> Desktop should look like when you open it up.  Observe that your repos will be in the section labeled “Enterprise”.</a:t>
+            </a:r>
+            <a:endParaRPr lang="en-US" sz="2400" dirty="0"/>
+          </a:p>
+        </p:txBody>
+      </p:sp>
+      <p:sp>
+        <p:nvSpPr>
+          <p:cNvPr id="4" name="Slide Number Placeholder 3"/>
+          <p:cNvSpPr>
+            <a:spLocks noGrp="1"/>
+          </p:cNvSpPr>
+          <p:nvPr>
+            <p:ph type="sldNum" sz="quarter" idx="12"/>
+          </p:nvPr>
+        </p:nvSpPr>
+        <p:spPr/>
+        <p:txBody>
+          <a:bodyPr/>
+          <a:lstStyle/>
+          <a:p>
+            <a:fld id="{B6F15528-21DE-4FAA-801E-634DDDAF4B2B}" type="slidenum">
+              <a:rPr lang="en-US" smtClean="0"/>
+              <a:pPr/>
+              <a:t>19</a:t>
+            </a:fld>
+            <a:endParaRPr lang="en-US"/>
+          </a:p>
+        </p:txBody>
+      </p:sp>
+      <p:pic>
+        <p:nvPicPr>
+          <p:cNvPr id="6" name="Picture 5"/>
+          <p:cNvPicPr>
+            <a:picLocks noChangeAspect="1"/>
+          </p:cNvPicPr>
+          <p:nvPr/>
+        </p:nvPicPr>
+        <p:blipFill>
+          <a:blip r:embed="rId2">
+            <a:extLst>
+              <a:ext uri="{28A0092B-C50C-407E-A947-70E740481C1C}">
+                <a14:useLocalDpi xmlns:a14="http://schemas.microsoft.com/office/drawing/2010/main" val="0"/>
+              </a:ext>
+            </a:extLst>
+          </a:blip>
+          <a:stretch>
+            <a:fillRect/>
+          </a:stretch>
+        </p:blipFill>
+        <p:spPr>
+          <a:xfrm>
+            <a:off x="1510991" y="2865701"/>
+            <a:ext cx="6122019" cy="3673211"/>
+          </a:xfrm>
+          <a:prstGeom prst="rect">
+            <a:avLst/>
+          </a:prstGeom>
+        </p:spPr>
+      </p:pic>
+      <p:sp>
+        <p:nvSpPr>
+          <p:cNvPr id="8" name="Rounded Rectangle 7"/>
+          <p:cNvSpPr/>
+          <p:nvPr/>
+        </p:nvSpPr>
+        <p:spPr>
+          <a:xfrm>
+            <a:off x="1435835" y="3582030"/>
+            <a:ext cx="1080654" cy="430750"/>
+          </a:xfrm>
+          <a:prstGeom prst="roundRect">
+            <a:avLst/>
+          </a:prstGeom>
+          <a:noFill/>
+          <a:ln>
+            <a:solidFill>
+              <a:srgbClr val="FF0000"/>
+            </a:solidFill>
+          </a:ln>
+        </p:spPr>
+        <p:style>
+          <a:lnRef idx="2">
+            <a:schemeClr val="accent1">
+              <a:shade val="50000"/>
+            </a:schemeClr>
+          </a:lnRef>
+          <a:fillRef idx="1">
+            <a:schemeClr val="accent1"/>
+          </a:fillRef>
+          <a:effectRef idx="0">
+            <a:schemeClr val="accent1"/>
+          </a:effectRef>
+          <a:fontRef idx="minor">
+            <a:schemeClr val="lt1"/>
+          </a:fontRef>
+        </p:style>
+        <p:txBody>
+          <a:bodyPr rtlCol="0" anchor="ctr"/>
+          <a:lstStyle/>
+          <a:p>
+            <a:pPr algn="ctr"/>
+            <a:endParaRPr lang="en-US"/>
+          </a:p>
+        </p:txBody>
+      </p:sp>
+    </p:spTree>
+    <p:extLst>
+      <p:ext uri="{BB962C8B-B14F-4D97-AF65-F5344CB8AC3E}">
+        <p14:creationId xmlns:p14="http://schemas.microsoft.com/office/powerpoint/2010/main" val="1876820321"/>
+      </p:ext>
+    </p:extLst>
+  </p:cSld>
+  <p:clrMapOvr>
+    <a:masterClrMapping/>
+  </p:clrMapOvr>
 </p:sld>
 </file>
 
@@ -44434,6 +44592,2501 @@
     <p:extLst>
       <p:ext uri="{BB962C8B-B14F-4D97-AF65-F5344CB8AC3E}">
         <p14:creationId xmlns:p14="http://schemas.microsoft.com/office/powerpoint/2010/main" val="1871124327"/>
+      </p:ext>
+    </p:extLst>
+  </p:cSld>
+  <p:clrMapOvr>
+    <a:masterClrMapping/>
+  </p:clrMapOvr>
+  <p:timing>
+    <p:tnLst>
+      <p:par>
+        <p:cTn id="1" dur="indefinite" restart="never" nodeType="tmRoot"/>
+      </p:par>
+    </p:tnLst>
+  </p:timing>
+</p:sld>
+</file>
+
+<file path=ppt/slides/slide20.xml><?xml version="1.0" encoding="utf-8"?>
+<p:sld xmlns:a="http://schemas.openxmlformats.org/drawingml/2006/main" xmlns:r="http://schemas.openxmlformats.org/officeDocument/2006/relationships" xmlns:p="http://schemas.openxmlformats.org/presentationml/2006/main">
+  <p:cSld>
+    <p:spTree>
+      <p:nvGrpSpPr>
+        <p:cNvPr id="1" name=""/>
+        <p:cNvGrpSpPr/>
+        <p:nvPr/>
+      </p:nvGrpSpPr>
+      <p:grpSpPr>
+        <a:xfrm>
+          <a:off x="0" y="0"/>
+          <a:ext cx="0" cy="0"/>
+          <a:chOff x="0" y="0"/>
+          <a:chExt cx="0" cy="0"/>
+        </a:xfrm>
+      </p:grpSpPr>
+      <p:sp>
+        <p:nvSpPr>
+          <p:cNvPr id="5" name="Title 4"/>
+          <p:cNvSpPr>
+            <a:spLocks noGrp="1"/>
+          </p:cNvSpPr>
+          <p:nvPr>
+            <p:ph type="title"/>
+          </p:nvPr>
+        </p:nvSpPr>
+        <p:spPr/>
+        <p:txBody>
+          <a:bodyPr/>
+          <a:lstStyle/>
+          <a:p>
+            <a:r>
+              <a:rPr lang="en-US" dirty="0" smtClean="0"/>
+              <a:t>Where am I?</a:t>
+            </a:r>
+            <a:endParaRPr lang="en-US" dirty="0"/>
+          </a:p>
+        </p:txBody>
+      </p:sp>
+      <p:sp>
+        <p:nvSpPr>
+          <p:cNvPr id="7" name="Content Placeholder 6"/>
+          <p:cNvSpPr>
+            <a:spLocks noGrp="1"/>
+          </p:cNvSpPr>
+          <p:nvPr>
+            <p:ph idx="1"/>
+          </p:nvPr>
+        </p:nvSpPr>
+        <p:spPr/>
+        <p:txBody>
+          <a:bodyPr>
+            <a:normAutofit/>
+          </a:bodyPr>
+          <a:lstStyle/>
+          <a:p>
+            <a:r>
+              <a:rPr lang="en-US" sz="2400" dirty="0" smtClean="0"/>
+              <a:t>The open blue circle indicates that you are looking at the most recent local files</a:t>
+            </a:r>
+          </a:p>
+          <a:p>
+            <a:endParaRPr lang="en-US" sz="2400" dirty="0"/>
+          </a:p>
+        </p:txBody>
+      </p:sp>
+      <p:sp>
+        <p:nvSpPr>
+          <p:cNvPr id="4" name="Slide Number Placeholder 3"/>
+          <p:cNvSpPr>
+            <a:spLocks noGrp="1"/>
+          </p:cNvSpPr>
+          <p:nvPr>
+            <p:ph type="sldNum" sz="quarter" idx="12"/>
+          </p:nvPr>
+        </p:nvSpPr>
+        <p:spPr/>
+        <p:txBody>
+          <a:bodyPr/>
+          <a:lstStyle/>
+          <a:p>
+            <a:fld id="{B6F15528-21DE-4FAA-801E-634DDDAF4B2B}" type="slidenum">
+              <a:rPr lang="en-US" smtClean="0"/>
+              <a:pPr/>
+              <a:t>20</a:t>
+            </a:fld>
+            <a:endParaRPr lang="en-US"/>
+          </a:p>
+        </p:txBody>
+      </p:sp>
+      <p:pic>
+        <p:nvPicPr>
+          <p:cNvPr id="6" name="Picture 5"/>
+          <p:cNvPicPr>
+            <a:picLocks noChangeAspect="1"/>
+          </p:cNvPicPr>
+          <p:nvPr/>
+        </p:nvPicPr>
+        <p:blipFill>
+          <a:blip r:embed="rId2">
+            <a:extLst>
+              <a:ext uri="{28A0092B-C50C-407E-A947-70E740481C1C}">
+                <a14:useLocalDpi xmlns:a14="http://schemas.microsoft.com/office/drawing/2010/main" val="0"/>
+              </a:ext>
+            </a:extLst>
+          </a:blip>
+          <a:stretch>
+            <a:fillRect/>
+          </a:stretch>
+        </p:blipFill>
+        <p:spPr>
+          <a:xfrm>
+            <a:off x="1540461" y="2865701"/>
+            <a:ext cx="6122019" cy="3673211"/>
+          </a:xfrm>
+          <a:prstGeom prst="rect">
+            <a:avLst/>
+          </a:prstGeom>
+        </p:spPr>
+      </p:pic>
+      <p:sp>
+        <p:nvSpPr>
+          <p:cNvPr id="2" name="Right Arrow 1"/>
+          <p:cNvSpPr/>
+          <p:nvPr/>
+        </p:nvSpPr>
+        <p:spPr>
+          <a:xfrm rot="15342571">
+            <a:off x="7366840" y="3817003"/>
+            <a:ext cx="506320" cy="272053"/>
+          </a:xfrm>
+          <a:prstGeom prst="rightArrow">
+            <a:avLst/>
+          </a:prstGeom>
+          <a:noFill/>
+          <a:ln>
+            <a:solidFill>
+              <a:srgbClr val="FF0000"/>
+            </a:solidFill>
+          </a:ln>
+        </p:spPr>
+        <p:style>
+          <a:lnRef idx="2">
+            <a:schemeClr val="accent1">
+              <a:shade val="50000"/>
+            </a:schemeClr>
+          </a:lnRef>
+          <a:fillRef idx="1">
+            <a:schemeClr val="accent1"/>
+          </a:fillRef>
+          <a:effectRef idx="0">
+            <a:schemeClr val="accent1"/>
+          </a:effectRef>
+          <a:fontRef idx="minor">
+            <a:schemeClr val="lt1"/>
+          </a:fontRef>
+        </p:style>
+        <p:txBody>
+          <a:bodyPr rot="0" spcFirstLastPara="0" vertOverflow="overflow" horzOverflow="overflow" vert="horz" wrap="square" lIns="91440" tIns="45720" rIns="91440" bIns="45720" numCol="1" spcCol="0" rtlCol="0" fromWordArt="0" anchor="ctr" anchorCtr="0" forceAA="0" compatLnSpc="1">
+            <a:prstTxWarp prst="textNoShape">
+              <a:avLst/>
+            </a:prstTxWarp>
+            <a:noAutofit/>
+          </a:bodyPr>
+          <a:lstStyle/>
+          <a:p>
+            <a:pPr algn="ctr"/>
+            <a:endParaRPr lang="en-US"/>
+          </a:p>
+        </p:txBody>
+      </p:sp>
+      <p:sp>
+        <p:nvSpPr>
+          <p:cNvPr id="3" name="Rounded Rectangle 2"/>
+          <p:cNvSpPr/>
+          <p:nvPr/>
+        </p:nvSpPr>
+        <p:spPr>
+          <a:xfrm>
+            <a:off x="7425693" y="3430889"/>
+            <a:ext cx="207317" cy="181369"/>
+          </a:xfrm>
+          <a:prstGeom prst="roundRect">
+            <a:avLst/>
+          </a:prstGeom>
+          <a:noFill/>
+          <a:ln>
+            <a:solidFill>
+              <a:srgbClr val="FF0000"/>
+            </a:solidFill>
+          </a:ln>
+        </p:spPr>
+        <p:style>
+          <a:lnRef idx="2">
+            <a:schemeClr val="accent1">
+              <a:shade val="50000"/>
+            </a:schemeClr>
+          </a:lnRef>
+          <a:fillRef idx="1">
+            <a:schemeClr val="accent1"/>
+          </a:fillRef>
+          <a:effectRef idx="0">
+            <a:schemeClr val="accent1"/>
+          </a:effectRef>
+          <a:fontRef idx="minor">
+            <a:schemeClr val="lt1"/>
+          </a:fontRef>
+        </p:style>
+        <p:txBody>
+          <a:bodyPr rot="0" spcFirstLastPara="0" vertOverflow="overflow" horzOverflow="overflow" vert="horz" wrap="square" lIns="91440" tIns="45720" rIns="91440" bIns="45720" numCol="1" spcCol="0" rtlCol="0" fromWordArt="0" anchor="ctr" anchorCtr="0" forceAA="0" compatLnSpc="1">
+            <a:prstTxWarp prst="textNoShape">
+              <a:avLst/>
+            </a:prstTxWarp>
+            <a:noAutofit/>
+          </a:bodyPr>
+          <a:lstStyle/>
+          <a:p>
+            <a:pPr algn="ctr"/>
+            <a:endParaRPr lang="en-US"/>
+          </a:p>
+        </p:txBody>
+      </p:sp>
+    </p:spTree>
+    <p:extLst>
+      <p:ext uri="{BB962C8B-B14F-4D97-AF65-F5344CB8AC3E}">
+        <p14:creationId xmlns:p14="http://schemas.microsoft.com/office/powerpoint/2010/main" val="4196171673"/>
+      </p:ext>
+    </p:extLst>
+  </p:cSld>
+  <p:clrMapOvr>
+    <a:masterClrMapping/>
+  </p:clrMapOvr>
+</p:sld>
+</file>
+
+<file path=ppt/slides/slide21.xml><?xml version="1.0" encoding="utf-8"?>
+<p:sld xmlns:a="http://schemas.openxmlformats.org/drawingml/2006/main" xmlns:r="http://schemas.openxmlformats.org/officeDocument/2006/relationships" xmlns:p="http://schemas.openxmlformats.org/presentationml/2006/main">
+  <p:cSld>
+    <p:spTree>
+      <p:nvGrpSpPr>
+        <p:cNvPr id="1" name=""/>
+        <p:cNvGrpSpPr/>
+        <p:nvPr/>
+      </p:nvGrpSpPr>
+      <p:grpSpPr>
+        <a:xfrm>
+          <a:off x="0" y="0"/>
+          <a:ext cx="0" cy="0"/>
+          <a:chOff x="0" y="0"/>
+          <a:chExt cx="0" cy="0"/>
+        </a:xfrm>
+      </p:grpSpPr>
+      <p:sp>
+        <p:nvSpPr>
+          <p:cNvPr id="5" name="Title 4"/>
+          <p:cNvSpPr>
+            <a:spLocks noGrp="1"/>
+          </p:cNvSpPr>
+          <p:nvPr>
+            <p:ph type="title"/>
+          </p:nvPr>
+        </p:nvSpPr>
+        <p:spPr/>
+        <p:txBody>
+          <a:bodyPr/>
+          <a:lstStyle/>
+          <a:p>
+            <a:r>
+              <a:rPr lang="en-US" dirty="0" smtClean="0"/>
+              <a:t>Always start by syncing</a:t>
+            </a:r>
+            <a:endParaRPr lang="en-US" dirty="0"/>
+          </a:p>
+        </p:txBody>
+      </p:sp>
+      <p:sp>
+        <p:nvSpPr>
+          <p:cNvPr id="7" name="Content Placeholder 6"/>
+          <p:cNvSpPr>
+            <a:spLocks noGrp="1"/>
+          </p:cNvSpPr>
+          <p:nvPr>
+            <p:ph idx="1"/>
+          </p:nvPr>
+        </p:nvSpPr>
+        <p:spPr/>
+        <p:txBody>
+          <a:bodyPr>
+            <a:normAutofit/>
+          </a:bodyPr>
+          <a:lstStyle/>
+          <a:p>
+            <a:r>
+              <a:rPr lang="en-US" sz="2400" dirty="0" smtClean="0"/>
+              <a:t>This will download any changes that you or your partner have made on other machines</a:t>
+            </a:r>
+          </a:p>
+          <a:p>
+            <a:endParaRPr lang="en-US" sz="2400" dirty="0"/>
+          </a:p>
+        </p:txBody>
+      </p:sp>
+      <p:sp>
+        <p:nvSpPr>
+          <p:cNvPr id="4" name="Slide Number Placeholder 3"/>
+          <p:cNvSpPr>
+            <a:spLocks noGrp="1"/>
+          </p:cNvSpPr>
+          <p:nvPr>
+            <p:ph type="sldNum" sz="quarter" idx="12"/>
+          </p:nvPr>
+        </p:nvSpPr>
+        <p:spPr/>
+        <p:txBody>
+          <a:bodyPr/>
+          <a:lstStyle/>
+          <a:p>
+            <a:fld id="{B6F15528-21DE-4FAA-801E-634DDDAF4B2B}" type="slidenum">
+              <a:rPr lang="en-US" smtClean="0"/>
+              <a:pPr/>
+              <a:t>21</a:t>
+            </a:fld>
+            <a:endParaRPr lang="en-US"/>
+          </a:p>
+        </p:txBody>
+      </p:sp>
+      <p:pic>
+        <p:nvPicPr>
+          <p:cNvPr id="6" name="Picture 5"/>
+          <p:cNvPicPr>
+            <a:picLocks noChangeAspect="1"/>
+          </p:cNvPicPr>
+          <p:nvPr/>
+        </p:nvPicPr>
+        <p:blipFill>
+          <a:blip r:embed="rId2">
+            <a:extLst>
+              <a:ext uri="{28A0092B-C50C-407E-A947-70E740481C1C}">
+                <a14:useLocalDpi xmlns:a14="http://schemas.microsoft.com/office/drawing/2010/main" val="0"/>
+              </a:ext>
+            </a:extLst>
+          </a:blip>
+          <a:stretch>
+            <a:fillRect/>
+          </a:stretch>
+        </p:blipFill>
+        <p:spPr>
+          <a:xfrm>
+            <a:off x="1540461" y="2865701"/>
+            <a:ext cx="6122019" cy="3673211"/>
+          </a:xfrm>
+          <a:prstGeom prst="rect">
+            <a:avLst/>
+          </a:prstGeom>
+        </p:spPr>
+      </p:pic>
+      <p:sp>
+        <p:nvSpPr>
+          <p:cNvPr id="2" name="Right Arrow 1"/>
+          <p:cNvSpPr/>
+          <p:nvPr/>
+        </p:nvSpPr>
+        <p:spPr>
+          <a:xfrm rot="3405992">
+            <a:off x="6847105" y="2824661"/>
+            <a:ext cx="506320" cy="272053"/>
+          </a:xfrm>
+          <a:prstGeom prst="rightArrow">
+            <a:avLst/>
+          </a:prstGeom>
+          <a:noFill/>
+          <a:ln>
+            <a:solidFill>
+              <a:srgbClr val="FF0000"/>
+            </a:solidFill>
+          </a:ln>
+        </p:spPr>
+        <p:style>
+          <a:lnRef idx="2">
+            <a:schemeClr val="accent1">
+              <a:shade val="50000"/>
+            </a:schemeClr>
+          </a:lnRef>
+          <a:fillRef idx="1">
+            <a:schemeClr val="accent1"/>
+          </a:fillRef>
+          <a:effectRef idx="0">
+            <a:schemeClr val="accent1"/>
+          </a:effectRef>
+          <a:fontRef idx="minor">
+            <a:schemeClr val="lt1"/>
+          </a:fontRef>
+        </p:style>
+        <p:txBody>
+          <a:bodyPr rot="0" spcFirstLastPara="0" vertOverflow="overflow" horzOverflow="overflow" vert="horz" wrap="square" lIns="91440" tIns="45720" rIns="91440" bIns="45720" numCol="1" spcCol="0" rtlCol="0" fromWordArt="0" anchor="ctr" anchorCtr="0" forceAA="0" compatLnSpc="1">
+            <a:prstTxWarp prst="textNoShape">
+              <a:avLst/>
+            </a:prstTxWarp>
+            <a:noAutofit/>
+          </a:bodyPr>
+          <a:lstStyle/>
+          <a:p>
+            <a:pPr algn="ctr"/>
+            <a:endParaRPr lang="en-US"/>
+          </a:p>
+        </p:txBody>
+      </p:sp>
+      <p:sp>
+        <p:nvSpPr>
+          <p:cNvPr id="3" name="Rounded Rectangle 2"/>
+          <p:cNvSpPr/>
+          <p:nvPr/>
+        </p:nvSpPr>
+        <p:spPr>
+          <a:xfrm>
+            <a:off x="7261237" y="3190875"/>
+            <a:ext cx="439725" cy="266700"/>
+          </a:xfrm>
+          <a:prstGeom prst="roundRect">
+            <a:avLst/>
+          </a:prstGeom>
+          <a:noFill/>
+          <a:ln>
+            <a:solidFill>
+              <a:srgbClr val="FF0000"/>
+            </a:solidFill>
+          </a:ln>
+        </p:spPr>
+        <p:style>
+          <a:lnRef idx="2">
+            <a:schemeClr val="accent1">
+              <a:shade val="50000"/>
+            </a:schemeClr>
+          </a:lnRef>
+          <a:fillRef idx="1">
+            <a:schemeClr val="accent1"/>
+          </a:fillRef>
+          <a:effectRef idx="0">
+            <a:schemeClr val="accent1"/>
+          </a:effectRef>
+          <a:fontRef idx="minor">
+            <a:schemeClr val="lt1"/>
+          </a:fontRef>
+        </p:style>
+        <p:txBody>
+          <a:bodyPr rot="0" spcFirstLastPara="0" vertOverflow="overflow" horzOverflow="overflow" vert="horz" wrap="square" lIns="91440" tIns="45720" rIns="91440" bIns="45720" numCol="1" spcCol="0" rtlCol="0" fromWordArt="0" anchor="ctr" anchorCtr="0" forceAA="0" compatLnSpc="1">
+            <a:prstTxWarp prst="textNoShape">
+              <a:avLst/>
+            </a:prstTxWarp>
+            <a:noAutofit/>
+          </a:bodyPr>
+          <a:lstStyle/>
+          <a:p>
+            <a:pPr algn="ctr"/>
+            <a:endParaRPr lang="en-US"/>
+          </a:p>
+        </p:txBody>
+      </p:sp>
+    </p:spTree>
+    <p:extLst>
+      <p:ext uri="{BB962C8B-B14F-4D97-AF65-F5344CB8AC3E}">
+        <p14:creationId xmlns:p14="http://schemas.microsoft.com/office/powerpoint/2010/main" val="497431359"/>
+      </p:ext>
+    </p:extLst>
+  </p:cSld>
+  <p:clrMapOvr>
+    <a:masterClrMapping/>
+  </p:clrMapOvr>
+</p:sld>
+</file>
+
+<file path=ppt/slides/slide22.xml><?xml version="1.0" encoding="utf-8"?>
+<p:sld xmlns:a="http://schemas.openxmlformats.org/drawingml/2006/main" xmlns:r="http://schemas.openxmlformats.org/officeDocument/2006/relationships" xmlns:p="http://schemas.openxmlformats.org/presentationml/2006/main">
+  <p:cSld>
+    <p:spTree>
+      <p:nvGrpSpPr>
+        <p:cNvPr id="1" name=""/>
+        <p:cNvGrpSpPr/>
+        <p:nvPr/>
+      </p:nvGrpSpPr>
+      <p:grpSpPr>
+        <a:xfrm>
+          <a:off x="0" y="0"/>
+          <a:ext cx="0" cy="0"/>
+          <a:chOff x="0" y="0"/>
+          <a:chExt cx="0" cy="0"/>
+        </a:xfrm>
+      </p:grpSpPr>
+      <p:pic>
+        <p:nvPicPr>
+          <p:cNvPr id="8" name="Picture 7"/>
+          <p:cNvPicPr>
+            <a:picLocks noChangeAspect="1"/>
+          </p:cNvPicPr>
+          <p:nvPr/>
+        </p:nvPicPr>
+        <p:blipFill>
+          <a:blip r:embed="rId2">
+            <a:extLst>
+              <a:ext uri="{28A0092B-C50C-407E-A947-70E740481C1C}">
+                <a14:useLocalDpi xmlns:a14="http://schemas.microsoft.com/office/drawing/2010/main" val="0"/>
+              </a:ext>
+            </a:extLst>
+          </a:blip>
+          <a:stretch>
+            <a:fillRect/>
+          </a:stretch>
+        </p:blipFill>
+        <p:spPr>
+          <a:xfrm>
+            <a:off x="1510991" y="2778172"/>
+            <a:ext cx="6122019" cy="3682048"/>
+          </a:xfrm>
+          <a:prstGeom prst="rect">
+            <a:avLst/>
+          </a:prstGeom>
+        </p:spPr>
+      </p:pic>
+      <p:sp>
+        <p:nvSpPr>
+          <p:cNvPr id="5" name="Title 4"/>
+          <p:cNvSpPr>
+            <a:spLocks noGrp="1"/>
+          </p:cNvSpPr>
+          <p:nvPr>
+            <p:ph type="title"/>
+          </p:nvPr>
+        </p:nvSpPr>
+        <p:spPr/>
+        <p:txBody>
+          <a:bodyPr>
+            <a:normAutofit/>
+          </a:bodyPr>
+          <a:lstStyle/>
+          <a:p>
+            <a:r>
+              <a:rPr lang="en-US" dirty="0" smtClean="0"/>
+              <a:t>Click on a dot to see a commit</a:t>
+            </a:r>
+            <a:endParaRPr lang="en-US" dirty="0"/>
+          </a:p>
+        </p:txBody>
+      </p:sp>
+      <p:sp>
+        <p:nvSpPr>
+          <p:cNvPr id="7" name="Content Placeholder 6"/>
+          <p:cNvSpPr>
+            <a:spLocks noGrp="1"/>
+          </p:cNvSpPr>
+          <p:nvPr>
+            <p:ph idx="1"/>
+          </p:nvPr>
+        </p:nvSpPr>
+        <p:spPr/>
+        <p:txBody>
+          <a:bodyPr>
+            <a:normAutofit/>
+          </a:bodyPr>
+          <a:lstStyle/>
+          <a:p>
+            <a:r>
+              <a:rPr lang="en-US" sz="2400" dirty="0" smtClean="0"/>
+              <a:t>Clicking on the last dot will show you what was in your last commit</a:t>
+            </a:r>
+          </a:p>
+          <a:p>
+            <a:r>
+              <a:rPr lang="en-US" sz="2400" dirty="0" smtClean="0"/>
+              <a:t>The dot turns blue</a:t>
+            </a:r>
+            <a:endParaRPr lang="en-US" sz="2400" dirty="0"/>
+          </a:p>
+        </p:txBody>
+      </p:sp>
+      <p:sp>
+        <p:nvSpPr>
+          <p:cNvPr id="4" name="Slide Number Placeholder 3"/>
+          <p:cNvSpPr>
+            <a:spLocks noGrp="1"/>
+          </p:cNvSpPr>
+          <p:nvPr>
+            <p:ph type="sldNum" sz="quarter" idx="12"/>
+          </p:nvPr>
+        </p:nvSpPr>
+        <p:spPr/>
+        <p:txBody>
+          <a:bodyPr/>
+          <a:lstStyle/>
+          <a:p>
+            <a:fld id="{B6F15528-21DE-4FAA-801E-634DDDAF4B2B}" type="slidenum">
+              <a:rPr lang="en-US" smtClean="0"/>
+              <a:pPr/>
+              <a:t>22</a:t>
+            </a:fld>
+            <a:endParaRPr lang="en-US"/>
+          </a:p>
+        </p:txBody>
+      </p:sp>
+      <p:sp>
+        <p:nvSpPr>
+          <p:cNvPr id="2" name="Right Arrow 1"/>
+          <p:cNvSpPr/>
+          <p:nvPr/>
+        </p:nvSpPr>
+        <p:spPr>
+          <a:xfrm rot="5400000">
+            <a:off x="6519903" y="2826121"/>
+            <a:ext cx="506320" cy="272053"/>
+          </a:xfrm>
+          <a:prstGeom prst="rightArrow">
+            <a:avLst/>
+          </a:prstGeom>
+          <a:noFill/>
+          <a:ln>
+            <a:solidFill>
+              <a:srgbClr val="FF0000"/>
+            </a:solidFill>
+          </a:ln>
+        </p:spPr>
+        <p:style>
+          <a:lnRef idx="2">
+            <a:schemeClr val="accent1">
+              <a:shade val="50000"/>
+            </a:schemeClr>
+          </a:lnRef>
+          <a:fillRef idx="1">
+            <a:schemeClr val="accent1"/>
+          </a:fillRef>
+          <a:effectRef idx="0">
+            <a:schemeClr val="accent1"/>
+          </a:effectRef>
+          <a:fontRef idx="minor">
+            <a:schemeClr val="lt1"/>
+          </a:fontRef>
+        </p:style>
+        <p:txBody>
+          <a:bodyPr rot="0" spcFirstLastPara="0" vertOverflow="overflow" horzOverflow="overflow" vert="horz" wrap="square" lIns="91440" tIns="45720" rIns="91440" bIns="45720" numCol="1" spcCol="0" rtlCol="0" fromWordArt="0" anchor="ctr" anchorCtr="0" forceAA="0" compatLnSpc="1">
+            <a:prstTxWarp prst="textNoShape">
+              <a:avLst/>
+            </a:prstTxWarp>
+            <a:noAutofit/>
+          </a:bodyPr>
+          <a:lstStyle/>
+          <a:p>
+            <a:pPr algn="ctr"/>
+            <a:endParaRPr lang="en-US"/>
+          </a:p>
+        </p:txBody>
+      </p:sp>
+      <p:sp>
+        <p:nvSpPr>
+          <p:cNvPr id="3" name="Rounded Rectangle 2"/>
+          <p:cNvSpPr/>
+          <p:nvPr/>
+        </p:nvSpPr>
+        <p:spPr>
+          <a:xfrm>
+            <a:off x="6553200" y="3296204"/>
+            <a:ext cx="439725" cy="266700"/>
+          </a:xfrm>
+          <a:prstGeom prst="roundRect">
+            <a:avLst/>
+          </a:prstGeom>
+          <a:noFill/>
+          <a:ln>
+            <a:solidFill>
+              <a:srgbClr val="FF0000"/>
+            </a:solidFill>
+          </a:ln>
+        </p:spPr>
+        <p:style>
+          <a:lnRef idx="2">
+            <a:schemeClr val="accent1">
+              <a:shade val="50000"/>
+            </a:schemeClr>
+          </a:lnRef>
+          <a:fillRef idx="1">
+            <a:schemeClr val="accent1"/>
+          </a:fillRef>
+          <a:effectRef idx="0">
+            <a:schemeClr val="accent1"/>
+          </a:effectRef>
+          <a:fontRef idx="minor">
+            <a:schemeClr val="lt1"/>
+          </a:fontRef>
+        </p:style>
+        <p:txBody>
+          <a:bodyPr rot="0" spcFirstLastPara="0" vertOverflow="overflow" horzOverflow="overflow" vert="horz" wrap="square" lIns="91440" tIns="45720" rIns="91440" bIns="45720" numCol="1" spcCol="0" rtlCol="0" fromWordArt="0" anchor="ctr" anchorCtr="0" forceAA="0" compatLnSpc="1">
+            <a:prstTxWarp prst="textNoShape">
+              <a:avLst/>
+            </a:prstTxWarp>
+            <a:noAutofit/>
+          </a:bodyPr>
+          <a:lstStyle/>
+          <a:p>
+            <a:pPr algn="ctr"/>
+            <a:endParaRPr lang="en-US"/>
+          </a:p>
+        </p:txBody>
+      </p:sp>
+    </p:spTree>
+    <p:extLst>
+      <p:ext uri="{BB962C8B-B14F-4D97-AF65-F5344CB8AC3E}">
+        <p14:creationId xmlns:p14="http://schemas.microsoft.com/office/powerpoint/2010/main" val="1035014750"/>
+      </p:ext>
+    </p:extLst>
+  </p:cSld>
+  <p:clrMapOvr>
+    <a:masterClrMapping/>
+  </p:clrMapOvr>
+</p:sld>
+</file>
+
+<file path=ppt/slides/slide23.xml><?xml version="1.0" encoding="utf-8"?>
+<p:sld xmlns:a="http://schemas.openxmlformats.org/drawingml/2006/main" xmlns:r="http://schemas.openxmlformats.org/officeDocument/2006/relationships" xmlns:p="http://schemas.openxmlformats.org/presentationml/2006/main">
+  <p:cSld>
+    <p:spTree>
+      <p:nvGrpSpPr>
+        <p:cNvPr id="1" name=""/>
+        <p:cNvGrpSpPr/>
+        <p:nvPr/>
+      </p:nvGrpSpPr>
+      <p:grpSpPr>
+        <a:xfrm>
+          <a:off x="0" y="0"/>
+          <a:ext cx="0" cy="0"/>
+          <a:chOff x="0" y="0"/>
+          <a:chExt cx="0" cy="0"/>
+        </a:xfrm>
+      </p:grpSpPr>
+      <p:sp>
+        <p:nvSpPr>
+          <p:cNvPr id="7" name="Content Placeholder 6"/>
+          <p:cNvSpPr>
+            <a:spLocks noGrp="1"/>
+          </p:cNvSpPr>
+          <p:nvPr>
+            <p:ph idx="1"/>
+          </p:nvPr>
+        </p:nvSpPr>
+        <p:spPr/>
+        <p:txBody>
+          <a:bodyPr>
+            <a:normAutofit/>
+          </a:bodyPr>
+          <a:lstStyle/>
+          <a:p>
+            <a:r>
+              <a:rPr lang="en-US" sz="2400" dirty="0" smtClean="0"/>
+              <a:t>In this view, you can see the unique identifier for this commit</a:t>
+            </a:r>
+          </a:p>
+          <a:p>
+            <a:r>
+              <a:rPr lang="en-US" sz="2400" dirty="0" smtClean="0"/>
+              <a:t>You’ll need it for your </a:t>
+            </a:r>
+            <a:r>
+              <a:rPr lang="en-US" sz="2400" dirty="0" err="1" smtClean="0"/>
+              <a:t>Worksession</a:t>
+            </a:r>
+            <a:r>
+              <a:rPr lang="en-US" sz="2400" dirty="0" smtClean="0"/>
+              <a:t> Report</a:t>
+            </a:r>
+          </a:p>
+          <a:p>
+            <a:endParaRPr lang="en-US" sz="2400" dirty="0"/>
+          </a:p>
+        </p:txBody>
+      </p:sp>
+      <p:pic>
+        <p:nvPicPr>
+          <p:cNvPr id="8" name="Picture 7"/>
+          <p:cNvPicPr>
+            <a:picLocks noChangeAspect="1"/>
+          </p:cNvPicPr>
+          <p:nvPr/>
+        </p:nvPicPr>
+        <p:blipFill>
+          <a:blip r:embed="rId2">
+            <a:extLst>
+              <a:ext uri="{28A0092B-C50C-407E-A947-70E740481C1C}">
+                <a14:useLocalDpi xmlns:a14="http://schemas.microsoft.com/office/drawing/2010/main" val="0"/>
+              </a:ext>
+            </a:extLst>
+          </a:blip>
+          <a:stretch>
+            <a:fillRect/>
+          </a:stretch>
+        </p:blipFill>
+        <p:spPr>
+          <a:xfrm>
+            <a:off x="1510991" y="2778172"/>
+            <a:ext cx="6122019" cy="3682048"/>
+          </a:xfrm>
+          <a:prstGeom prst="rect">
+            <a:avLst/>
+          </a:prstGeom>
+        </p:spPr>
+      </p:pic>
+      <p:sp>
+        <p:nvSpPr>
+          <p:cNvPr id="5" name="Title 4"/>
+          <p:cNvSpPr>
+            <a:spLocks noGrp="1"/>
+          </p:cNvSpPr>
+          <p:nvPr>
+            <p:ph type="title"/>
+          </p:nvPr>
+        </p:nvSpPr>
+        <p:spPr/>
+        <p:txBody>
+          <a:bodyPr>
+            <a:normAutofit/>
+          </a:bodyPr>
+          <a:lstStyle/>
+          <a:p>
+            <a:r>
+              <a:rPr lang="en-US" dirty="0" smtClean="0"/>
+              <a:t>This shows your commit ID</a:t>
+            </a:r>
+            <a:endParaRPr lang="en-US" dirty="0"/>
+          </a:p>
+        </p:txBody>
+      </p:sp>
+      <p:sp>
+        <p:nvSpPr>
+          <p:cNvPr id="4" name="Slide Number Placeholder 3"/>
+          <p:cNvSpPr>
+            <a:spLocks noGrp="1"/>
+          </p:cNvSpPr>
+          <p:nvPr>
+            <p:ph type="sldNum" sz="quarter" idx="12"/>
+          </p:nvPr>
+        </p:nvSpPr>
+        <p:spPr/>
+        <p:txBody>
+          <a:bodyPr/>
+          <a:lstStyle/>
+          <a:p>
+            <a:fld id="{B6F15528-21DE-4FAA-801E-634DDDAF4B2B}" type="slidenum">
+              <a:rPr lang="en-US" smtClean="0"/>
+              <a:pPr/>
+              <a:t>23</a:t>
+            </a:fld>
+            <a:endParaRPr lang="en-US"/>
+          </a:p>
+        </p:txBody>
+      </p:sp>
+      <p:sp>
+        <p:nvSpPr>
+          <p:cNvPr id="2" name="Right Arrow 1"/>
+          <p:cNvSpPr/>
+          <p:nvPr/>
+        </p:nvSpPr>
+        <p:spPr>
+          <a:xfrm rot="5400000">
+            <a:off x="4538701" y="3216886"/>
+            <a:ext cx="506320" cy="272053"/>
+          </a:xfrm>
+          <a:prstGeom prst="rightArrow">
+            <a:avLst/>
+          </a:prstGeom>
+          <a:noFill/>
+          <a:ln>
+            <a:solidFill>
+              <a:srgbClr val="FF0000"/>
+            </a:solidFill>
+          </a:ln>
+        </p:spPr>
+        <p:style>
+          <a:lnRef idx="2">
+            <a:schemeClr val="accent1">
+              <a:shade val="50000"/>
+            </a:schemeClr>
+          </a:lnRef>
+          <a:fillRef idx="1">
+            <a:schemeClr val="accent1"/>
+          </a:fillRef>
+          <a:effectRef idx="0">
+            <a:schemeClr val="accent1"/>
+          </a:effectRef>
+          <a:fontRef idx="minor">
+            <a:schemeClr val="lt1"/>
+          </a:fontRef>
+        </p:style>
+        <p:txBody>
+          <a:bodyPr rot="0" spcFirstLastPara="0" vertOverflow="overflow" horzOverflow="overflow" vert="horz" wrap="square" lIns="91440" tIns="45720" rIns="91440" bIns="45720" numCol="1" spcCol="0" rtlCol="0" fromWordArt="0" anchor="ctr" anchorCtr="0" forceAA="0" compatLnSpc="1">
+            <a:prstTxWarp prst="textNoShape">
+              <a:avLst/>
+            </a:prstTxWarp>
+            <a:noAutofit/>
+          </a:bodyPr>
+          <a:lstStyle/>
+          <a:p>
+            <a:pPr algn="ctr"/>
+            <a:endParaRPr lang="en-US"/>
+          </a:p>
+        </p:txBody>
+      </p:sp>
+      <p:sp>
+        <p:nvSpPr>
+          <p:cNvPr id="3" name="Rounded Rectangle 2"/>
+          <p:cNvSpPr/>
+          <p:nvPr/>
+        </p:nvSpPr>
+        <p:spPr>
+          <a:xfrm>
+            <a:off x="4572000" y="3686969"/>
+            <a:ext cx="439725" cy="266700"/>
+          </a:xfrm>
+          <a:prstGeom prst="roundRect">
+            <a:avLst/>
+          </a:prstGeom>
+          <a:noFill/>
+          <a:ln>
+            <a:solidFill>
+              <a:srgbClr val="FF0000"/>
+            </a:solidFill>
+          </a:ln>
+        </p:spPr>
+        <p:style>
+          <a:lnRef idx="2">
+            <a:schemeClr val="accent1">
+              <a:shade val="50000"/>
+            </a:schemeClr>
+          </a:lnRef>
+          <a:fillRef idx="1">
+            <a:schemeClr val="accent1"/>
+          </a:fillRef>
+          <a:effectRef idx="0">
+            <a:schemeClr val="accent1"/>
+          </a:effectRef>
+          <a:fontRef idx="minor">
+            <a:schemeClr val="lt1"/>
+          </a:fontRef>
+        </p:style>
+        <p:txBody>
+          <a:bodyPr rot="0" spcFirstLastPara="0" vertOverflow="overflow" horzOverflow="overflow" vert="horz" wrap="square" lIns="91440" tIns="45720" rIns="91440" bIns="45720" numCol="1" spcCol="0" rtlCol="0" fromWordArt="0" anchor="ctr" anchorCtr="0" forceAA="0" compatLnSpc="1">
+            <a:prstTxWarp prst="textNoShape">
+              <a:avLst/>
+            </a:prstTxWarp>
+            <a:noAutofit/>
+          </a:bodyPr>
+          <a:lstStyle/>
+          <a:p>
+            <a:pPr algn="ctr"/>
+            <a:endParaRPr lang="en-US"/>
+          </a:p>
+        </p:txBody>
+      </p:sp>
+    </p:spTree>
+    <p:extLst>
+      <p:ext uri="{BB962C8B-B14F-4D97-AF65-F5344CB8AC3E}">
+        <p14:creationId xmlns:p14="http://schemas.microsoft.com/office/powerpoint/2010/main" val="661378437"/>
+      </p:ext>
+    </p:extLst>
+  </p:cSld>
+  <p:clrMapOvr>
+    <a:masterClrMapping/>
+  </p:clrMapOvr>
+</p:sld>
+</file>
+
+<file path=ppt/slides/slide24.xml><?xml version="1.0" encoding="utf-8"?>
+<p:sld xmlns:a="http://schemas.openxmlformats.org/drawingml/2006/main" xmlns:r="http://schemas.openxmlformats.org/officeDocument/2006/relationships" xmlns:p="http://schemas.openxmlformats.org/presentationml/2006/main">
+  <p:cSld>
+    <p:spTree>
+      <p:nvGrpSpPr>
+        <p:cNvPr id="1" name=""/>
+        <p:cNvGrpSpPr/>
+        <p:nvPr/>
+      </p:nvGrpSpPr>
+      <p:grpSpPr>
+        <a:xfrm>
+          <a:off x="0" y="0"/>
+          <a:ext cx="0" cy="0"/>
+          <a:chOff x="0" y="0"/>
+          <a:chExt cx="0" cy="0"/>
+        </a:xfrm>
+      </p:grpSpPr>
+      <p:sp>
+        <p:nvSpPr>
+          <p:cNvPr id="5" name="Title 4"/>
+          <p:cNvSpPr>
+            <a:spLocks noGrp="1"/>
+          </p:cNvSpPr>
+          <p:nvPr>
+            <p:ph type="title"/>
+          </p:nvPr>
+        </p:nvSpPr>
+        <p:spPr/>
+        <p:txBody>
+          <a:bodyPr>
+            <a:normAutofit/>
+          </a:bodyPr>
+          <a:lstStyle/>
+          <a:p>
+            <a:r>
+              <a:rPr lang="en-US" dirty="0" smtClean="0"/>
+              <a:t>Now let’s work on our file</a:t>
+            </a:r>
+            <a:endParaRPr lang="en-US" dirty="0"/>
+          </a:p>
+        </p:txBody>
+      </p:sp>
+      <p:sp>
+        <p:nvSpPr>
+          <p:cNvPr id="7" name="Content Placeholder 6"/>
+          <p:cNvSpPr>
+            <a:spLocks noGrp="1"/>
+          </p:cNvSpPr>
+          <p:nvPr>
+            <p:ph idx="1"/>
+          </p:nvPr>
+        </p:nvSpPr>
+        <p:spPr/>
+        <p:txBody>
+          <a:bodyPr>
+            <a:normAutofit/>
+          </a:bodyPr>
+          <a:lstStyle/>
+          <a:p>
+            <a:r>
+              <a:rPr lang="en-US" sz="2400" dirty="0" smtClean="0"/>
+              <a:t>Now the screen shows an uncommitted change.</a:t>
+            </a:r>
+          </a:p>
+          <a:p>
+            <a:endParaRPr lang="en-US" sz="2400" dirty="0"/>
+          </a:p>
+        </p:txBody>
+      </p:sp>
+      <p:sp>
+        <p:nvSpPr>
+          <p:cNvPr id="4" name="Slide Number Placeholder 3"/>
+          <p:cNvSpPr>
+            <a:spLocks noGrp="1"/>
+          </p:cNvSpPr>
+          <p:nvPr>
+            <p:ph type="sldNum" sz="quarter" idx="12"/>
+          </p:nvPr>
+        </p:nvSpPr>
+        <p:spPr/>
+        <p:txBody>
+          <a:bodyPr/>
+          <a:lstStyle/>
+          <a:p>
+            <a:fld id="{B6F15528-21DE-4FAA-801E-634DDDAF4B2B}" type="slidenum">
+              <a:rPr lang="en-US" smtClean="0"/>
+              <a:pPr/>
+              <a:t>24</a:t>
+            </a:fld>
+            <a:endParaRPr lang="en-US"/>
+          </a:p>
+        </p:txBody>
+      </p:sp>
+      <p:sp>
+        <p:nvSpPr>
+          <p:cNvPr id="2" name="Right Arrow 1"/>
+          <p:cNvSpPr/>
+          <p:nvPr/>
+        </p:nvSpPr>
+        <p:spPr>
+          <a:xfrm rot="5400000">
+            <a:off x="4538701" y="3216886"/>
+            <a:ext cx="506320" cy="272053"/>
+          </a:xfrm>
+          <a:prstGeom prst="rightArrow">
+            <a:avLst/>
+          </a:prstGeom>
+          <a:noFill/>
+          <a:ln>
+            <a:solidFill>
+              <a:srgbClr val="FF0000"/>
+            </a:solidFill>
+          </a:ln>
+        </p:spPr>
+        <p:style>
+          <a:lnRef idx="2">
+            <a:schemeClr val="accent1">
+              <a:shade val="50000"/>
+            </a:schemeClr>
+          </a:lnRef>
+          <a:fillRef idx="1">
+            <a:schemeClr val="accent1"/>
+          </a:fillRef>
+          <a:effectRef idx="0">
+            <a:schemeClr val="accent1"/>
+          </a:effectRef>
+          <a:fontRef idx="minor">
+            <a:schemeClr val="lt1"/>
+          </a:fontRef>
+        </p:style>
+        <p:txBody>
+          <a:bodyPr rot="0" spcFirstLastPara="0" vertOverflow="overflow" horzOverflow="overflow" vert="horz" wrap="square" lIns="91440" tIns="45720" rIns="91440" bIns="45720" numCol="1" spcCol="0" rtlCol="0" fromWordArt="0" anchor="ctr" anchorCtr="0" forceAA="0" compatLnSpc="1">
+            <a:prstTxWarp prst="textNoShape">
+              <a:avLst/>
+            </a:prstTxWarp>
+            <a:noAutofit/>
+          </a:bodyPr>
+          <a:lstStyle/>
+          <a:p>
+            <a:pPr algn="ctr"/>
+            <a:endParaRPr lang="en-US"/>
+          </a:p>
+        </p:txBody>
+      </p:sp>
+      <p:sp>
+        <p:nvSpPr>
+          <p:cNvPr id="3" name="Rounded Rectangle 2"/>
+          <p:cNvSpPr/>
+          <p:nvPr/>
+        </p:nvSpPr>
+        <p:spPr>
+          <a:xfrm>
+            <a:off x="4572000" y="3686969"/>
+            <a:ext cx="439725" cy="266700"/>
+          </a:xfrm>
+          <a:prstGeom prst="roundRect">
+            <a:avLst/>
+          </a:prstGeom>
+          <a:noFill/>
+          <a:ln>
+            <a:solidFill>
+              <a:srgbClr val="FF0000"/>
+            </a:solidFill>
+          </a:ln>
+        </p:spPr>
+        <p:style>
+          <a:lnRef idx="2">
+            <a:schemeClr val="accent1">
+              <a:shade val="50000"/>
+            </a:schemeClr>
+          </a:lnRef>
+          <a:fillRef idx="1">
+            <a:schemeClr val="accent1"/>
+          </a:fillRef>
+          <a:effectRef idx="0">
+            <a:schemeClr val="accent1"/>
+          </a:effectRef>
+          <a:fontRef idx="minor">
+            <a:schemeClr val="lt1"/>
+          </a:fontRef>
+        </p:style>
+        <p:txBody>
+          <a:bodyPr rot="0" spcFirstLastPara="0" vertOverflow="overflow" horzOverflow="overflow" vert="horz" wrap="square" lIns="91440" tIns="45720" rIns="91440" bIns="45720" numCol="1" spcCol="0" rtlCol="0" fromWordArt="0" anchor="ctr" anchorCtr="0" forceAA="0" compatLnSpc="1">
+            <a:prstTxWarp prst="textNoShape">
+              <a:avLst/>
+            </a:prstTxWarp>
+            <a:noAutofit/>
+          </a:bodyPr>
+          <a:lstStyle/>
+          <a:p>
+            <a:pPr algn="ctr"/>
+            <a:endParaRPr lang="en-US"/>
+          </a:p>
+        </p:txBody>
+      </p:sp>
+      <p:pic>
+        <p:nvPicPr>
+          <p:cNvPr id="6" name="Picture 5"/>
+          <p:cNvPicPr>
+            <a:picLocks noChangeAspect="1"/>
+          </p:cNvPicPr>
+          <p:nvPr/>
+        </p:nvPicPr>
+        <p:blipFill>
+          <a:blip r:embed="rId2">
+            <a:extLst>
+              <a:ext uri="{28A0092B-C50C-407E-A947-70E740481C1C}">
+                <a14:useLocalDpi xmlns:a14="http://schemas.microsoft.com/office/drawing/2010/main" val="0"/>
+              </a:ext>
+            </a:extLst>
+          </a:blip>
+          <a:stretch>
+            <a:fillRect/>
+          </a:stretch>
+        </p:blipFill>
+        <p:spPr>
+          <a:xfrm>
+            <a:off x="1736876" y="2672441"/>
+            <a:ext cx="6109970" cy="3665982"/>
+          </a:xfrm>
+          <a:prstGeom prst="rect">
+            <a:avLst/>
+          </a:prstGeom>
+        </p:spPr>
+      </p:pic>
+      <p:sp>
+        <p:nvSpPr>
+          <p:cNvPr id="9" name="Rounded Rectangle 8"/>
+          <p:cNvSpPr/>
+          <p:nvPr/>
+        </p:nvSpPr>
+        <p:spPr>
+          <a:xfrm>
+            <a:off x="6612397" y="2672441"/>
+            <a:ext cx="944628" cy="350369"/>
+          </a:xfrm>
+          <a:prstGeom prst="roundRect">
+            <a:avLst/>
+          </a:prstGeom>
+          <a:noFill/>
+          <a:ln>
+            <a:solidFill>
+              <a:srgbClr val="FF0000"/>
+            </a:solidFill>
+          </a:ln>
+        </p:spPr>
+        <p:style>
+          <a:lnRef idx="2">
+            <a:schemeClr val="accent1">
+              <a:shade val="50000"/>
+            </a:schemeClr>
+          </a:lnRef>
+          <a:fillRef idx="1">
+            <a:schemeClr val="accent1"/>
+          </a:fillRef>
+          <a:effectRef idx="0">
+            <a:schemeClr val="accent1"/>
+          </a:effectRef>
+          <a:fontRef idx="minor">
+            <a:schemeClr val="lt1"/>
+          </a:fontRef>
+        </p:style>
+        <p:txBody>
+          <a:bodyPr rot="0" spcFirstLastPara="0" vertOverflow="overflow" horzOverflow="overflow" vert="horz" wrap="square" lIns="91440" tIns="45720" rIns="91440" bIns="45720" numCol="1" spcCol="0" rtlCol="0" fromWordArt="0" anchor="ctr" anchorCtr="0" forceAA="0" compatLnSpc="1">
+            <a:prstTxWarp prst="textNoShape">
+              <a:avLst/>
+            </a:prstTxWarp>
+            <a:noAutofit/>
+          </a:bodyPr>
+          <a:lstStyle/>
+          <a:p>
+            <a:pPr algn="ctr"/>
+            <a:endParaRPr lang="en-US"/>
+          </a:p>
+        </p:txBody>
+      </p:sp>
+      <p:sp>
+        <p:nvSpPr>
+          <p:cNvPr id="10" name="Right Arrow 9"/>
+          <p:cNvSpPr/>
+          <p:nvPr/>
+        </p:nvSpPr>
+        <p:spPr>
+          <a:xfrm rot="5400000">
+            <a:off x="6831550" y="2252845"/>
+            <a:ext cx="506320" cy="272053"/>
+          </a:xfrm>
+          <a:prstGeom prst="rightArrow">
+            <a:avLst/>
+          </a:prstGeom>
+          <a:noFill/>
+          <a:ln>
+            <a:solidFill>
+              <a:srgbClr val="FF0000"/>
+            </a:solidFill>
+          </a:ln>
+        </p:spPr>
+        <p:style>
+          <a:lnRef idx="2">
+            <a:schemeClr val="accent1">
+              <a:shade val="50000"/>
+            </a:schemeClr>
+          </a:lnRef>
+          <a:fillRef idx="1">
+            <a:schemeClr val="accent1"/>
+          </a:fillRef>
+          <a:effectRef idx="0">
+            <a:schemeClr val="accent1"/>
+          </a:effectRef>
+          <a:fontRef idx="minor">
+            <a:schemeClr val="lt1"/>
+          </a:fontRef>
+        </p:style>
+        <p:txBody>
+          <a:bodyPr rot="0" spcFirstLastPara="0" vertOverflow="overflow" horzOverflow="overflow" vert="horz" wrap="square" lIns="91440" tIns="45720" rIns="91440" bIns="45720" numCol="1" spcCol="0" rtlCol="0" fromWordArt="0" anchor="ctr" anchorCtr="0" forceAA="0" compatLnSpc="1">
+            <a:prstTxWarp prst="textNoShape">
+              <a:avLst/>
+            </a:prstTxWarp>
+            <a:noAutofit/>
+          </a:bodyPr>
+          <a:lstStyle/>
+          <a:p>
+            <a:pPr algn="ctr"/>
+            <a:endParaRPr lang="en-US"/>
+          </a:p>
+        </p:txBody>
+      </p:sp>
+    </p:spTree>
+    <p:extLst>
+      <p:ext uri="{BB962C8B-B14F-4D97-AF65-F5344CB8AC3E}">
+        <p14:creationId xmlns:p14="http://schemas.microsoft.com/office/powerpoint/2010/main" val="781616964"/>
+      </p:ext>
+    </p:extLst>
+  </p:cSld>
+  <p:clrMapOvr>
+    <a:masterClrMapping/>
+  </p:clrMapOvr>
+</p:sld>
+</file>
+
+<file path=ppt/slides/slide25.xml><?xml version="1.0" encoding="utf-8"?>
+<p:sld xmlns:a="http://schemas.openxmlformats.org/drawingml/2006/main" xmlns:r="http://schemas.openxmlformats.org/officeDocument/2006/relationships" xmlns:p="http://schemas.openxmlformats.org/presentationml/2006/main">
+  <p:cSld>
+    <p:spTree>
+      <p:nvGrpSpPr>
+        <p:cNvPr id="1" name=""/>
+        <p:cNvGrpSpPr/>
+        <p:nvPr/>
+      </p:nvGrpSpPr>
+      <p:grpSpPr>
+        <a:xfrm>
+          <a:off x="0" y="0"/>
+          <a:ext cx="0" cy="0"/>
+          <a:chOff x="0" y="0"/>
+          <a:chExt cx="0" cy="0"/>
+        </a:xfrm>
+      </p:grpSpPr>
+      <p:sp>
+        <p:nvSpPr>
+          <p:cNvPr id="14" name="Right Arrow 13"/>
+          <p:cNvSpPr/>
+          <p:nvPr/>
+        </p:nvSpPr>
+        <p:spPr>
+          <a:xfrm rot="5400000">
+            <a:off x="6087182" y="4129476"/>
+            <a:ext cx="506320" cy="272053"/>
+          </a:xfrm>
+          <a:prstGeom prst="rightArrow">
+            <a:avLst/>
+          </a:prstGeom>
+          <a:noFill/>
+          <a:ln>
+            <a:solidFill>
+              <a:srgbClr val="FF0000"/>
+            </a:solidFill>
+          </a:ln>
+        </p:spPr>
+        <p:style>
+          <a:lnRef idx="2">
+            <a:schemeClr val="accent1">
+              <a:shade val="50000"/>
+            </a:schemeClr>
+          </a:lnRef>
+          <a:fillRef idx="1">
+            <a:schemeClr val="accent1"/>
+          </a:fillRef>
+          <a:effectRef idx="0">
+            <a:schemeClr val="accent1"/>
+          </a:effectRef>
+          <a:fontRef idx="minor">
+            <a:schemeClr val="lt1"/>
+          </a:fontRef>
+        </p:style>
+        <p:txBody>
+          <a:bodyPr rot="0" spcFirstLastPara="0" vertOverflow="overflow" horzOverflow="overflow" vert="horz" wrap="square" lIns="91440" tIns="45720" rIns="91440" bIns="45720" numCol="1" spcCol="0" rtlCol="0" fromWordArt="0" anchor="ctr" anchorCtr="0" forceAA="0" compatLnSpc="1">
+            <a:prstTxWarp prst="textNoShape">
+              <a:avLst/>
+            </a:prstTxWarp>
+            <a:noAutofit/>
+          </a:bodyPr>
+          <a:lstStyle/>
+          <a:p>
+            <a:pPr algn="ctr"/>
+            <a:endParaRPr lang="en-US"/>
+          </a:p>
+        </p:txBody>
+      </p:sp>
+      <p:sp>
+        <p:nvSpPr>
+          <p:cNvPr id="7" name="Content Placeholder 6"/>
+          <p:cNvSpPr>
+            <a:spLocks noGrp="1"/>
+          </p:cNvSpPr>
+          <p:nvPr>
+            <p:ph idx="1"/>
+          </p:nvPr>
+        </p:nvSpPr>
+        <p:spPr/>
+        <p:txBody>
+          <a:bodyPr>
+            <a:normAutofit/>
+          </a:bodyPr>
+          <a:lstStyle/>
+          <a:p>
+            <a:r>
+              <a:rPr lang="en-US" sz="2400" dirty="0" smtClean="0"/>
+              <a:t>We write a commit message.  Then we’ll click on “Commit to Master”</a:t>
+            </a:r>
+          </a:p>
+          <a:p>
+            <a:endParaRPr lang="en-US" sz="2400" dirty="0"/>
+          </a:p>
+        </p:txBody>
+      </p:sp>
+      <p:pic>
+        <p:nvPicPr>
+          <p:cNvPr id="12" name="Picture 11"/>
+          <p:cNvPicPr>
+            <a:picLocks noChangeAspect="1"/>
+          </p:cNvPicPr>
+          <p:nvPr/>
+        </p:nvPicPr>
+        <p:blipFill>
+          <a:blip r:embed="rId2">
+            <a:extLst>
+              <a:ext uri="{28A0092B-C50C-407E-A947-70E740481C1C}">
+                <a14:useLocalDpi xmlns:a14="http://schemas.microsoft.com/office/drawing/2010/main" val="0"/>
+              </a:ext>
+            </a:extLst>
+          </a:blip>
+          <a:stretch>
+            <a:fillRect/>
+          </a:stretch>
+        </p:blipFill>
+        <p:spPr>
+          <a:xfrm>
+            <a:off x="1531573" y="2672440"/>
+            <a:ext cx="6080855" cy="3648513"/>
+          </a:xfrm>
+          <a:prstGeom prst="rect">
+            <a:avLst/>
+          </a:prstGeom>
+        </p:spPr>
+      </p:pic>
+      <p:sp>
+        <p:nvSpPr>
+          <p:cNvPr id="5" name="Title 4"/>
+          <p:cNvSpPr>
+            <a:spLocks noGrp="1"/>
+          </p:cNvSpPr>
+          <p:nvPr>
+            <p:ph type="title"/>
+          </p:nvPr>
+        </p:nvSpPr>
+        <p:spPr/>
+        <p:txBody>
+          <a:bodyPr>
+            <a:normAutofit/>
+          </a:bodyPr>
+          <a:lstStyle/>
+          <a:p>
+            <a:r>
+              <a:rPr lang="en-US" dirty="0" smtClean="0"/>
+              <a:t>Next, we commit our work</a:t>
+            </a:r>
+            <a:endParaRPr lang="en-US" dirty="0"/>
+          </a:p>
+        </p:txBody>
+      </p:sp>
+      <p:sp>
+        <p:nvSpPr>
+          <p:cNvPr id="4" name="Slide Number Placeholder 3"/>
+          <p:cNvSpPr>
+            <a:spLocks noGrp="1"/>
+          </p:cNvSpPr>
+          <p:nvPr>
+            <p:ph type="sldNum" sz="quarter" idx="12"/>
+          </p:nvPr>
+        </p:nvSpPr>
+        <p:spPr/>
+        <p:txBody>
+          <a:bodyPr/>
+          <a:lstStyle/>
+          <a:p>
+            <a:fld id="{B6F15528-21DE-4FAA-801E-634DDDAF4B2B}" type="slidenum">
+              <a:rPr lang="en-US" smtClean="0"/>
+              <a:pPr/>
+              <a:t>25</a:t>
+            </a:fld>
+            <a:endParaRPr lang="en-US"/>
+          </a:p>
+        </p:txBody>
+      </p:sp>
+      <p:sp>
+        <p:nvSpPr>
+          <p:cNvPr id="13" name="Rounded Rectangle 12"/>
+          <p:cNvSpPr/>
+          <p:nvPr/>
+        </p:nvSpPr>
+        <p:spPr>
+          <a:xfrm>
+            <a:off x="2505153" y="5468540"/>
+            <a:ext cx="1900592" cy="887810"/>
+          </a:xfrm>
+          <a:prstGeom prst="roundRect">
+            <a:avLst/>
+          </a:prstGeom>
+          <a:noFill/>
+          <a:ln>
+            <a:solidFill>
+              <a:srgbClr val="FF0000"/>
+            </a:solidFill>
+          </a:ln>
+        </p:spPr>
+        <p:style>
+          <a:lnRef idx="2">
+            <a:schemeClr val="accent1">
+              <a:shade val="50000"/>
+            </a:schemeClr>
+          </a:lnRef>
+          <a:fillRef idx="1">
+            <a:schemeClr val="accent1"/>
+          </a:fillRef>
+          <a:effectRef idx="0">
+            <a:schemeClr val="accent1"/>
+          </a:effectRef>
+          <a:fontRef idx="minor">
+            <a:schemeClr val="lt1"/>
+          </a:fontRef>
+        </p:style>
+        <p:txBody>
+          <a:bodyPr rot="0" spcFirstLastPara="0" vertOverflow="overflow" horzOverflow="overflow" vert="horz" wrap="square" lIns="91440" tIns="45720" rIns="91440" bIns="45720" numCol="1" spcCol="0" rtlCol="0" fromWordArt="0" anchor="ctr" anchorCtr="0" forceAA="0" compatLnSpc="1">
+            <a:prstTxWarp prst="textNoShape">
+              <a:avLst/>
+            </a:prstTxWarp>
+            <a:noAutofit/>
+          </a:bodyPr>
+          <a:lstStyle/>
+          <a:p>
+            <a:pPr algn="ctr"/>
+            <a:endParaRPr lang="en-US"/>
+          </a:p>
+        </p:txBody>
+      </p:sp>
+    </p:spTree>
+    <p:extLst>
+      <p:ext uri="{BB962C8B-B14F-4D97-AF65-F5344CB8AC3E}">
+        <p14:creationId xmlns:p14="http://schemas.microsoft.com/office/powerpoint/2010/main" val="3238662336"/>
+      </p:ext>
+    </p:extLst>
+  </p:cSld>
+  <p:clrMapOvr>
+    <a:masterClrMapping/>
+  </p:clrMapOvr>
+</p:sld>
+</file>
+
+<file path=ppt/slides/slide26.xml><?xml version="1.0" encoding="utf-8"?>
+<p:sld xmlns:a="http://schemas.openxmlformats.org/drawingml/2006/main" xmlns:r="http://schemas.openxmlformats.org/officeDocument/2006/relationships" xmlns:p="http://schemas.openxmlformats.org/presentationml/2006/main">
+  <p:cSld>
+    <p:spTree>
+      <p:nvGrpSpPr>
+        <p:cNvPr id="1" name=""/>
+        <p:cNvGrpSpPr/>
+        <p:nvPr/>
+      </p:nvGrpSpPr>
+      <p:grpSpPr>
+        <a:xfrm>
+          <a:off x="0" y="0"/>
+          <a:ext cx="0" cy="0"/>
+          <a:chOff x="0" y="0"/>
+          <a:chExt cx="0" cy="0"/>
+        </a:xfrm>
+      </p:grpSpPr>
+      <p:sp>
+        <p:nvSpPr>
+          <p:cNvPr id="14" name="Right Arrow 13"/>
+          <p:cNvSpPr/>
+          <p:nvPr/>
+        </p:nvSpPr>
+        <p:spPr>
+          <a:xfrm rot="5400000">
+            <a:off x="6087182" y="4129476"/>
+            <a:ext cx="506320" cy="272053"/>
+          </a:xfrm>
+          <a:prstGeom prst="rightArrow">
+            <a:avLst/>
+          </a:prstGeom>
+          <a:noFill/>
+          <a:ln>
+            <a:solidFill>
+              <a:srgbClr val="FF0000"/>
+            </a:solidFill>
+          </a:ln>
+        </p:spPr>
+        <p:style>
+          <a:lnRef idx="2">
+            <a:schemeClr val="accent1">
+              <a:shade val="50000"/>
+            </a:schemeClr>
+          </a:lnRef>
+          <a:fillRef idx="1">
+            <a:schemeClr val="accent1"/>
+          </a:fillRef>
+          <a:effectRef idx="0">
+            <a:schemeClr val="accent1"/>
+          </a:effectRef>
+          <a:fontRef idx="minor">
+            <a:schemeClr val="lt1"/>
+          </a:fontRef>
+        </p:style>
+        <p:txBody>
+          <a:bodyPr rot="0" spcFirstLastPara="0" vertOverflow="overflow" horzOverflow="overflow" vert="horz" wrap="square" lIns="91440" tIns="45720" rIns="91440" bIns="45720" numCol="1" spcCol="0" rtlCol="0" fromWordArt="0" anchor="ctr" anchorCtr="0" forceAA="0" compatLnSpc="1">
+            <a:prstTxWarp prst="textNoShape">
+              <a:avLst/>
+            </a:prstTxWarp>
+            <a:noAutofit/>
+          </a:bodyPr>
+          <a:lstStyle/>
+          <a:p>
+            <a:pPr algn="ctr"/>
+            <a:endParaRPr lang="en-US"/>
+          </a:p>
+        </p:txBody>
+      </p:sp>
+      <p:sp>
+        <p:nvSpPr>
+          <p:cNvPr id="7" name="Content Placeholder 6"/>
+          <p:cNvSpPr>
+            <a:spLocks noGrp="1"/>
+          </p:cNvSpPr>
+          <p:nvPr>
+            <p:ph idx="1"/>
+          </p:nvPr>
+        </p:nvSpPr>
+        <p:spPr/>
+        <p:txBody>
+          <a:bodyPr>
+            <a:normAutofit/>
+          </a:bodyPr>
+          <a:lstStyle/>
+          <a:p>
+            <a:r>
+              <a:rPr lang="en-US" sz="2400" dirty="0" smtClean="0"/>
+              <a:t>Now it says “No uncommitted changes” again.</a:t>
+            </a:r>
+          </a:p>
+          <a:p>
+            <a:r>
+              <a:rPr lang="en-US" sz="2400" dirty="0" smtClean="0"/>
+              <a:t>You can also undo the commit if you want.</a:t>
+            </a:r>
+            <a:endParaRPr lang="en-US" sz="2400" dirty="0"/>
+          </a:p>
+        </p:txBody>
+      </p:sp>
+      <p:sp>
+        <p:nvSpPr>
+          <p:cNvPr id="5" name="Title 4"/>
+          <p:cNvSpPr>
+            <a:spLocks noGrp="1"/>
+          </p:cNvSpPr>
+          <p:nvPr>
+            <p:ph type="title"/>
+          </p:nvPr>
+        </p:nvSpPr>
+        <p:spPr/>
+        <p:txBody>
+          <a:bodyPr>
+            <a:normAutofit fontScale="90000"/>
+          </a:bodyPr>
+          <a:lstStyle/>
+          <a:p>
+            <a:r>
+              <a:rPr lang="en-US" dirty="0" smtClean="0"/>
+              <a:t>Here’s what you’ll see after a commit</a:t>
+            </a:r>
+            <a:endParaRPr lang="en-US" dirty="0"/>
+          </a:p>
+        </p:txBody>
+      </p:sp>
+      <p:sp>
+        <p:nvSpPr>
+          <p:cNvPr id="4" name="Slide Number Placeholder 3"/>
+          <p:cNvSpPr>
+            <a:spLocks noGrp="1"/>
+          </p:cNvSpPr>
+          <p:nvPr>
+            <p:ph type="sldNum" sz="quarter" idx="12"/>
+          </p:nvPr>
+        </p:nvSpPr>
+        <p:spPr/>
+        <p:txBody>
+          <a:bodyPr/>
+          <a:lstStyle/>
+          <a:p>
+            <a:fld id="{B6F15528-21DE-4FAA-801E-634DDDAF4B2B}" type="slidenum">
+              <a:rPr lang="en-US" smtClean="0"/>
+              <a:pPr/>
+              <a:t>26</a:t>
+            </a:fld>
+            <a:endParaRPr lang="en-US"/>
+          </a:p>
+        </p:txBody>
+      </p:sp>
+      <p:pic>
+        <p:nvPicPr>
+          <p:cNvPr id="2" name="Picture 1"/>
+          <p:cNvPicPr>
+            <a:picLocks noChangeAspect="1"/>
+          </p:cNvPicPr>
+          <p:nvPr/>
+        </p:nvPicPr>
+        <p:blipFill>
+          <a:blip r:embed="rId2">
+            <a:extLst>
+              <a:ext uri="{28A0092B-C50C-407E-A947-70E740481C1C}">
+                <a14:useLocalDpi xmlns:a14="http://schemas.microsoft.com/office/drawing/2010/main" val="0"/>
+              </a:ext>
+            </a:extLst>
+          </a:blip>
+          <a:stretch>
+            <a:fillRect/>
+          </a:stretch>
+        </p:blipFill>
+        <p:spPr>
+          <a:xfrm>
+            <a:off x="1696321" y="2672440"/>
+            <a:ext cx="5751358" cy="3450815"/>
+          </a:xfrm>
+          <a:prstGeom prst="rect">
+            <a:avLst/>
+          </a:prstGeom>
+        </p:spPr>
+      </p:pic>
+    </p:spTree>
+    <p:extLst>
+      <p:ext uri="{BB962C8B-B14F-4D97-AF65-F5344CB8AC3E}">
+        <p14:creationId xmlns:p14="http://schemas.microsoft.com/office/powerpoint/2010/main" val="883220849"/>
+      </p:ext>
+    </p:extLst>
+  </p:cSld>
+  <p:clrMapOvr>
+    <a:masterClrMapping/>
+  </p:clrMapOvr>
+</p:sld>
+</file>
+
+<file path=ppt/slides/slide27.xml><?xml version="1.0" encoding="utf-8"?>
+<p:sld xmlns:a="http://schemas.openxmlformats.org/drawingml/2006/main" xmlns:r="http://schemas.openxmlformats.org/officeDocument/2006/relationships" xmlns:p="http://schemas.openxmlformats.org/presentationml/2006/main">
+  <p:cSld>
+    <p:spTree>
+      <p:nvGrpSpPr>
+        <p:cNvPr id="1" name=""/>
+        <p:cNvGrpSpPr/>
+        <p:nvPr/>
+      </p:nvGrpSpPr>
+      <p:grpSpPr>
+        <a:xfrm>
+          <a:off x="0" y="0"/>
+          <a:ext cx="0" cy="0"/>
+          <a:chOff x="0" y="0"/>
+          <a:chExt cx="0" cy="0"/>
+        </a:xfrm>
+      </p:grpSpPr>
+      <p:sp>
+        <p:nvSpPr>
+          <p:cNvPr id="14" name="Right Arrow 13"/>
+          <p:cNvSpPr/>
+          <p:nvPr/>
+        </p:nvSpPr>
+        <p:spPr>
+          <a:xfrm rot="5400000">
+            <a:off x="6087182" y="4129476"/>
+            <a:ext cx="506320" cy="272053"/>
+          </a:xfrm>
+          <a:prstGeom prst="rightArrow">
+            <a:avLst/>
+          </a:prstGeom>
+          <a:noFill/>
+          <a:ln>
+            <a:solidFill>
+              <a:srgbClr val="FF0000"/>
+            </a:solidFill>
+          </a:ln>
+        </p:spPr>
+        <p:style>
+          <a:lnRef idx="2">
+            <a:schemeClr val="accent1">
+              <a:shade val="50000"/>
+            </a:schemeClr>
+          </a:lnRef>
+          <a:fillRef idx="1">
+            <a:schemeClr val="accent1"/>
+          </a:fillRef>
+          <a:effectRef idx="0">
+            <a:schemeClr val="accent1"/>
+          </a:effectRef>
+          <a:fontRef idx="minor">
+            <a:schemeClr val="lt1"/>
+          </a:fontRef>
+        </p:style>
+        <p:txBody>
+          <a:bodyPr rot="0" spcFirstLastPara="0" vertOverflow="overflow" horzOverflow="overflow" vert="horz" wrap="square" lIns="91440" tIns="45720" rIns="91440" bIns="45720" numCol="1" spcCol="0" rtlCol="0" fromWordArt="0" anchor="ctr" anchorCtr="0" forceAA="0" compatLnSpc="1">
+            <a:prstTxWarp prst="textNoShape">
+              <a:avLst/>
+            </a:prstTxWarp>
+            <a:noAutofit/>
+          </a:bodyPr>
+          <a:lstStyle/>
+          <a:p>
+            <a:pPr algn="ctr"/>
+            <a:endParaRPr lang="en-US"/>
+          </a:p>
+        </p:txBody>
+      </p:sp>
+      <p:sp>
+        <p:nvSpPr>
+          <p:cNvPr id="7" name="Content Placeholder 6"/>
+          <p:cNvSpPr>
+            <a:spLocks noGrp="1"/>
+          </p:cNvSpPr>
+          <p:nvPr>
+            <p:ph idx="1"/>
+          </p:nvPr>
+        </p:nvSpPr>
+        <p:spPr/>
+        <p:txBody>
+          <a:bodyPr>
+            <a:normAutofit/>
+          </a:bodyPr>
+          <a:lstStyle/>
+          <a:p>
+            <a:r>
+              <a:rPr lang="en-US" sz="2400" dirty="0" smtClean="0"/>
+              <a:t>Click on the open circle to see what was in your commit, and to record the commit ID.  Here’s that screen again:</a:t>
+            </a:r>
+          </a:p>
+          <a:p>
+            <a:endParaRPr lang="en-US" sz="2400" dirty="0"/>
+          </a:p>
+        </p:txBody>
+      </p:sp>
+      <p:sp>
+        <p:nvSpPr>
+          <p:cNvPr id="5" name="Title 4"/>
+          <p:cNvSpPr>
+            <a:spLocks noGrp="1"/>
+          </p:cNvSpPr>
+          <p:nvPr>
+            <p:ph type="title"/>
+          </p:nvPr>
+        </p:nvSpPr>
+        <p:spPr/>
+        <p:txBody>
+          <a:bodyPr>
+            <a:normAutofit/>
+          </a:bodyPr>
+          <a:lstStyle/>
+          <a:p>
+            <a:r>
+              <a:rPr lang="en-US" dirty="0" smtClean="0"/>
+              <a:t>Be sure to record the commit ID</a:t>
+            </a:r>
+            <a:endParaRPr lang="en-US" dirty="0"/>
+          </a:p>
+        </p:txBody>
+      </p:sp>
+      <p:sp>
+        <p:nvSpPr>
+          <p:cNvPr id="4" name="Slide Number Placeholder 3"/>
+          <p:cNvSpPr>
+            <a:spLocks noGrp="1"/>
+          </p:cNvSpPr>
+          <p:nvPr>
+            <p:ph type="sldNum" sz="quarter" idx="12"/>
+          </p:nvPr>
+        </p:nvSpPr>
+        <p:spPr/>
+        <p:txBody>
+          <a:bodyPr/>
+          <a:lstStyle/>
+          <a:p>
+            <a:fld id="{B6F15528-21DE-4FAA-801E-634DDDAF4B2B}" type="slidenum">
+              <a:rPr lang="en-US" smtClean="0"/>
+              <a:pPr/>
+              <a:t>27</a:t>
+            </a:fld>
+            <a:endParaRPr lang="en-US"/>
+          </a:p>
+        </p:txBody>
+      </p:sp>
+      <p:pic>
+        <p:nvPicPr>
+          <p:cNvPr id="8" name="Picture 7"/>
+          <p:cNvPicPr>
+            <a:picLocks noChangeAspect="1"/>
+          </p:cNvPicPr>
+          <p:nvPr/>
+        </p:nvPicPr>
+        <p:blipFill>
+          <a:blip r:embed="rId2">
+            <a:extLst>
+              <a:ext uri="{28A0092B-C50C-407E-A947-70E740481C1C}">
+                <a14:useLocalDpi xmlns:a14="http://schemas.microsoft.com/office/drawing/2010/main" val="0"/>
+              </a:ext>
+            </a:extLst>
+          </a:blip>
+          <a:stretch>
+            <a:fillRect/>
+          </a:stretch>
+        </p:blipFill>
+        <p:spPr>
+          <a:xfrm>
+            <a:off x="1510991" y="2672440"/>
+            <a:ext cx="6122019" cy="3682048"/>
+          </a:xfrm>
+          <a:prstGeom prst="rect">
+            <a:avLst/>
+          </a:prstGeom>
+        </p:spPr>
+      </p:pic>
+      <p:sp>
+        <p:nvSpPr>
+          <p:cNvPr id="9" name="Right Arrow 8"/>
+          <p:cNvSpPr/>
+          <p:nvPr/>
+        </p:nvSpPr>
+        <p:spPr>
+          <a:xfrm rot="5400000">
+            <a:off x="4531144" y="3118646"/>
+            <a:ext cx="506320" cy="272053"/>
+          </a:xfrm>
+          <a:prstGeom prst="rightArrow">
+            <a:avLst/>
+          </a:prstGeom>
+          <a:noFill/>
+          <a:ln>
+            <a:solidFill>
+              <a:srgbClr val="FF0000"/>
+            </a:solidFill>
+          </a:ln>
+        </p:spPr>
+        <p:style>
+          <a:lnRef idx="2">
+            <a:schemeClr val="accent1">
+              <a:shade val="50000"/>
+            </a:schemeClr>
+          </a:lnRef>
+          <a:fillRef idx="1">
+            <a:schemeClr val="accent1"/>
+          </a:fillRef>
+          <a:effectRef idx="0">
+            <a:schemeClr val="accent1"/>
+          </a:effectRef>
+          <a:fontRef idx="minor">
+            <a:schemeClr val="lt1"/>
+          </a:fontRef>
+        </p:style>
+        <p:txBody>
+          <a:bodyPr rot="0" spcFirstLastPara="0" vertOverflow="overflow" horzOverflow="overflow" vert="horz" wrap="square" lIns="91440" tIns="45720" rIns="91440" bIns="45720" numCol="1" spcCol="0" rtlCol="0" fromWordArt="0" anchor="ctr" anchorCtr="0" forceAA="0" compatLnSpc="1">
+            <a:prstTxWarp prst="textNoShape">
+              <a:avLst/>
+            </a:prstTxWarp>
+            <a:noAutofit/>
+          </a:bodyPr>
+          <a:lstStyle/>
+          <a:p>
+            <a:pPr algn="ctr"/>
+            <a:endParaRPr lang="en-US"/>
+          </a:p>
+        </p:txBody>
+      </p:sp>
+      <p:sp>
+        <p:nvSpPr>
+          <p:cNvPr id="10" name="Rounded Rectangle 9"/>
+          <p:cNvSpPr/>
+          <p:nvPr/>
+        </p:nvSpPr>
+        <p:spPr>
+          <a:xfrm>
+            <a:off x="4425345" y="3627370"/>
+            <a:ext cx="717917" cy="201977"/>
+          </a:xfrm>
+          <a:prstGeom prst="roundRect">
+            <a:avLst/>
+          </a:prstGeom>
+          <a:noFill/>
+          <a:ln>
+            <a:solidFill>
+              <a:srgbClr val="FF0000"/>
+            </a:solidFill>
+          </a:ln>
+        </p:spPr>
+        <p:style>
+          <a:lnRef idx="2">
+            <a:schemeClr val="accent1">
+              <a:shade val="50000"/>
+            </a:schemeClr>
+          </a:lnRef>
+          <a:fillRef idx="1">
+            <a:schemeClr val="accent1"/>
+          </a:fillRef>
+          <a:effectRef idx="0">
+            <a:schemeClr val="accent1"/>
+          </a:effectRef>
+          <a:fontRef idx="minor">
+            <a:schemeClr val="lt1"/>
+          </a:fontRef>
+        </p:style>
+        <p:txBody>
+          <a:bodyPr rot="0" spcFirstLastPara="0" vertOverflow="overflow" horzOverflow="overflow" vert="horz" wrap="square" lIns="91440" tIns="45720" rIns="91440" bIns="45720" numCol="1" spcCol="0" rtlCol="0" fromWordArt="0" anchor="ctr" anchorCtr="0" forceAA="0" compatLnSpc="1">
+            <a:prstTxWarp prst="textNoShape">
+              <a:avLst/>
+            </a:prstTxWarp>
+            <a:noAutofit/>
+          </a:bodyPr>
+          <a:lstStyle/>
+          <a:p>
+            <a:pPr algn="ctr"/>
+            <a:endParaRPr lang="en-US"/>
+          </a:p>
+        </p:txBody>
+      </p:sp>
+    </p:spTree>
+    <p:extLst>
+      <p:ext uri="{BB962C8B-B14F-4D97-AF65-F5344CB8AC3E}">
+        <p14:creationId xmlns:p14="http://schemas.microsoft.com/office/powerpoint/2010/main" val="1796460452"/>
+      </p:ext>
+    </p:extLst>
+  </p:cSld>
+  <p:clrMapOvr>
+    <a:masterClrMapping/>
+  </p:clrMapOvr>
+</p:sld>
+</file>
+
+<file path=ppt/slides/slide28.xml><?xml version="1.0" encoding="utf-8"?>
+<p:sld xmlns:a="http://schemas.openxmlformats.org/drawingml/2006/main" xmlns:r="http://schemas.openxmlformats.org/officeDocument/2006/relationships" xmlns:p="http://schemas.openxmlformats.org/presentationml/2006/main">
+  <p:cSld>
+    <p:spTree>
+      <p:nvGrpSpPr>
+        <p:cNvPr id="1" name=""/>
+        <p:cNvGrpSpPr/>
+        <p:nvPr/>
+      </p:nvGrpSpPr>
+      <p:grpSpPr>
+        <a:xfrm>
+          <a:off x="0" y="0"/>
+          <a:ext cx="0" cy="0"/>
+          <a:chOff x="0" y="0"/>
+          <a:chExt cx="0" cy="0"/>
+        </a:xfrm>
+      </p:grpSpPr>
+      <p:sp>
+        <p:nvSpPr>
+          <p:cNvPr id="14" name="Right Arrow 13"/>
+          <p:cNvSpPr/>
+          <p:nvPr/>
+        </p:nvSpPr>
+        <p:spPr>
+          <a:xfrm rot="5400000">
+            <a:off x="6087182" y="4129476"/>
+            <a:ext cx="506320" cy="272053"/>
+          </a:xfrm>
+          <a:prstGeom prst="rightArrow">
+            <a:avLst/>
+          </a:prstGeom>
+          <a:noFill/>
+          <a:ln>
+            <a:solidFill>
+              <a:srgbClr val="FF0000"/>
+            </a:solidFill>
+          </a:ln>
+        </p:spPr>
+        <p:style>
+          <a:lnRef idx="2">
+            <a:schemeClr val="accent1">
+              <a:shade val="50000"/>
+            </a:schemeClr>
+          </a:lnRef>
+          <a:fillRef idx="1">
+            <a:schemeClr val="accent1"/>
+          </a:fillRef>
+          <a:effectRef idx="0">
+            <a:schemeClr val="accent1"/>
+          </a:effectRef>
+          <a:fontRef idx="minor">
+            <a:schemeClr val="lt1"/>
+          </a:fontRef>
+        </p:style>
+        <p:txBody>
+          <a:bodyPr rot="0" spcFirstLastPara="0" vertOverflow="overflow" horzOverflow="overflow" vert="horz" wrap="square" lIns="91440" tIns="45720" rIns="91440" bIns="45720" numCol="1" spcCol="0" rtlCol="0" fromWordArt="0" anchor="ctr" anchorCtr="0" forceAA="0" compatLnSpc="1">
+            <a:prstTxWarp prst="textNoShape">
+              <a:avLst/>
+            </a:prstTxWarp>
+            <a:noAutofit/>
+          </a:bodyPr>
+          <a:lstStyle/>
+          <a:p>
+            <a:pPr algn="ctr"/>
+            <a:endParaRPr lang="en-US"/>
+          </a:p>
+        </p:txBody>
+      </p:sp>
+      <p:sp>
+        <p:nvSpPr>
+          <p:cNvPr id="7" name="Content Placeholder 6"/>
+          <p:cNvSpPr>
+            <a:spLocks noGrp="1"/>
+          </p:cNvSpPr>
+          <p:nvPr>
+            <p:ph idx="1"/>
+          </p:nvPr>
+        </p:nvSpPr>
+        <p:spPr/>
+        <p:txBody>
+          <a:bodyPr>
+            <a:normAutofit/>
+          </a:bodyPr>
+          <a:lstStyle/>
+          <a:p>
+            <a:r>
+              <a:rPr lang="en-US" sz="2400" dirty="0" smtClean="0"/>
+              <a:t>Your work is not saved on the server until you sync.</a:t>
+            </a:r>
+          </a:p>
+          <a:p>
+            <a:endParaRPr lang="en-US" sz="2400" dirty="0"/>
+          </a:p>
+        </p:txBody>
+      </p:sp>
+      <p:sp>
+        <p:nvSpPr>
+          <p:cNvPr id="5" name="Title 4"/>
+          <p:cNvSpPr>
+            <a:spLocks noGrp="1"/>
+          </p:cNvSpPr>
+          <p:nvPr>
+            <p:ph type="title"/>
+          </p:nvPr>
+        </p:nvSpPr>
+        <p:spPr/>
+        <p:txBody>
+          <a:bodyPr>
+            <a:normAutofit/>
+          </a:bodyPr>
+          <a:lstStyle/>
+          <a:p>
+            <a:r>
+              <a:rPr lang="en-US" dirty="0" smtClean="0"/>
+              <a:t>Be sure to sync!!!</a:t>
+            </a:r>
+            <a:endParaRPr lang="en-US" dirty="0"/>
+          </a:p>
+        </p:txBody>
+      </p:sp>
+      <p:sp>
+        <p:nvSpPr>
+          <p:cNvPr id="4" name="Slide Number Placeholder 3"/>
+          <p:cNvSpPr>
+            <a:spLocks noGrp="1"/>
+          </p:cNvSpPr>
+          <p:nvPr>
+            <p:ph type="sldNum" sz="quarter" idx="12"/>
+          </p:nvPr>
+        </p:nvSpPr>
+        <p:spPr/>
+        <p:txBody>
+          <a:bodyPr/>
+          <a:lstStyle/>
+          <a:p>
+            <a:fld id="{B6F15528-21DE-4FAA-801E-634DDDAF4B2B}" type="slidenum">
+              <a:rPr lang="en-US" smtClean="0"/>
+              <a:pPr/>
+              <a:t>28</a:t>
+            </a:fld>
+            <a:endParaRPr lang="en-US"/>
+          </a:p>
+        </p:txBody>
+      </p:sp>
+      <p:pic>
+        <p:nvPicPr>
+          <p:cNvPr id="8" name="Picture 7"/>
+          <p:cNvPicPr>
+            <a:picLocks noChangeAspect="1"/>
+          </p:cNvPicPr>
+          <p:nvPr/>
+        </p:nvPicPr>
+        <p:blipFill>
+          <a:blip r:embed="rId2">
+            <a:extLst>
+              <a:ext uri="{28A0092B-C50C-407E-A947-70E740481C1C}">
+                <a14:useLocalDpi xmlns:a14="http://schemas.microsoft.com/office/drawing/2010/main" val="0"/>
+              </a:ext>
+            </a:extLst>
+          </a:blip>
+          <a:stretch>
+            <a:fillRect/>
+          </a:stretch>
+        </p:blipFill>
+        <p:spPr>
+          <a:xfrm>
+            <a:off x="1510991" y="2672440"/>
+            <a:ext cx="6122019" cy="3682048"/>
+          </a:xfrm>
+          <a:prstGeom prst="rect">
+            <a:avLst/>
+          </a:prstGeom>
+        </p:spPr>
+      </p:pic>
+      <p:sp>
+        <p:nvSpPr>
+          <p:cNvPr id="9" name="Right Arrow 8"/>
+          <p:cNvSpPr/>
+          <p:nvPr/>
+        </p:nvSpPr>
+        <p:spPr>
+          <a:xfrm rot="5400000">
+            <a:off x="7180789" y="2529904"/>
+            <a:ext cx="506320" cy="272053"/>
+          </a:xfrm>
+          <a:prstGeom prst="rightArrow">
+            <a:avLst/>
+          </a:prstGeom>
+          <a:noFill/>
+          <a:ln>
+            <a:solidFill>
+              <a:srgbClr val="FF0000"/>
+            </a:solidFill>
+          </a:ln>
+        </p:spPr>
+        <p:style>
+          <a:lnRef idx="2">
+            <a:schemeClr val="accent1">
+              <a:shade val="50000"/>
+            </a:schemeClr>
+          </a:lnRef>
+          <a:fillRef idx="1">
+            <a:schemeClr val="accent1"/>
+          </a:fillRef>
+          <a:effectRef idx="0">
+            <a:schemeClr val="accent1"/>
+          </a:effectRef>
+          <a:fontRef idx="minor">
+            <a:schemeClr val="lt1"/>
+          </a:fontRef>
+        </p:style>
+        <p:txBody>
+          <a:bodyPr rot="0" spcFirstLastPara="0" vertOverflow="overflow" horzOverflow="overflow" vert="horz" wrap="square" lIns="91440" tIns="45720" rIns="91440" bIns="45720" numCol="1" spcCol="0" rtlCol="0" fromWordArt="0" anchor="ctr" anchorCtr="0" forceAA="0" compatLnSpc="1">
+            <a:prstTxWarp prst="textNoShape">
+              <a:avLst/>
+            </a:prstTxWarp>
+            <a:noAutofit/>
+          </a:bodyPr>
+          <a:lstStyle/>
+          <a:p>
+            <a:pPr algn="ctr"/>
+            <a:endParaRPr lang="en-US"/>
+          </a:p>
+        </p:txBody>
+      </p:sp>
+      <p:sp>
+        <p:nvSpPr>
+          <p:cNvPr id="10" name="Rounded Rectangle 9"/>
+          <p:cNvSpPr/>
+          <p:nvPr/>
+        </p:nvSpPr>
+        <p:spPr>
+          <a:xfrm>
+            <a:off x="7234890" y="2976563"/>
+            <a:ext cx="398120" cy="295275"/>
+          </a:xfrm>
+          <a:prstGeom prst="roundRect">
+            <a:avLst/>
+          </a:prstGeom>
+          <a:noFill/>
+          <a:ln>
+            <a:solidFill>
+              <a:srgbClr val="FF0000"/>
+            </a:solidFill>
+          </a:ln>
+        </p:spPr>
+        <p:style>
+          <a:lnRef idx="2">
+            <a:schemeClr val="accent1">
+              <a:shade val="50000"/>
+            </a:schemeClr>
+          </a:lnRef>
+          <a:fillRef idx="1">
+            <a:schemeClr val="accent1"/>
+          </a:fillRef>
+          <a:effectRef idx="0">
+            <a:schemeClr val="accent1"/>
+          </a:effectRef>
+          <a:fontRef idx="minor">
+            <a:schemeClr val="lt1"/>
+          </a:fontRef>
+        </p:style>
+        <p:txBody>
+          <a:bodyPr rot="0" spcFirstLastPara="0" vertOverflow="overflow" horzOverflow="overflow" vert="horz" wrap="square" lIns="91440" tIns="45720" rIns="91440" bIns="45720" numCol="1" spcCol="0" rtlCol="0" fromWordArt="0" anchor="ctr" anchorCtr="0" forceAA="0" compatLnSpc="1">
+            <a:prstTxWarp prst="textNoShape">
+              <a:avLst/>
+            </a:prstTxWarp>
+            <a:noAutofit/>
+          </a:bodyPr>
+          <a:lstStyle/>
+          <a:p>
+            <a:pPr algn="ctr"/>
+            <a:endParaRPr lang="en-US"/>
+          </a:p>
+        </p:txBody>
+      </p:sp>
+    </p:spTree>
+    <p:extLst>
+      <p:ext uri="{BB962C8B-B14F-4D97-AF65-F5344CB8AC3E}">
+        <p14:creationId xmlns:p14="http://schemas.microsoft.com/office/powerpoint/2010/main" val="1977270635"/>
+      </p:ext>
+    </p:extLst>
+  </p:cSld>
+  <p:clrMapOvr>
+    <a:masterClrMapping/>
+  </p:clrMapOvr>
+</p:sld>
+</file>
+
+<file path=ppt/slides/slide29.xml><?xml version="1.0" encoding="utf-8"?>
+<p:sld xmlns:a="http://schemas.openxmlformats.org/drawingml/2006/main" xmlns:r="http://schemas.openxmlformats.org/officeDocument/2006/relationships" xmlns:p="http://schemas.openxmlformats.org/presentationml/2006/main">
+  <p:cSld>
+    <p:spTree>
+      <p:nvGrpSpPr>
+        <p:cNvPr id="1" name=""/>
+        <p:cNvGrpSpPr/>
+        <p:nvPr/>
+      </p:nvGrpSpPr>
+      <p:grpSpPr>
+        <a:xfrm>
+          <a:off x="0" y="0"/>
+          <a:ext cx="0" cy="0"/>
+          <a:chOff x="0" y="0"/>
+          <a:chExt cx="0" cy="0"/>
+        </a:xfrm>
+      </p:grpSpPr>
+      <p:sp>
+        <p:nvSpPr>
+          <p:cNvPr id="2" name="Title 1"/>
+          <p:cNvSpPr>
+            <a:spLocks noGrp="1"/>
+          </p:cNvSpPr>
+          <p:nvPr>
+            <p:ph type="title"/>
+          </p:nvPr>
+        </p:nvSpPr>
+        <p:spPr/>
+        <p:txBody>
+          <a:bodyPr/>
+          <a:lstStyle/>
+          <a:p>
+            <a:r>
+              <a:rPr lang="en-US" dirty="0" smtClean="0"/>
+              <a:t>Summary</a:t>
+            </a:r>
+            <a:endParaRPr lang="en-US" dirty="0"/>
+          </a:p>
+        </p:txBody>
+      </p:sp>
+      <p:sp>
+        <p:nvSpPr>
+          <p:cNvPr id="3" name="Content Placeholder 2"/>
+          <p:cNvSpPr>
+            <a:spLocks noGrp="1"/>
+          </p:cNvSpPr>
+          <p:nvPr>
+            <p:ph idx="1"/>
+          </p:nvPr>
+        </p:nvSpPr>
+        <p:spPr/>
+        <p:txBody>
+          <a:bodyPr/>
+          <a:lstStyle/>
+          <a:p>
+            <a:r>
+              <a:rPr lang="en-US" dirty="0" smtClean="0"/>
+              <a:t>In this lesson you have learned</a:t>
+            </a:r>
+          </a:p>
+          <a:p>
+            <a:pPr lvl="1"/>
+            <a:r>
+              <a:rPr lang="en-US" dirty="0" smtClean="0"/>
+              <a:t>that </a:t>
+            </a:r>
+            <a:r>
+              <a:rPr lang="en-US" dirty="0" err="1" smtClean="0"/>
+              <a:t>git</a:t>
+            </a:r>
+            <a:r>
+              <a:rPr lang="en-US" dirty="0" smtClean="0"/>
+              <a:t> creates a mini-</a:t>
+            </a:r>
+            <a:r>
+              <a:rPr lang="en-US" dirty="0" err="1" smtClean="0"/>
+              <a:t>filesystem</a:t>
+            </a:r>
+            <a:r>
+              <a:rPr lang="en-US" dirty="0" smtClean="0"/>
+              <a:t> in your directory</a:t>
+            </a:r>
+          </a:p>
+          <a:p>
+            <a:pPr lvl="1"/>
+            <a:r>
+              <a:rPr lang="en-US" dirty="0" smtClean="0"/>
+              <a:t>what commit, push, pull, and sync do</a:t>
+            </a:r>
+          </a:p>
+          <a:p>
+            <a:pPr lvl="1"/>
+            <a:r>
+              <a:rPr lang="en-US" dirty="0" smtClean="0"/>
+              <a:t>the elements of the basic </a:t>
+            </a:r>
+            <a:r>
+              <a:rPr lang="en-US" dirty="0" err="1" smtClean="0"/>
+              <a:t>git</a:t>
+            </a:r>
+            <a:r>
+              <a:rPr lang="en-US" dirty="0" smtClean="0"/>
+              <a:t> workflow</a:t>
+            </a:r>
+          </a:p>
+          <a:p>
+            <a:pPr lvl="1"/>
+            <a:r>
+              <a:rPr lang="en-US" dirty="0" smtClean="0"/>
+              <a:t>how </a:t>
+            </a:r>
+            <a:r>
+              <a:rPr lang="en-US" dirty="0" err="1" smtClean="0"/>
+              <a:t>git</a:t>
+            </a:r>
+            <a:r>
+              <a:rPr lang="en-US" dirty="0" smtClean="0"/>
+              <a:t> allows you to work across multiple computers</a:t>
+            </a:r>
+          </a:p>
+          <a:p>
+            <a:pPr lvl="1"/>
+            <a:r>
+              <a:rPr lang="en-US" dirty="0" smtClean="0"/>
+              <a:t>how </a:t>
+            </a:r>
+            <a:r>
+              <a:rPr lang="en-US" dirty="0" err="1" smtClean="0"/>
+              <a:t>git</a:t>
+            </a:r>
+            <a:r>
+              <a:rPr lang="en-US" dirty="0" smtClean="0"/>
+              <a:t> allows you and a partner to work together</a:t>
+            </a:r>
+            <a:endParaRPr lang="en-US" dirty="0"/>
+          </a:p>
+        </p:txBody>
+      </p:sp>
+      <p:sp>
+        <p:nvSpPr>
+          <p:cNvPr id="4" name="Slide Number Placeholder 3"/>
+          <p:cNvSpPr>
+            <a:spLocks noGrp="1"/>
+          </p:cNvSpPr>
+          <p:nvPr>
+            <p:ph type="sldNum" sz="quarter" idx="12"/>
+          </p:nvPr>
+        </p:nvSpPr>
+        <p:spPr/>
+        <p:txBody>
+          <a:bodyPr/>
+          <a:lstStyle/>
+          <a:p>
+            <a:fld id="{B6F15528-21DE-4FAA-801E-634DDDAF4B2B}" type="slidenum">
+              <a:rPr lang="en-US" smtClean="0"/>
+              <a:pPr/>
+              <a:t>29</a:t>
+            </a:fld>
+            <a:endParaRPr lang="en-US"/>
+          </a:p>
+        </p:txBody>
+      </p:sp>
+    </p:spTree>
+    <p:extLst>
+      <p:ext uri="{BB962C8B-B14F-4D97-AF65-F5344CB8AC3E}">
+        <p14:creationId xmlns:p14="http://schemas.microsoft.com/office/powerpoint/2010/main" val="976030362"/>
       </p:ext>
     </p:extLst>
   </p:cSld>
@@ -46231,7 +48884,40 @@
       </a:bgFillStyleLst>
     </a:fmtScheme>
   </a:themeElements>
-  <a:objectDefaults/>
+  <a:objectDefaults>
+    <a:spDef>
+      <a:spPr>
+        <a:noFill/>
+        <a:ln>
+          <a:solidFill>
+            <a:srgbClr val="FF0000"/>
+          </a:solidFill>
+        </a:ln>
+      </a:spPr>
+      <a:bodyPr rtlCol="0" anchor="ctr"/>
+      <a:lstStyle>
+        <a:defPPr algn="ctr">
+          <a:defRPr/>
+        </a:defPPr>
+      </a:lstStyle>
+      <a:style>
+        <a:lnRef idx="2">
+          <a:schemeClr val="accent1">
+            <a:shade val="50000"/>
+          </a:schemeClr>
+        </a:lnRef>
+        <a:fillRef idx="1">
+          <a:schemeClr val="accent1"/>
+        </a:fillRef>
+        <a:effectRef idx="0">
+          <a:schemeClr val="accent1"/>
+        </a:effectRef>
+        <a:fontRef idx="minor">
+          <a:schemeClr val="lt1"/>
+        </a:fontRef>
+      </a:style>
+    </a:spDef>
+  </a:objectDefaults>
   <a:extraClrSchemeLst/>
 </a:theme>
 </file>

</xml_diff>

<commit_message>
added slide on Work Session Report to L0.5
</commit_message>
<xml_diff>
--- a/Slides/Lesson 0.5 Introduction to Git.pptx
+++ b/Slides/Lesson 0.5 Introduction to Git.pptx
@@ -5,7 +5,7 @@
     <p:sldMasterId id="2147483648" r:id="rId1"/>
   </p:sldMasterIdLst>
   <p:notesMasterIdLst>
-    <p:notesMasterId r:id="rId31"/>
+    <p:notesMasterId r:id="rId32"/>
   </p:notesMasterIdLst>
   <p:sldIdLst>
     <p:sldId id="256" r:id="rId2"/>
@@ -36,12 +36,13 @@
     <p:sldId id="282" r:id="rId27"/>
     <p:sldId id="283" r:id="rId28"/>
     <p:sldId id="284" r:id="rId29"/>
-    <p:sldId id="272" r:id="rId30"/>
+    <p:sldId id="285" r:id="rId30"/>
+    <p:sldId id="272" r:id="rId31"/>
   </p:sldIdLst>
   <p:sldSz cx="9144000" cy="6858000" type="screen4x3"/>
   <p:notesSz cx="6858000" cy="9144000"/>
   <p:custDataLst>
-    <p:tags r:id="rId32"/>
+    <p:tags r:id="rId33"/>
   </p:custDataLst>
   <p:defaultTextStyle>
     <a:defPPr>
@@ -45358,7 +45359,23 @@
           <a:p>
             <a:r>
               <a:rPr lang="en-US" sz="2400" dirty="0" smtClean="0"/>
-              <a:t>In this view, you can see the unique identifier for this commit</a:t>
+              <a:t>In this view, you can see the </a:t>
+            </a:r>
+            <a:r>
+              <a:rPr lang="en-US" sz="2400" dirty="0" smtClean="0"/>
+              <a:t>first 6 characters of the unique </a:t>
+            </a:r>
+            <a:r>
+              <a:rPr lang="en-US" sz="2400" dirty="0" smtClean="0"/>
+              <a:t>identifier </a:t>
+            </a:r>
+            <a:r>
+              <a:rPr lang="en-US" sz="2400" dirty="0" smtClean="0"/>
+              <a:t>(“the SHA”) for </a:t>
+            </a:r>
+            <a:r>
+              <a:rPr lang="en-US" sz="2400" dirty="0" smtClean="0"/>
+              <a:t>this commit</a:t>
             </a:r>
           </a:p>
           <a:p>
@@ -45429,7 +45446,11 @@
           <a:p>
             <a:r>
               <a:rPr lang="en-US" dirty="0" smtClean="0"/>
-              <a:t>This shows your commit ID</a:t>
+              <a:t>This shows your commit </a:t>
+            </a:r>
+            <a:r>
+              <a:rPr lang="en-US" dirty="0" smtClean="0"/>
+              <a:t>SHA</a:t>
             </a:r>
             <a:endParaRPr lang="en-US" dirty="0"/>
           </a:p>
@@ -46430,7 +46451,15 @@
           <a:p>
             <a:r>
               <a:rPr lang="en-US" sz="2400" dirty="0" smtClean="0"/>
-              <a:t>Click on the open circle to see what was in your commit, and to record the commit ID.  Here’s that screen again:</a:t>
+              <a:t>Click on the open circle to see what was in your commit, and to record the commit </a:t>
+            </a:r>
+            <a:r>
+              <a:rPr lang="en-US" sz="2400" dirty="0" smtClean="0"/>
+              <a:t>SHA.  </a:t>
+            </a:r>
+            <a:r>
+              <a:rPr lang="en-US" sz="2400" dirty="0" smtClean="0"/>
+              <a:t>Here’s that screen again:</a:t>
             </a:r>
           </a:p>
           <a:p>
@@ -46457,7 +46486,11 @@
           <a:p>
             <a:r>
               <a:rPr lang="en-US" dirty="0" smtClean="0"/>
-              <a:t>Be sure to record the commit ID</a:t>
+              <a:t>Be sure to record the commit </a:t>
+            </a:r>
+            <a:r>
+              <a:rPr lang="en-US" dirty="0" smtClean="0"/>
+              <a:t>SHA</a:t>
             </a:r>
             <a:endParaRPr lang="en-US" dirty="0"/>
           </a:p>
@@ -46955,7 +46988,7 @@
           <a:p>
             <a:r>
               <a:rPr lang="en-US" dirty="0" smtClean="0"/>
-              <a:t>Summary</a:t>
+              <a:t>Submit a Work Session Report</a:t>
             </a:r>
             <a:endParaRPr lang="en-US" dirty="0"/>
           </a:p>
@@ -46968,94 +47001,41 @@
             <a:spLocks noGrp="1"/>
           </p:cNvSpPr>
           <p:nvPr>
-            <p:ph idx="1"/>
+            <p:ph sz="half" idx="1"/>
           </p:nvPr>
         </p:nvSpPr>
         <p:spPr/>
         <p:txBody>
-          <a:bodyPr/>
+          <a:bodyPr>
+            <a:normAutofit/>
+          </a:bodyPr>
           <a:lstStyle/>
           <a:p>
             <a:r>
-              <a:rPr lang="en-US" dirty="0" smtClean="0"/>
-              <a:t>In this lesson you have learned</a:t>
+              <a:rPr lang="en-US" sz="2400" dirty="0" smtClean="0"/>
+              <a:t>At the end of your work session, submit a work session report via the web.</a:t>
             </a:r>
           </a:p>
           <a:p>
-            <a:pPr lvl="1"/>
             <a:r>
-              <a:rPr lang="en-US" dirty="0" smtClean="0"/>
-              <a:t>that </a:t>
-            </a:r>
-            <a:r>
-              <a:rPr lang="en-US" dirty="0" err="1" smtClean="0"/>
-              <a:t>git</a:t>
-            </a:r>
-            <a:r>
-              <a:rPr lang="en-US" dirty="0" smtClean="0"/>
-              <a:t> creates a mini-</a:t>
-            </a:r>
-            <a:r>
-              <a:rPr lang="en-US" dirty="0" err="1" smtClean="0"/>
-              <a:t>filesystem</a:t>
-            </a:r>
-            <a:r>
-              <a:rPr lang="en-US" dirty="0" smtClean="0"/>
-              <a:t> in your directory</a:t>
+              <a:rPr lang="en-US" sz="2400" dirty="0" smtClean="0"/>
+              <a:t>The URL for the work session report will appear in each problem set.</a:t>
             </a:r>
           </a:p>
           <a:p>
-            <a:pPr lvl="1"/>
             <a:r>
-              <a:rPr lang="en-US" dirty="0" smtClean="0"/>
-              <a:t>what commit, push, pull, and sync do</a:t>
-            </a:r>
-          </a:p>
-          <a:p>
-            <a:pPr lvl="1"/>
-            <a:r>
-              <a:rPr lang="en-US" dirty="0" smtClean="0"/>
-              <a:t>the elements of the basic </a:t>
+              <a:rPr lang="en-US" sz="2400" dirty="0" smtClean="0"/>
+              <a:t>The report will ask for the SHA of your last commit.  You can get this from the </a:t>
             </a:r>
             <a:r>
-              <a:rPr lang="en-US" dirty="0" err="1" smtClean="0"/>
-              <a:t>git</a:t>
+              <a:rPr lang="en-US" sz="2400" dirty="0" err="1" smtClean="0"/>
+              <a:t>Github</a:t>
             </a:r>
             <a:r>
-              <a:rPr lang="en-US" dirty="0" smtClean="0"/>
-              <a:t> workflow</a:t>
+              <a:rPr lang="en-US" sz="2400" dirty="0" smtClean="0"/>
+              <a:t> Desktop, as we’ve shown you.</a:t>
             </a:r>
-          </a:p>
-          <a:p>
-            <a:pPr lvl="1"/>
-            <a:r>
-              <a:rPr lang="en-US" dirty="0" smtClean="0"/>
-              <a:t>how </a:t>
-            </a:r>
-            <a:r>
-              <a:rPr lang="en-US" dirty="0" err="1" smtClean="0"/>
-              <a:t>git</a:t>
-            </a:r>
-            <a:r>
-              <a:rPr lang="en-US" dirty="0" smtClean="0"/>
-              <a:t> allows you to work across multiple computers</a:t>
-            </a:r>
-          </a:p>
-          <a:p>
-            <a:pPr lvl="1"/>
-            <a:r>
-              <a:rPr lang="en-US" dirty="0" smtClean="0"/>
-              <a:t>how </a:t>
-            </a:r>
-            <a:r>
-              <a:rPr lang="en-US" dirty="0" err="1" smtClean="0"/>
-              <a:t>git</a:t>
-            </a:r>
-            <a:r>
-              <a:rPr lang="en-US" dirty="0" smtClean="0"/>
-              <a:t> allows you and a partner to work together</a:t>
-            </a:r>
-            <a:endParaRPr lang="en-US" dirty="0"/>
+            <a:endParaRPr lang="en-US" sz="2400" dirty="0"/>
           </a:p>
         </p:txBody>
       </p:sp>
@@ -47083,23 +47063,92 @@
           </a:p>
         </p:txBody>
       </p:sp>
+      <p:pic>
+        <p:nvPicPr>
+          <p:cNvPr id="5" name="Picture 4"/>
+          <p:cNvPicPr>
+            <a:picLocks noChangeAspect="1"/>
+          </p:cNvPicPr>
+          <p:nvPr/>
+        </p:nvPicPr>
+        <p:blipFill>
+          <a:blip r:embed="rId2">
+            <a:extLst>
+              <a:ext uri="{28A0092B-C50C-407E-A947-70E740481C1C}">
+                <a14:useLocalDpi xmlns:a14="http://schemas.microsoft.com/office/drawing/2010/main" val="0"/>
+              </a:ext>
+            </a:extLst>
+          </a:blip>
+          <a:stretch>
+            <a:fillRect/>
+          </a:stretch>
+        </p:blipFill>
+        <p:spPr>
+          <a:xfrm>
+            <a:off x="4708027" y="1600200"/>
+            <a:ext cx="3452183" cy="4224252"/>
+          </a:xfrm>
+          <a:prstGeom prst="rect">
+            <a:avLst/>
+          </a:prstGeom>
+        </p:spPr>
+      </p:pic>
+      <p:sp>
+        <p:nvSpPr>
+          <p:cNvPr id="7" name="Oval 6"/>
+          <p:cNvSpPr/>
+          <p:nvPr/>
+        </p:nvSpPr>
+        <p:spPr>
+          <a:xfrm>
+            <a:off x="4708026" y="5179211"/>
+            <a:ext cx="1405607" cy="808601"/>
+          </a:xfrm>
+          <a:prstGeom prst="ellipse">
+            <a:avLst/>
+          </a:prstGeom>
+          <a:noFill/>
+          <a:ln>
+            <a:solidFill>
+              <a:srgbClr val="FF0000"/>
+            </a:solidFill>
+          </a:ln>
+        </p:spPr>
+        <p:style>
+          <a:lnRef idx="2">
+            <a:schemeClr val="accent1">
+              <a:shade val="50000"/>
+            </a:schemeClr>
+          </a:lnRef>
+          <a:fillRef idx="1">
+            <a:schemeClr val="accent1"/>
+          </a:fillRef>
+          <a:effectRef idx="0">
+            <a:schemeClr val="accent1"/>
+          </a:effectRef>
+          <a:fontRef idx="minor">
+            <a:schemeClr val="lt1"/>
+          </a:fontRef>
+        </p:style>
+        <p:txBody>
+          <a:bodyPr rtlCol="0" anchor="ctr"/>
+          <a:lstStyle/>
+          <a:p>
+            <a:pPr algn="ctr"/>
+            <a:endParaRPr lang="en-US"/>
+          </a:p>
+        </p:txBody>
+      </p:sp>
     </p:spTree>
     <p:extLst>
       <p:ext uri="{BB962C8B-B14F-4D97-AF65-F5344CB8AC3E}">
-        <p14:creationId xmlns:p14="http://schemas.microsoft.com/office/powerpoint/2010/main" val="976030362"/>
+        <p14:creationId xmlns:p14="http://schemas.microsoft.com/office/powerpoint/2010/main" val="3744943"/>
       </p:ext>
     </p:extLst>
   </p:cSld>
   <p:clrMapOvr>
     <a:masterClrMapping/>
   </p:clrMapOvr>
-  <p:timing>
-    <p:tnLst>
-      <p:par>
-        <p:cTn id="1" dur="indefinite" restart="never" nodeType="tmRoot"/>
-      </p:par>
-    </p:tnLst>
-  </p:timing>
 </p:sld>
 </file>
 
@@ -47244,6 +47293,188 @@
     <p:extLst>
       <p:ext uri="{BB962C8B-B14F-4D97-AF65-F5344CB8AC3E}">
         <p14:creationId xmlns:p14="http://schemas.microsoft.com/office/powerpoint/2010/main" val="3795721541"/>
+      </p:ext>
+    </p:extLst>
+  </p:cSld>
+  <p:clrMapOvr>
+    <a:masterClrMapping/>
+  </p:clrMapOvr>
+  <p:timing>
+    <p:tnLst>
+      <p:par>
+        <p:cTn id="1" dur="indefinite" restart="never" nodeType="tmRoot"/>
+      </p:par>
+    </p:tnLst>
+  </p:timing>
+</p:sld>
+</file>
+
+<file path=ppt/slides/slide30.xml><?xml version="1.0" encoding="utf-8"?>
+<p:sld xmlns:a="http://schemas.openxmlformats.org/drawingml/2006/main" xmlns:r="http://schemas.openxmlformats.org/officeDocument/2006/relationships" xmlns:p="http://schemas.openxmlformats.org/presentationml/2006/main">
+  <p:cSld>
+    <p:spTree>
+      <p:nvGrpSpPr>
+        <p:cNvPr id="1" name=""/>
+        <p:cNvGrpSpPr/>
+        <p:nvPr/>
+      </p:nvGrpSpPr>
+      <p:grpSpPr>
+        <a:xfrm>
+          <a:off x="0" y="0"/>
+          <a:ext cx="0" cy="0"/>
+          <a:chOff x="0" y="0"/>
+          <a:chExt cx="0" cy="0"/>
+        </a:xfrm>
+      </p:grpSpPr>
+      <p:sp>
+        <p:nvSpPr>
+          <p:cNvPr id="2" name="Title 1"/>
+          <p:cNvSpPr>
+            <a:spLocks noGrp="1"/>
+          </p:cNvSpPr>
+          <p:nvPr>
+            <p:ph type="title"/>
+          </p:nvPr>
+        </p:nvSpPr>
+        <p:spPr/>
+        <p:txBody>
+          <a:bodyPr/>
+          <a:lstStyle/>
+          <a:p>
+            <a:r>
+              <a:rPr lang="en-US" dirty="0" smtClean="0"/>
+              <a:t>Summary</a:t>
+            </a:r>
+            <a:endParaRPr lang="en-US" dirty="0"/>
+          </a:p>
+        </p:txBody>
+      </p:sp>
+      <p:sp>
+        <p:nvSpPr>
+          <p:cNvPr id="3" name="Content Placeholder 2"/>
+          <p:cNvSpPr>
+            <a:spLocks noGrp="1"/>
+          </p:cNvSpPr>
+          <p:nvPr>
+            <p:ph idx="1"/>
+          </p:nvPr>
+        </p:nvSpPr>
+        <p:spPr/>
+        <p:txBody>
+          <a:bodyPr/>
+          <a:lstStyle/>
+          <a:p>
+            <a:r>
+              <a:rPr lang="en-US" dirty="0" smtClean="0"/>
+              <a:t>In this lesson you have learned</a:t>
+            </a:r>
+          </a:p>
+          <a:p>
+            <a:pPr lvl="1"/>
+            <a:r>
+              <a:rPr lang="en-US" dirty="0" smtClean="0"/>
+              <a:t>that </a:t>
+            </a:r>
+            <a:r>
+              <a:rPr lang="en-US" dirty="0" err="1" smtClean="0"/>
+              <a:t>git</a:t>
+            </a:r>
+            <a:r>
+              <a:rPr lang="en-US" dirty="0" smtClean="0"/>
+              <a:t> creates a mini-</a:t>
+            </a:r>
+            <a:r>
+              <a:rPr lang="en-US" dirty="0" err="1" smtClean="0"/>
+              <a:t>filesystem</a:t>
+            </a:r>
+            <a:r>
+              <a:rPr lang="en-US" dirty="0" smtClean="0"/>
+              <a:t> in your directory</a:t>
+            </a:r>
+          </a:p>
+          <a:p>
+            <a:pPr lvl="1"/>
+            <a:r>
+              <a:rPr lang="en-US" dirty="0" smtClean="0"/>
+              <a:t>what commit, push, pull, and sync do</a:t>
+            </a:r>
+          </a:p>
+          <a:p>
+            <a:pPr lvl="1"/>
+            <a:r>
+              <a:rPr lang="en-US" dirty="0" smtClean="0"/>
+              <a:t>the elements of the basic </a:t>
+            </a:r>
+            <a:r>
+              <a:rPr lang="en-US" dirty="0" err="1" smtClean="0"/>
+              <a:t>git</a:t>
+            </a:r>
+            <a:r>
+              <a:rPr lang="en-US" dirty="0" smtClean="0"/>
+              <a:t> workflow</a:t>
+            </a:r>
+          </a:p>
+          <a:p>
+            <a:pPr lvl="1"/>
+            <a:r>
+              <a:rPr lang="en-US" dirty="0" smtClean="0"/>
+              <a:t>how </a:t>
+            </a:r>
+            <a:r>
+              <a:rPr lang="en-US" dirty="0" err="1" smtClean="0"/>
+              <a:t>git</a:t>
+            </a:r>
+            <a:r>
+              <a:rPr lang="en-US" dirty="0" smtClean="0"/>
+              <a:t> allows you to work across multiple computers</a:t>
+            </a:r>
+          </a:p>
+          <a:p>
+            <a:pPr lvl="1"/>
+            <a:r>
+              <a:rPr lang="en-US" dirty="0" smtClean="0"/>
+              <a:t>how </a:t>
+            </a:r>
+            <a:r>
+              <a:rPr lang="en-US" dirty="0" err="1" smtClean="0"/>
+              <a:t>git</a:t>
+            </a:r>
+            <a:r>
+              <a:rPr lang="en-US" dirty="0" smtClean="0"/>
+              <a:t> allows you and a partner to work together</a:t>
+            </a:r>
+            <a:endParaRPr lang="en-US" dirty="0"/>
+          </a:p>
+        </p:txBody>
+      </p:sp>
+      <p:sp>
+        <p:nvSpPr>
+          <p:cNvPr id="4" name="Slide Number Placeholder 3"/>
+          <p:cNvSpPr>
+            <a:spLocks noGrp="1"/>
+          </p:cNvSpPr>
+          <p:nvPr>
+            <p:ph type="sldNum" sz="quarter" idx="12"/>
+          </p:nvPr>
+        </p:nvSpPr>
+        <p:spPr/>
+        <p:txBody>
+          <a:bodyPr/>
+          <a:lstStyle/>
+          <a:p>
+            <a:fld id="{B6F15528-21DE-4FAA-801E-634DDDAF4B2B}" type="slidenum">
+              <a:rPr lang="en-US" smtClean="0"/>
+              <a:pPr/>
+              <a:t>30</a:t>
+            </a:fld>
+            <a:endParaRPr lang="en-US"/>
+          </a:p>
+        </p:txBody>
+      </p:sp>
+    </p:spTree>
+    <p:extLst>
+      <p:ext uri="{BB962C8B-B14F-4D97-AF65-F5344CB8AC3E}">
+        <p14:creationId xmlns:p14="http://schemas.microsoft.com/office/powerpoint/2010/main" val="976030362"/>
       </p:ext>
     </p:extLst>
   </p:cSld>

</xml_diff>